<commit_message>
Tela de solicitações concluidas
</commit_message>
<xml_diff>
--- a/Protótipo/Protótipos.pptx
+++ b/Protótipo/Protótipos.pptx
@@ -12,6 +12,7 @@
     <p:sldId id="262" r:id="rId6"/>
     <p:sldId id="263" r:id="rId7"/>
     <p:sldId id="264" r:id="rId8"/>
+    <p:sldId id="265" r:id="rId9"/>
   </p:sldIdLst>
   <p:sldSz cx="12192000" cy="6858000"/>
   <p:notesSz cx="6858000" cy="9144000"/>
@@ -12425,8 +12426,8 @@
         </p:nvSpPr>
         <p:spPr>
           <a:xfrm>
-            <a:off x="4122663" y="6287297"/>
-            <a:ext cx="5121017" cy="523220"/>
+            <a:off x="3271739" y="6252015"/>
+            <a:ext cx="6278322" cy="523220"/>
           </a:xfrm>
           <a:prstGeom prst="rect">
             <a:avLst/>
@@ -12441,7 +12442,7 @@
           <a:p>
             <a:r>
               <a:rPr lang="pt-BR" sz="2800" b="1" dirty="0"/>
-              <a:t>Solicitador/Visualizar Solicitação </a:t>
+              <a:t>Solicitador/Visualizar Solicitação/Aberta </a:t>
             </a:r>
           </a:p>
         </p:txBody>
@@ -12705,7 +12706,7 @@
           <p:nvPr>
             <p:extLst>
               <p:ext uri="{D42A27DB-BD31-4B8C-83A1-F6EECF244321}">
-                <p14:modId xmlns:p14="http://schemas.microsoft.com/office/powerpoint/2010/main" val="2266660271"/>
+                <p14:modId xmlns:p14="http://schemas.microsoft.com/office/powerpoint/2010/main" val="878173758"/>
               </p:ext>
             </p:extLst>
           </p:nvPr>
@@ -12780,7 +12781,7 @@
                       <a:pPr algn="ctr"/>
                       <a:r>
                         <a:rPr lang="pt-BR" sz="1200" dirty="0"/>
-                        <a:t>Código</a:t>
+                        <a:t>Número</a:t>
                       </a:r>
                     </a:p>
                   </a:txBody>
@@ -12923,7 +12924,7 @@
           <p:nvPr>
             <p:extLst>
               <p:ext uri="{D42A27DB-BD31-4B8C-83A1-F6EECF244321}">
-                <p14:modId xmlns:p14="http://schemas.microsoft.com/office/powerpoint/2010/main" val="767622522"/>
+                <p14:modId xmlns:p14="http://schemas.microsoft.com/office/powerpoint/2010/main" val="2184422181"/>
               </p:ext>
             </p:extLst>
           </p:nvPr>
@@ -13002,7 +13003,7 @@
                             <a:srgbClr val="15292F"/>
                           </a:solidFill>
                         </a:rPr>
-                        <a:t>01301</a:t>
+                        <a:t>0130122</a:t>
                       </a:r>
                     </a:p>
                   </a:txBody>
@@ -13169,7 +13170,7 @@
           <p:nvPr>
             <p:extLst>
               <p:ext uri="{D42A27DB-BD31-4B8C-83A1-F6EECF244321}">
-                <p14:modId xmlns:p14="http://schemas.microsoft.com/office/powerpoint/2010/main" val="126105798"/>
+                <p14:modId xmlns:p14="http://schemas.microsoft.com/office/powerpoint/2010/main" val="3652556670"/>
               </p:ext>
             </p:extLst>
           </p:nvPr>
@@ -13248,7 +13249,7 @@
                             <a:srgbClr val="15292F"/>
                           </a:solidFill>
                         </a:rPr>
-                        <a:t>01302</a:t>
+                        <a:t>0130222</a:t>
                       </a:r>
                     </a:p>
                   </a:txBody>
@@ -13415,7 +13416,7 @@
           <p:nvPr>
             <p:extLst>
               <p:ext uri="{D42A27DB-BD31-4B8C-83A1-F6EECF244321}">
-                <p14:modId xmlns:p14="http://schemas.microsoft.com/office/powerpoint/2010/main" val="663637536"/>
+                <p14:modId xmlns:p14="http://schemas.microsoft.com/office/powerpoint/2010/main" val="1152595921"/>
               </p:ext>
             </p:extLst>
           </p:nvPr>
@@ -13494,7 +13495,7 @@
                             <a:srgbClr val="15292F"/>
                           </a:solidFill>
                         </a:rPr>
-                        <a:t>01301</a:t>
+                        <a:t>0130123</a:t>
                       </a:r>
                     </a:p>
                   </a:txBody>
@@ -13661,7 +13662,7 @@
           <p:nvPr>
             <p:extLst>
               <p:ext uri="{D42A27DB-BD31-4B8C-83A1-F6EECF244321}">
-                <p14:modId xmlns:p14="http://schemas.microsoft.com/office/powerpoint/2010/main" val="4031662964"/>
+                <p14:modId xmlns:p14="http://schemas.microsoft.com/office/powerpoint/2010/main" val="184394462"/>
               </p:ext>
             </p:extLst>
           </p:nvPr>
@@ -13740,7 +13741,7 @@
                             <a:srgbClr val="15292F"/>
                           </a:solidFill>
                         </a:rPr>
-                        <a:t>01302</a:t>
+                        <a:t>0130223</a:t>
                       </a:r>
                     </a:p>
                   </a:txBody>
@@ -14079,7 +14080,7 @@
           <a:p>
             <a:r>
               <a:rPr lang="pt-BR" dirty="0"/>
-              <a:t>Concluídas</a:t>
+              <a:t>Concluída</a:t>
             </a:r>
           </a:p>
         </p:txBody>
@@ -14220,6 +14221,2461 @@
     <p:extLst>
       <p:ext uri="{BB962C8B-B14F-4D97-AF65-F5344CB8AC3E}">
         <p14:creationId xmlns:p14="http://schemas.microsoft.com/office/powerpoint/2010/main" val="3442750503"/>
+      </p:ext>
+    </p:extLst>
+  </p:cSld>
+  <p:clrMapOvr>
+    <a:masterClrMapping/>
+  </p:clrMapOvr>
+</p:sld>
+</file>
+
+<file path=ppt/slides/slide8.xml><?xml version="1.0" encoding="utf-8"?>
+<p:sld xmlns:a="http://schemas.openxmlformats.org/drawingml/2006/main" xmlns:r="http://schemas.openxmlformats.org/officeDocument/2006/relationships" xmlns:p="http://schemas.openxmlformats.org/presentationml/2006/main">
+  <p:cSld>
+    <p:spTree>
+      <p:nvGrpSpPr>
+        <p:cNvPr id="1" name=""/>
+        <p:cNvGrpSpPr/>
+        <p:nvPr/>
+      </p:nvGrpSpPr>
+      <p:grpSpPr>
+        <a:xfrm>
+          <a:off x="0" y="0"/>
+          <a:ext cx="0" cy="0"/>
+          <a:chOff x="0" y="0"/>
+          <a:chExt cx="0" cy="0"/>
+        </a:xfrm>
+      </p:grpSpPr>
+      <p:sp>
+        <p:nvSpPr>
+          <p:cNvPr id="36" name="Retângulo 35">
+            <a:extLst>
+              <a:ext uri="{FF2B5EF4-FFF2-40B4-BE49-F238E27FC236}">
+                <a16:creationId xmlns:a16="http://schemas.microsoft.com/office/drawing/2014/main" id="{72717C35-7450-4B42-8F96-32041860C4D7}"/>
+              </a:ext>
+            </a:extLst>
+          </p:cNvPr>
+          <p:cNvSpPr/>
+          <p:nvPr/>
+        </p:nvSpPr>
+        <p:spPr>
+          <a:xfrm>
+            <a:off x="424173" y="542422"/>
+            <a:ext cx="11343653" cy="567569"/>
+          </a:xfrm>
+          <a:prstGeom prst="rect">
+            <a:avLst/>
+          </a:prstGeom>
+          <a:solidFill>
+            <a:srgbClr val="15292F"/>
+          </a:solidFill>
+          <a:ln>
+            <a:solidFill>
+              <a:srgbClr val="15292F"/>
+            </a:solidFill>
+          </a:ln>
+        </p:spPr>
+        <p:style>
+          <a:lnRef idx="2">
+            <a:schemeClr val="accent1">
+              <a:shade val="50000"/>
+            </a:schemeClr>
+          </a:lnRef>
+          <a:fillRef idx="1">
+            <a:schemeClr val="accent1"/>
+          </a:fillRef>
+          <a:effectRef idx="0">
+            <a:schemeClr val="accent1"/>
+          </a:effectRef>
+          <a:fontRef idx="minor">
+            <a:schemeClr val="lt1"/>
+          </a:fontRef>
+        </p:style>
+        <p:txBody>
+          <a:bodyPr rtlCol="0" anchor="ctr"/>
+          <a:lstStyle/>
+          <a:p>
+            <a:pPr algn="ctr"/>
+            <a:endParaRPr lang="pt-BR"/>
+          </a:p>
+        </p:txBody>
+      </p:sp>
+      <p:sp>
+        <p:nvSpPr>
+          <p:cNvPr id="11" name="Retângulo 10">
+            <a:extLst>
+              <a:ext uri="{FF2B5EF4-FFF2-40B4-BE49-F238E27FC236}">
+                <a16:creationId xmlns:a16="http://schemas.microsoft.com/office/drawing/2014/main" id="{D528783E-A938-411F-9F69-2D5C5AF53E00}"/>
+              </a:ext>
+            </a:extLst>
+          </p:cNvPr>
+          <p:cNvSpPr/>
+          <p:nvPr/>
+        </p:nvSpPr>
+        <p:spPr>
+          <a:xfrm>
+            <a:off x="242389" y="533047"/>
+            <a:ext cx="11549575" cy="5746652"/>
+          </a:xfrm>
+          <a:prstGeom prst="rect">
+            <a:avLst/>
+          </a:prstGeom>
+          <a:noFill/>
+          <a:ln>
+            <a:solidFill>
+              <a:srgbClr val="15292F"/>
+            </a:solidFill>
+          </a:ln>
+        </p:spPr>
+        <p:style>
+          <a:lnRef idx="2">
+            <a:schemeClr val="accent1">
+              <a:shade val="50000"/>
+            </a:schemeClr>
+          </a:lnRef>
+          <a:fillRef idx="1">
+            <a:schemeClr val="accent1"/>
+          </a:fillRef>
+          <a:effectRef idx="0">
+            <a:schemeClr val="accent1"/>
+          </a:effectRef>
+          <a:fontRef idx="minor">
+            <a:schemeClr val="lt1"/>
+          </a:fontRef>
+        </p:style>
+        <p:txBody>
+          <a:bodyPr rtlCol="0" anchor="ctr"/>
+          <a:lstStyle/>
+          <a:p>
+            <a:pPr algn="ctr"/>
+            <a:endParaRPr lang="pt-BR"/>
+          </a:p>
+        </p:txBody>
+      </p:sp>
+      <p:sp>
+        <p:nvSpPr>
+          <p:cNvPr id="13" name="CaixaDeTexto 12">
+            <a:extLst>
+              <a:ext uri="{FF2B5EF4-FFF2-40B4-BE49-F238E27FC236}">
+                <a16:creationId xmlns:a16="http://schemas.microsoft.com/office/drawing/2014/main" id="{44A41851-5B55-46CA-A196-9F1036F346AE}"/>
+              </a:ext>
+            </a:extLst>
+          </p:cNvPr>
+          <p:cNvSpPr txBox="1"/>
+          <p:nvPr/>
+        </p:nvSpPr>
+        <p:spPr>
+          <a:xfrm>
+            <a:off x="2894969" y="79692"/>
+            <a:ext cx="6469528" cy="523220"/>
+          </a:xfrm>
+          <a:prstGeom prst="rect">
+            <a:avLst/>
+          </a:prstGeom>
+          <a:noFill/>
+        </p:spPr>
+        <p:txBody>
+          <a:bodyPr wrap="none" rtlCol="0">
+            <a:spAutoFit/>
+          </a:bodyPr>
+          <a:lstStyle/>
+          <a:p>
+            <a:r>
+              <a:rPr lang="pt-BR" sz="2800" b="1" dirty="0"/>
+              <a:t>Sistema de Gerenciamento de Solicitações</a:t>
+            </a:r>
+          </a:p>
+        </p:txBody>
+      </p:sp>
+      <p:sp>
+        <p:nvSpPr>
+          <p:cNvPr id="12" name="CaixaDeTexto 11">
+            <a:extLst>
+              <a:ext uri="{FF2B5EF4-FFF2-40B4-BE49-F238E27FC236}">
+                <a16:creationId xmlns:a16="http://schemas.microsoft.com/office/drawing/2014/main" id="{A2F0968E-0484-446C-B3EC-124FA3DD9FD8}"/>
+              </a:ext>
+            </a:extLst>
+          </p:cNvPr>
+          <p:cNvSpPr txBox="1"/>
+          <p:nvPr/>
+        </p:nvSpPr>
+        <p:spPr>
+          <a:xfrm>
+            <a:off x="5837001" y="1148118"/>
+            <a:ext cx="2315966" cy="523220"/>
+          </a:xfrm>
+          <a:prstGeom prst="rect">
+            <a:avLst/>
+          </a:prstGeom>
+          <a:noFill/>
+        </p:spPr>
+        <p:txBody>
+          <a:bodyPr wrap="square" rtlCol="0">
+            <a:spAutoFit/>
+          </a:bodyPr>
+          <a:lstStyle/>
+          <a:p>
+            <a:r>
+              <a:rPr lang="pt-BR" sz="2800" b="1" dirty="0"/>
+              <a:t>Solicitações</a:t>
+            </a:r>
+          </a:p>
+        </p:txBody>
+      </p:sp>
+      <p:sp>
+        <p:nvSpPr>
+          <p:cNvPr id="14" name="Retângulo 13">
+            <a:extLst>
+              <a:ext uri="{FF2B5EF4-FFF2-40B4-BE49-F238E27FC236}">
+                <a16:creationId xmlns:a16="http://schemas.microsoft.com/office/drawing/2014/main" id="{49121E93-52CC-46A5-9B75-798204730BC3}"/>
+              </a:ext>
+            </a:extLst>
+          </p:cNvPr>
+          <p:cNvSpPr/>
+          <p:nvPr/>
+        </p:nvSpPr>
+        <p:spPr>
+          <a:xfrm>
+            <a:off x="261297" y="542423"/>
+            <a:ext cx="2315966" cy="5746652"/>
+          </a:xfrm>
+          <a:prstGeom prst="rect">
+            <a:avLst/>
+          </a:prstGeom>
+          <a:solidFill>
+            <a:srgbClr val="15292F"/>
+          </a:solidFill>
+          <a:ln>
+            <a:solidFill>
+              <a:srgbClr val="15292F"/>
+            </a:solidFill>
+          </a:ln>
+        </p:spPr>
+        <p:style>
+          <a:lnRef idx="2">
+            <a:schemeClr val="accent1">
+              <a:shade val="50000"/>
+            </a:schemeClr>
+          </a:lnRef>
+          <a:fillRef idx="1">
+            <a:schemeClr val="accent1"/>
+          </a:fillRef>
+          <a:effectRef idx="0">
+            <a:schemeClr val="accent1"/>
+          </a:effectRef>
+          <a:fontRef idx="minor">
+            <a:schemeClr val="lt1"/>
+          </a:fontRef>
+        </p:style>
+        <p:txBody>
+          <a:bodyPr rtlCol="0" anchor="ctr"/>
+          <a:lstStyle/>
+          <a:p>
+            <a:pPr algn="ctr"/>
+            <a:endParaRPr lang="pt-BR"/>
+          </a:p>
+        </p:txBody>
+      </p:sp>
+      <p:sp>
+        <p:nvSpPr>
+          <p:cNvPr id="24" name="CaixaDeTexto 23">
+            <a:extLst>
+              <a:ext uri="{FF2B5EF4-FFF2-40B4-BE49-F238E27FC236}">
+                <a16:creationId xmlns:a16="http://schemas.microsoft.com/office/drawing/2014/main" id="{5FDC72C2-E03F-42D1-9E55-7E7B08090268}"/>
+              </a:ext>
+            </a:extLst>
+          </p:cNvPr>
+          <p:cNvSpPr txBox="1"/>
+          <p:nvPr/>
+        </p:nvSpPr>
+        <p:spPr>
+          <a:xfrm>
+            <a:off x="2718839" y="1647572"/>
+            <a:ext cx="2113258" cy="369332"/>
+          </a:xfrm>
+          <a:prstGeom prst="rect">
+            <a:avLst/>
+          </a:prstGeom>
+          <a:noFill/>
+        </p:spPr>
+        <p:txBody>
+          <a:bodyPr wrap="square" rtlCol="0">
+            <a:spAutoFit/>
+          </a:bodyPr>
+          <a:lstStyle/>
+          <a:p>
+            <a:r>
+              <a:rPr lang="pt-BR" dirty="0"/>
+              <a:t>Filtrar por: </a:t>
+            </a:r>
+          </a:p>
+        </p:txBody>
+      </p:sp>
+      <p:sp>
+        <p:nvSpPr>
+          <p:cNvPr id="25" name="CaixaDeTexto 24">
+            <a:extLst>
+              <a:ext uri="{FF2B5EF4-FFF2-40B4-BE49-F238E27FC236}">
+                <a16:creationId xmlns:a16="http://schemas.microsoft.com/office/drawing/2014/main" id="{96E24B0C-A2CE-48ED-BEDC-572A8F5FF39A}"/>
+              </a:ext>
+            </a:extLst>
+          </p:cNvPr>
+          <p:cNvSpPr txBox="1"/>
+          <p:nvPr/>
+        </p:nvSpPr>
+        <p:spPr>
+          <a:xfrm>
+            <a:off x="952248" y="733412"/>
+            <a:ext cx="963831" cy="338554"/>
+          </a:xfrm>
+          <a:prstGeom prst="rect">
+            <a:avLst/>
+          </a:prstGeom>
+          <a:noFill/>
+        </p:spPr>
+        <p:txBody>
+          <a:bodyPr wrap="square" rtlCol="0">
+            <a:spAutoFit/>
+          </a:bodyPr>
+          <a:lstStyle/>
+          <a:p>
+            <a:r>
+              <a:rPr lang="pt-BR" sz="1600" b="1" dirty="0">
+                <a:solidFill>
+                  <a:schemeClr val="bg1"/>
+                </a:solidFill>
+              </a:rPr>
+              <a:t>MENU</a:t>
+            </a:r>
+          </a:p>
+        </p:txBody>
+      </p:sp>
+      <p:sp>
+        <p:nvSpPr>
+          <p:cNvPr id="28" name="Retângulo 27">
+            <a:extLst>
+              <a:ext uri="{FF2B5EF4-FFF2-40B4-BE49-F238E27FC236}">
+                <a16:creationId xmlns:a16="http://schemas.microsoft.com/office/drawing/2014/main" id="{F03B6800-85D2-4ADC-8E0D-7807940B5FE8}"/>
+              </a:ext>
+            </a:extLst>
+          </p:cNvPr>
+          <p:cNvSpPr/>
+          <p:nvPr/>
+        </p:nvSpPr>
+        <p:spPr>
+          <a:xfrm>
+            <a:off x="410890" y="2500472"/>
+            <a:ext cx="278428" cy="301627"/>
+          </a:xfrm>
+          <a:prstGeom prst="rect">
+            <a:avLst/>
+          </a:prstGeom>
+          <a:noFill/>
+          <a:ln w="41275">
+            <a:solidFill>
+              <a:schemeClr val="bg1"/>
+            </a:solidFill>
+          </a:ln>
+        </p:spPr>
+        <p:style>
+          <a:lnRef idx="2">
+            <a:schemeClr val="accent1">
+              <a:shade val="50000"/>
+            </a:schemeClr>
+          </a:lnRef>
+          <a:fillRef idx="1">
+            <a:schemeClr val="accent1"/>
+          </a:fillRef>
+          <a:effectRef idx="0">
+            <a:schemeClr val="accent1"/>
+          </a:effectRef>
+          <a:fontRef idx="minor">
+            <a:schemeClr val="lt1"/>
+          </a:fontRef>
+        </p:style>
+        <p:txBody>
+          <a:bodyPr rtlCol="0" anchor="ctr"/>
+          <a:lstStyle/>
+          <a:p>
+            <a:pPr algn="ctr"/>
+            <a:endParaRPr lang="pt-BR" sz="1600"/>
+          </a:p>
+        </p:txBody>
+      </p:sp>
+      <p:sp>
+        <p:nvSpPr>
+          <p:cNvPr id="29" name="Retângulo 28">
+            <a:extLst>
+              <a:ext uri="{FF2B5EF4-FFF2-40B4-BE49-F238E27FC236}">
+                <a16:creationId xmlns:a16="http://schemas.microsoft.com/office/drawing/2014/main" id="{2C438151-C044-420F-A3AB-79A3B8714B0F}"/>
+              </a:ext>
+            </a:extLst>
+          </p:cNvPr>
+          <p:cNvSpPr/>
+          <p:nvPr/>
+        </p:nvSpPr>
+        <p:spPr>
+          <a:xfrm>
+            <a:off x="410889" y="3037464"/>
+            <a:ext cx="278428" cy="301627"/>
+          </a:xfrm>
+          <a:prstGeom prst="rect">
+            <a:avLst/>
+          </a:prstGeom>
+          <a:noFill/>
+          <a:ln w="41275">
+            <a:solidFill>
+              <a:schemeClr val="bg1"/>
+            </a:solidFill>
+          </a:ln>
+        </p:spPr>
+        <p:style>
+          <a:lnRef idx="2">
+            <a:schemeClr val="accent1">
+              <a:shade val="50000"/>
+            </a:schemeClr>
+          </a:lnRef>
+          <a:fillRef idx="1">
+            <a:schemeClr val="accent1"/>
+          </a:fillRef>
+          <a:effectRef idx="0">
+            <a:schemeClr val="accent1"/>
+          </a:effectRef>
+          <a:fontRef idx="minor">
+            <a:schemeClr val="lt1"/>
+          </a:fontRef>
+        </p:style>
+        <p:txBody>
+          <a:bodyPr rtlCol="0" anchor="ctr"/>
+          <a:lstStyle/>
+          <a:p>
+            <a:pPr algn="ctr"/>
+            <a:endParaRPr lang="pt-BR" sz="1600"/>
+          </a:p>
+        </p:txBody>
+      </p:sp>
+      <p:sp>
+        <p:nvSpPr>
+          <p:cNvPr id="32" name="CaixaDeTexto 31">
+            <a:extLst>
+              <a:ext uri="{FF2B5EF4-FFF2-40B4-BE49-F238E27FC236}">
+                <a16:creationId xmlns:a16="http://schemas.microsoft.com/office/drawing/2014/main" id="{C258EE09-B702-4C37-A0DB-F76AEC3FDD93}"/>
+              </a:ext>
+            </a:extLst>
+          </p:cNvPr>
+          <p:cNvSpPr txBox="1"/>
+          <p:nvPr/>
+        </p:nvSpPr>
+        <p:spPr>
+          <a:xfrm>
+            <a:off x="718032" y="2486404"/>
+            <a:ext cx="1782913" cy="338554"/>
+          </a:xfrm>
+          <a:prstGeom prst="rect">
+            <a:avLst/>
+          </a:prstGeom>
+          <a:noFill/>
+        </p:spPr>
+        <p:txBody>
+          <a:bodyPr wrap="square" rtlCol="0">
+            <a:spAutoFit/>
+          </a:bodyPr>
+          <a:lstStyle/>
+          <a:p>
+            <a:r>
+              <a:rPr lang="pt-BR" sz="1600" b="1" dirty="0">
+                <a:solidFill>
+                  <a:schemeClr val="bg1"/>
+                </a:solidFill>
+              </a:rPr>
+              <a:t>Alterar Senha</a:t>
+            </a:r>
+          </a:p>
+        </p:txBody>
+      </p:sp>
+      <p:sp>
+        <p:nvSpPr>
+          <p:cNvPr id="33" name="CaixaDeTexto 32">
+            <a:extLst>
+              <a:ext uri="{FF2B5EF4-FFF2-40B4-BE49-F238E27FC236}">
+                <a16:creationId xmlns:a16="http://schemas.microsoft.com/office/drawing/2014/main" id="{C5F0114B-894C-44CB-934A-A5C1C4BA6830}"/>
+              </a:ext>
+            </a:extLst>
+          </p:cNvPr>
+          <p:cNvSpPr txBox="1"/>
+          <p:nvPr/>
+        </p:nvSpPr>
+        <p:spPr>
+          <a:xfrm>
+            <a:off x="718032" y="3000537"/>
+            <a:ext cx="655528" cy="338554"/>
+          </a:xfrm>
+          <a:prstGeom prst="rect">
+            <a:avLst/>
+          </a:prstGeom>
+          <a:noFill/>
+        </p:spPr>
+        <p:txBody>
+          <a:bodyPr wrap="square" rtlCol="0">
+            <a:spAutoFit/>
+          </a:bodyPr>
+          <a:lstStyle/>
+          <a:p>
+            <a:r>
+              <a:rPr lang="pt-BR" sz="1600" b="1" dirty="0">
+                <a:solidFill>
+                  <a:schemeClr val="bg1"/>
+                </a:solidFill>
+              </a:rPr>
+              <a:t>Sair</a:t>
+            </a:r>
+          </a:p>
+        </p:txBody>
+      </p:sp>
+      <p:cxnSp>
+        <p:nvCxnSpPr>
+          <p:cNvPr id="3" name="Conector reto 2">
+            <a:extLst>
+              <a:ext uri="{FF2B5EF4-FFF2-40B4-BE49-F238E27FC236}">
+                <a16:creationId xmlns:a16="http://schemas.microsoft.com/office/drawing/2014/main" id="{6219E484-EB50-4F15-B464-0ED9AF6F738C}"/>
+              </a:ext>
+            </a:extLst>
+          </p:cNvPr>
+          <p:cNvCxnSpPr>
+            <a:cxnSpLocks/>
+          </p:cNvCxnSpPr>
+          <p:nvPr/>
+        </p:nvCxnSpPr>
+        <p:spPr>
+          <a:xfrm>
+            <a:off x="368685" y="1102744"/>
+            <a:ext cx="2132260" cy="7247"/>
+          </a:xfrm>
+          <a:prstGeom prst="line">
+            <a:avLst/>
+          </a:prstGeom>
+          <a:ln>
+            <a:solidFill>
+              <a:schemeClr val="bg1"/>
+            </a:solidFill>
+          </a:ln>
+        </p:spPr>
+        <p:style>
+          <a:lnRef idx="1">
+            <a:schemeClr val="accent1"/>
+          </a:lnRef>
+          <a:fillRef idx="0">
+            <a:schemeClr val="accent1"/>
+          </a:fillRef>
+          <a:effectRef idx="0">
+            <a:schemeClr val="accent1"/>
+          </a:effectRef>
+          <a:fontRef idx="minor">
+            <a:schemeClr val="tx1"/>
+          </a:fontRef>
+        </p:style>
+      </p:cxnSp>
+      <p:sp>
+        <p:nvSpPr>
+          <p:cNvPr id="34" name="Retângulo 33">
+            <a:extLst>
+              <a:ext uri="{FF2B5EF4-FFF2-40B4-BE49-F238E27FC236}">
+                <a16:creationId xmlns:a16="http://schemas.microsoft.com/office/drawing/2014/main" id="{411E0287-ABD4-486F-889C-AF7A431F8B20}"/>
+              </a:ext>
+            </a:extLst>
+          </p:cNvPr>
+          <p:cNvSpPr/>
+          <p:nvPr/>
+        </p:nvSpPr>
+        <p:spPr>
+          <a:xfrm>
+            <a:off x="11186393" y="652282"/>
+            <a:ext cx="403700" cy="362330"/>
+          </a:xfrm>
+          <a:prstGeom prst="rect">
+            <a:avLst/>
+          </a:prstGeom>
+          <a:solidFill>
+            <a:schemeClr val="bg1"/>
+          </a:solidFill>
+          <a:ln w="41275">
+            <a:solidFill>
+              <a:schemeClr val="bg1"/>
+            </a:solidFill>
+          </a:ln>
+        </p:spPr>
+        <p:style>
+          <a:lnRef idx="2">
+            <a:schemeClr val="accent1">
+              <a:shade val="50000"/>
+            </a:schemeClr>
+          </a:lnRef>
+          <a:fillRef idx="1">
+            <a:schemeClr val="accent1"/>
+          </a:fillRef>
+          <a:effectRef idx="0">
+            <a:schemeClr val="accent1"/>
+          </a:effectRef>
+          <a:fontRef idx="minor">
+            <a:schemeClr val="lt1"/>
+          </a:fontRef>
+        </p:style>
+        <p:txBody>
+          <a:bodyPr rtlCol="0" anchor="ctr"/>
+          <a:lstStyle/>
+          <a:p>
+            <a:pPr algn="ctr"/>
+            <a:endParaRPr lang="pt-BR"/>
+          </a:p>
+        </p:txBody>
+      </p:sp>
+      <p:sp>
+        <p:nvSpPr>
+          <p:cNvPr id="35" name="CaixaDeTexto 34">
+            <a:extLst>
+              <a:ext uri="{FF2B5EF4-FFF2-40B4-BE49-F238E27FC236}">
+                <a16:creationId xmlns:a16="http://schemas.microsoft.com/office/drawing/2014/main" id="{B3FF9A18-7D07-4F64-841F-56C983C88AF5}"/>
+              </a:ext>
+            </a:extLst>
+          </p:cNvPr>
+          <p:cNvSpPr txBox="1"/>
+          <p:nvPr/>
+        </p:nvSpPr>
+        <p:spPr>
+          <a:xfrm>
+            <a:off x="10081839" y="624147"/>
+            <a:ext cx="1326470" cy="400110"/>
+          </a:xfrm>
+          <a:prstGeom prst="rect">
+            <a:avLst/>
+          </a:prstGeom>
+          <a:noFill/>
+        </p:spPr>
+        <p:txBody>
+          <a:bodyPr wrap="square" rtlCol="0">
+            <a:spAutoFit/>
+          </a:bodyPr>
+          <a:lstStyle/>
+          <a:p>
+            <a:r>
+              <a:rPr lang="pt-BR" sz="2000" b="1" dirty="0">
+                <a:solidFill>
+                  <a:schemeClr val="bg1"/>
+                </a:solidFill>
+              </a:rPr>
+              <a:t>Empresa</a:t>
+            </a:r>
+          </a:p>
+        </p:txBody>
+      </p:sp>
+      <p:sp>
+        <p:nvSpPr>
+          <p:cNvPr id="37" name="CaixaDeTexto 36">
+            <a:extLst>
+              <a:ext uri="{FF2B5EF4-FFF2-40B4-BE49-F238E27FC236}">
+                <a16:creationId xmlns:a16="http://schemas.microsoft.com/office/drawing/2014/main" id="{03757204-3378-4387-9345-36BD62EEC760}"/>
+              </a:ext>
+            </a:extLst>
+          </p:cNvPr>
+          <p:cNvSpPr txBox="1"/>
+          <p:nvPr/>
+        </p:nvSpPr>
+        <p:spPr>
+          <a:xfrm>
+            <a:off x="3337714" y="6233853"/>
+            <a:ext cx="6882718" cy="523220"/>
+          </a:xfrm>
+          <a:prstGeom prst="rect">
+            <a:avLst/>
+          </a:prstGeom>
+          <a:noFill/>
+        </p:spPr>
+        <p:txBody>
+          <a:bodyPr wrap="none" rtlCol="0">
+            <a:spAutoFit/>
+          </a:bodyPr>
+          <a:lstStyle/>
+          <a:p>
+            <a:r>
+              <a:rPr lang="pt-BR" sz="2800" b="1" dirty="0"/>
+              <a:t>Solicitador/Visualizar Solicitação/Concluídas </a:t>
+            </a:r>
+          </a:p>
+        </p:txBody>
+      </p:sp>
+      <p:sp>
+        <p:nvSpPr>
+          <p:cNvPr id="39" name="Retângulo 38">
+            <a:extLst>
+              <a:ext uri="{FF2B5EF4-FFF2-40B4-BE49-F238E27FC236}">
+                <a16:creationId xmlns:a16="http://schemas.microsoft.com/office/drawing/2014/main" id="{8C376645-A812-472B-B452-78580CC717C2}"/>
+              </a:ext>
+            </a:extLst>
+          </p:cNvPr>
+          <p:cNvSpPr/>
+          <p:nvPr/>
+        </p:nvSpPr>
+        <p:spPr>
+          <a:xfrm>
+            <a:off x="251843" y="1347641"/>
+            <a:ext cx="2325420" cy="567569"/>
+          </a:xfrm>
+          <a:prstGeom prst="rect">
+            <a:avLst/>
+          </a:prstGeom>
+          <a:solidFill>
+            <a:schemeClr val="bg1"/>
+          </a:solidFill>
+          <a:ln>
+            <a:solidFill>
+              <a:srgbClr val="15292F"/>
+            </a:solidFill>
+          </a:ln>
+        </p:spPr>
+        <p:style>
+          <a:lnRef idx="2">
+            <a:schemeClr val="accent1">
+              <a:shade val="50000"/>
+            </a:schemeClr>
+          </a:lnRef>
+          <a:fillRef idx="1">
+            <a:schemeClr val="accent1"/>
+          </a:fillRef>
+          <a:effectRef idx="0">
+            <a:schemeClr val="accent1"/>
+          </a:effectRef>
+          <a:fontRef idx="minor">
+            <a:schemeClr val="lt1"/>
+          </a:fontRef>
+        </p:style>
+        <p:txBody>
+          <a:bodyPr rtlCol="0" anchor="ctr"/>
+          <a:lstStyle/>
+          <a:p>
+            <a:pPr algn="ctr"/>
+            <a:endParaRPr lang="pt-BR" sz="1600" dirty="0"/>
+          </a:p>
+        </p:txBody>
+      </p:sp>
+      <p:sp>
+        <p:nvSpPr>
+          <p:cNvPr id="40" name="Retângulo 39">
+            <a:extLst>
+              <a:ext uri="{FF2B5EF4-FFF2-40B4-BE49-F238E27FC236}">
+                <a16:creationId xmlns:a16="http://schemas.microsoft.com/office/drawing/2014/main" id="{35E3A609-45DE-47E1-9BA2-04C77C2D7083}"/>
+              </a:ext>
+            </a:extLst>
+          </p:cNvPr>
+          <p:cNvSpPr/>
+          <p:nvPr/>
+        </p:nvSpPr>
+        <p:spPr>
+          <a:xfrm>
+            <a:off x="411036" y="1972300"/>
+            <a:ext cx="278428" cy="301627"/>
+          </a:xfrm>
+          <a:prstGeom prst="rect">
+            <a:avLst/>
+          </a:prstGeom>
+          <a:noFill/>
+          <a:ln w="41275">
+            <a:solidFill>
+              <a:schemeClr val="bg1"/>
+            </a:solidFill>
+          </a:ln>
+        </p:spPr>
+        <p:style>
+          <a:lnRef idx="2">
+            <a:schemeClr val="accent1">
+              <a:shade val="50000"/>
+            </a:schemeClr>
+          </a:lnRef>
+          <a:fillRef idx="1">
+            <a:schemeClr val="accent1"/>
+          </a:fillRef>
+          <a:effectRef idx="0">
+            <a:schemeClr val="accent1"/>
+          </a:effectRef>
+          <a:fontRef idx="minor">
+            <a:schemeClr val="lt1"/>
+          </a:fontRef>
+        </p:style>
+        <p:txBody>
+          <a:bodyPr rtlCol="0" anchor="ctr"/>
+          <a:lstStyle/>
+          <a:p>
+            <a:pPr algn="ctr"/>
+            <a:endParaRPr lang="pt-BR" sz="1600">
+              <a:solidFill>
+                <a:schemeClr val="bg1"/>
+              </a:solidFill>
+            </a:endParaRPr>
+          </a:p>
+        </p:txBody>
+      </p:sp>
+      <p:sp>
+        <p:nvSpPr>
+          <p:cNvPr id="41" name="CaixaDeTexto 40">
+            <a:extLst>
+              <a:ext uri="{FF2B5EF4-FFF2-40B4-BE49-F238E27FC236}">
+                <a16:creationId xmlns:a16="http://schemas.microsoft.com/office/drawing/2014/main" id="{AB210523-A675-44CC-8B0B-3F2E0F6BC1CC}"/>
+              </a:ext>
+            </a:extLst>
+          </p:cNvPr>
+          <p:cNvSpPr txBox="1"/>
+          <p:nvPr/>
+        </p:nvSpPr>
+        <p:spPr>
+          <a:xfrm>
+            <a:off x="718032" y="1934849"/>
+            <a:ext cx="2092526" cy="338554"/>
+          </a:xfrm>
+          <a:prstGeom prst="rect">
+            <a:avLst/>
+          </a:prstGeom>
+          <a:noFill/>
+        </p:spPr>
+        <p:txBody>
+          <a:bodyPr wrap="square" rtlCol="0">
+            <a:spAutoFit/>
+          </a:bodyPr>
+          <a:lstStyle/>
+          <a:p>
+            <a:r>
+              <a:rPr lang="pt-BR" sz="1600" b="1" dirty="0">
+                <a:solidFill>
+                  <a:schemeClr val="bg1"/>
+                </a:solidFill>
+              </a:rPr>
+              <a:t>Abrir Solicitação</a:t>
+            </a:r>
+          </a:p>
+        </p:txBody>
+      </p:sp>
+      <p:sp>
+        <p:nvSpPr>
+          <p:cNvPr id="30" name="CaixaDeTexto 29">
+            <a:extLst>
+              <a:ext uri="{FF2B5EF4-FFF2-40B4-BE49-F238E27FC236}">
+                <a16:creationId xmlns:a16="http://schemas.microsoft.com/office/drawing/2014/main" id="{04EED8AD-47F4-40B3-9734-63EE40B27142}"/>
+              </a:ext>
+            </a:extLst>
+          </p:cNvPr>
+          <p:cNvSpPr txBox="1"/>
+          <p:nvPr/>
+        </p:nvSpPr>
+        <p:spPr>
+          <a:xfrm>
+            <a:off x="701169" y="1491227"/>
+            <a:ext cx="1560935" cy="338554"/>
+          </a:xfrm>
+          <a:prstGeom prst="rect">
+            <a:avLst/>
+          </a:prstGeom>
+          <a:noFill/>
+        </p:spPr>
+        <p:txBody>
+          <a:bodyPr wrap="square" rtlCol="0">
+            <a:spAutoFit/>
+          </a:bodyPr>
+          <a:lstStyle/>
+          <a:p>
+            <a:r>
+              <a:rPr lang="pt-BR" sz="1600" b="1" dirty="0">
+                <a:solidFill>
+                  <a:srgbClr val="15292F"/>
+                </a:solidFill>
+              </a:rPr>
+              <a:t>Solicitações</a:t>
+            </a:r>
+          </a:p>
+        </p:txBody>
+      </p:sp>
+      <p:sp>
+        <p:nvSpPr>
+          <p:cNvPr id="43" name="Retângulo 42">
+            <a:extLst>
+              <a:ext uri="{FF2B5EF4-FFF2-40B4-BE49-F238E27FC236}">
+                <a16:creationId xmlns:a16="http://schemas.microsoft.com/office/drawing/2014/main" id="{18BB4F1B-D0B7-46A4-B716-3B3F296945D5}"/>
+              </a:ext>
+            </a:extLst>
+          </p:cNvPr>
+          <p:cNvSpPr/>
+          <p:nvPr/>
+        </p:nvSpPr>
+        <p:spPr>
+          <a:xfrm>
+            <a:off x="410921" y="1479474"/>
+            <a:ext cx="278428" cy="301627"/>
+          </a:xfrm>
+          <a:prstGeom prst="rect">
+            <a:avLst/>
+          </a:prstGeom>
+          <a:noFill/>
+          <a:ln w="41275">
+            <a:solidFill>
+              <a:srgbClr val="15292F"/>
+            </a:solidFill>
+          </a:ln>
+        </p:spPr>
+        <p:style>
+          <a:lnRef idx="2">
+            <a:schemeClr val="accent1">
+              <a:shade val="50000"/>
+            </a:schemeClr>
+          </a:lnRef>
+          <a:fillRef idx="1">
+            <a:schemeClr val="accent1"/>
+          </a:fillRef>
+          <a:effectRef idx="0">
+            <a:schemeClr val="accent1"/>
+          </a:effectRef>
+          <a:fontRef idx="minor">
+            <a:schemeClr val="lt1"/>
+          </a:fontRef>
+        </p:style>
+        <p:txBody>
+          <a:bodyPr rtlCol="0" anchor="ctr"/>
+          <a:lstStyle/>
+          <a:p>
+            <a:pPr algn="ctr"/>
+            <a:endParaRPr lang="pt-BR" sz="1600">
+              <a:solidFill>
+                <a:schemeClr val="bg1"/>
+              </a:solidFill>
+            </a:endParaRPr>
+          </a:p>
+        </p:txBody>
+      </p:sp>
+      <p:graphicFrame>
+        <p:nvGraphicFramePr>
+          <p:cNvPr id="15" name="Tabela 14">
+            <a:extLst>
+              <a:ext uri="{FF2B5EF4-FFF2-40B4-BE49-F238E27FC236}">
+                <a16:creationId xmlns:a16="http://schemas.microsoft.com/office/drawing/2014/main" id="{117C6A6B-EC6F-4DCE-B5FA-EE45DB5415F2}"/>
+              </a:ext>
+            </a:extLst>
+          </p:cNvPr>
+          <p:cNvGraphicFramePr>
+            <a:graphicFrameLocks noGrp="1"/>
+          </p:cNvGraphicFramePr>
+          <p:nvPr>
+            <p:extLst/>
+          </p:nvPr>
+        </p:nvGraphicFramePr>
+        <p:xfrm>
+          <a:off x="2748986" y="2112352"/>
+          <a:ext cx="8871255" cy="357907"/>
+        </p:xfrm>
+        <a:graphic>
+          <a:graphicData uri="http://schemas.openxmlformats.org/drawingml/2006/table">
+            <a:tbl>
+              <a:tblPr firstRow="1" bandRow="1">
+                <a:tableStyleId>{5C22544A-7EE6-4342-B048-85BDC9FD1C3A}</a:tableStyleId>
+              </a:tblPr>
+              <a:tblGrid>
+                <a:gridCol w="1105562">
+                  <a:extLst>
+                    <a:ext uri="{9D8B030D-6E8A-4147-A177-3AD203B41FA5}">
+                      <a16:colId xmlns:a16="http://schemas.microsoft.com/office/drawing/2014/main" val="1214311235"/>
+                    </a:ext>
+                  </a:extLst>
+                </a:gridCol>
+                <a:gridCol w="1097280">
+                  <a:extLst>
+                    <a:ext uri="{9D8B030D-6E8A-4147-A177-3AD203B41FA5}">
+                      <a16:colId xmlns:a16="http://schemas.microsoft.com/office/drawing/2014/main" val="567709411"/>
+                    </a:ext>
+                  </a:extLst>
+                </a:gridCol>
+                <a:gridCol w="1254036">
+                  <a:extLst>
+                    <a:ext uri="{9D8B030D-6E8A-4147-A177-3AD203B41FA5}">
+                      <a16:colId xmlns:a16="http://schemas.microsoft.com/office/drawing/2014/main" val="1287829829"/>
+                    </a:ext>
+                  </a:extLst>
+                </a:gridCol>
+                <a:gridCol w="1716259">
+                  <a:extLst>
+                    <a:ext uri="{9D8B030D-6E8A-4147-A177-3AD203B41FA5}">
+                      <a16:colId xmlns:a16="http://schemas.microsoft.com/office/drawing/2014/main" val="1577194061"/>
+                    </a:ext>
+                  </a:extLst>
+                </a:gridCol>
+                <a:gridCol w="1067132">
+                  <a:extLst>
+                    <a:ext uri="{9D8B030D-6E8A-4147-A177-3AD203B41FA5}">
+                      <a16:colId xmlns:a16="http://schemas.microsoft.com/office/drawing/2014/main" val="1426856637"/>
+                    </a:ext>
+                  </a:extLst>
+                </a:gridCol>
+                <a:gridCol w="1363664">
+                  <a:extLst>
+                    <a:ext uri="{9D8B030D-6E8A-4147-A177-3AD203B41FA5}">
+                      <a16:colId xmlns:a16="http://schemas.microsoft.com/office/drawing/2014/main" val="2960355438"/>
+                    </a:ext>
+                  </a:extLst>
+                </a:gridCol>
+                <a:gridCol w="1267322">
+                  <a:extLst>
+                    <a:ext uri="{9D8B030D-6E8A-4147-A177-3AD203B41FA5}">
+                      <a16:colId xmlns:a16="http://schemas.microsoft.com/office/drawing/2014/main" val="3684080775"/>
+                    </a:ext>
+                  </a:extLst>
+                </a:gridCol>
+              </a:tblGrid>
+              <a:tr h="357907">
+                <a:tc>
+                  <a:txBody>
+                    <a:bodyPr/>
+                    <a:lstStyle/>
+                    <a:p>
+                      <a:pPr algn="ctr"/>
+                      <a:r>
+                        <a:rPr lang="pt-BR" sz="1200" dirty="0"/>
+                        <a:t>Número</a:t>
+                      </a:r>
+                    </a:p>
+                  </a:txBody>
+                  <a:tcPr>
+                    <a:solidFill>
+                      <a:srgbClr val="15292F"/>
+                    </a:solidFill>
+                  </a:tcPr>
+                </a:tc>
+                <a:tc>
+                  <a:txBody>
+                    <a:bodyPr/>
+                    <a:lstStyle/>
+                    <a:p>
+                      <a:pPr algn="ctr"/>
+                      <a:r>
+                        <a:rPr lang="pt-BR" sz="1200" dirty="0"/>
+                        <a:t>Data Abertura</a:t>
+                      </a:r>
+                    </a:p>
+                  </a:txBody>
+                  <a:tcPr>
+                    <a:solidFill>
+                      <a:srgbClr val="15292F"/>
+                    </a:solidFill>
+                  </a:tcPr>
+                </a:tc>
+                <a:tc>
+                  <a:txBody>
+                    <a:bodyPr/>
+                    <a:lstStyle/>
+                    <a:p>
+                      <a:pPr algn="ctr"/>
+                      <a:r>
+                        <a:rPr lang="pt-BR" sz="1200" dirty="0"/>
+                        <a:t>Solicitante</a:t>
+                      </a:r>
+                    </a:p>
+                  </a:txBody>
+                  <a:tcPr>
+                    <a:solidFill>
+                      <a:srgbClr val="15292F"/>
+                    </a:solidFill>
+                  </a:tcPr>
+                </a:tc>
+                <a:tc>
+                  <a:txBody>
+                    <a:bodyPr/>
+                    <a:lstStyle/>
+                    <a:p>
+                      <a:pPr algn="ctr"/>
+                      <a:r>
+                        <a:rPr lang="pt-BR" sz="1200" dirty="0"/>
+                        <a:t>Prévia</a:t>
+                      </a:r>
+                    </a:p>
+                  </a:txBody>
+                  <a:tcPr>
+                    <a:solidFill>
+                      <a:srgbClr val="15292F"/>
+                    </a:solidFill>
+                  </a:tcPr>
+                </a:tc>
+                <a:tc>
+                  <a:txBody>
+                    <a:bodyPr/>
+                    <a:lstStyle/>
+                    <a:p>
+                      <a:pPr algn="ctr"/>
+                      <a:r>
+                        <a:rPr lang="pt-BR" sz="1200" dirty="0"/>
+                        <a:t>Status</a:t>
+                      </a:r>
+                    </a:p>
+                  </a:txBody>
+                  <a:tcPr>
+                    <a:solidFill>
+                      <a:srgbClr val="15292F"/>
+                    </a:solidFill>
+                  </a:tcPr>
+                </a:tc>
+                <a:tc>
+                  <a:txBody>
+                    <a:bodyPr/>
+                    <a:lstStyle/>
+                    <a:p>
+                      <a:pPr algn="ctr"/>
+                      <a:r>
+                        <a:rPr lang="pt-BR" sz="1200" dirty="0"/>
+                        <a:t>Data Previsão</a:t>
+                      </a:r>
+                    </a:p>
+                  </a:txBody>
+                  <a:tcPr>
+                    <a:solidFill>
+                      <a:srgbClr val="15292F"/>
+                    </a:solidFill>
+                  </a:tcPr>
+                </a:tc>
+                <a:tc>
+                  <a:txBody>
+                    <a:bodyPr/>
+                    <a:lstStyle/>
+                    <a:p>
+                      <a:pPr algn="ctr"/>
+                      <a:r>
+                        <a:rPr lang="pt-BR" sz="1200" dirty="0"/>
+                        <a:t>Data Conclusão</a:t>
+                      </a:r>
+                    </a:p>
+                  </a:txBody>
+                  <a:tcPr>
+                    <a:solidFill>
+                      <a:srgbClr val="15292F"/>
+                    </a:solidFill>
+                  </a:tcPr>
+                </a:tc>
+                <a:extLst>
+                  <a:ext uri="{0D108BD9-81ED-4DB2-BD59-A6C34878D82A}">
+                    <a16:rowId xmlns:a16="http://schemas.microsoft.com/office/drawing/2014/main" val="2023499912"/>
+                  </a:ext>
+                </a:extLst>
+              </a:tr>
+            </a:tbl>
+          </a:graphicData>
+        </a:graphic>
+      </p:graphicFrame>
+      <p:graphicFrame>
+        <p:nvGraphicFramePr>
+          <p:cNvPr id="44" name="Tabela 43">
+            <a:extLst>
+              <a:ext uri="{FF2B5EF4-FFF2-40B4-BE49-F238E27FC236}">
+                <a16:creationId xmlns:a16="http://schemas.microsoft.com/office/drawing/2014/main" id="{CD8E77BA-7B89-4B4D-9EA3-007B44B83737}"/>
+              </a:ext>
+            </a:extLst>
+          </p:cNvPr>
+          <p:cNvGraphicFramePr>
+            <a:graphicFrameLocks noGrp="1"/>
+          </p:cNvGraphicFramePr>
+          <p:nvPr>
+            <p:extLst>
+              <p:ext uri="{D42A27DB-BD31-4B8C-83A1-F6EECF244321}">
+                <p14:modId xmlns:p14="http://schemas.microsoft.com/office/powerpoint/2010/main" val="683231322"/>
+              </p:ext>
+            </p:extLst>
+          </p:nvPr>
+        </p:nvGraphicFramePr>
+        <p:xfrm>
+          <a:off x="2748985" y="2811907"/>
+          <a:ext cx="8871255" cy="357907"/>
+        </p:xfrm>
+        <a:graphic>
+          <a:graphicData uri="http://schemas.openxmlformats.org/drawingml/2006/table">
+            <a:tbl>
+              <a:tblPr firstRow="1" bandRow="1">
+                <a:tableStyleId>{5C22544A-7EE6-4342-B048-85BDC9FD1C3A}</a:tableStyleId>
+              </a:tblPr>
+              <a:tblGrid>
+                <a:gridCol w="1105563">
+                  <a:extLst>
+                    <a:ext uri="{9D8B030D-6E8A-4147-A177-3AD203B41FA5}">
+                      <a16:colId xmlns:a16="http://schemas.microsoft.com/office/drawing/2014/main" val="1214311235"/>
+                    </a:ext>
+                  </a:extLst>
+                </a:gridCol>
+                <a:gridCol w="1097280">
+                  <a:extLst>
+                    <a:ext uri="{9D8B030D-6E8A-4147-A177-3AD203B41FA5}">
+                      <a16:colId xmlns:a16="http://schemas.microsoft.com/office/drawing/2014/main" val="567709411"/>
+                    </a:ext>
+                  </a:extLst>
+                </a:gridCol>
+                <a:gridCol w="1254035">
+                  <a:extLst>
+                    <a:ext uri="{9D8B030D-6E8A-4147-A177-3AD203B41FA5}">
+                      <a16:colId xmlns:a16="http://schemas.microsoft.com/office/drawing/2014/main" val="1287829829"/>
+                    </a:ext>
+                  </a:extLst>
+                </a:gridCol>
+                <a:gridCol w="1716259">
+                  <a:extLst>
+                    <a:ext uri="{9D8B030D-6E8A-4147-A177-3AD203B41FA5}">
+                      <a16:colId xmlns:a16="http://schemas.microsoft.com/office/drawing/2014/main" val="1577194061"/>
+                    </a:ext>
+                  </a:extLst>
+                </a:gridCol>
+                <a:gridCol w="1081201">
+                  <a:extLst>
+                    <a:ext uri="{9D8B030D-6E8A-4147-A177-3AD203B41FA5}">
+                      <a16:colId xmlns:a16="http://schemas.microsoft.com/office/drawing/2014/main" val="1426856637"/>
+                    </a:ext>
+                  </a:extLst>
+                </a:gridCol>
+                <a:gridCol w="1349595">
+                  <a:extLst>
+                    <a:ext uri="{9D8B030D-6E8A-4147-A177-3AD203B41FA5}">
+                      <a16:colId xmlns:a16="http://schemas.microsoft.com/office/drawing/2014/main" val="2960355438"/>
+                    </a:ext>
+                  </a:extLst>
+                </a:gridCol>
+                <a:gridCol w="1267322">
+                  <a:extLst>
+                    <a:ext uri="{9D8B030D-6E8A-4147-A177-3AD203B41FA5}">
+                      <a16:colId xmlns:a16="http://schemas.microsoft.com/office/drawing/2014/main" val="3684080775"/>
+                    </a:ext>
+                  </a:extLst>
+                </a:gridCol>
+              </a:tblGrid>
+              <a:tr h="357907">
+                <a:tc>
+                  <a:txBody>
+                    <a:bodyPr/>
+                    <a:lstStyle/>
+                    <a:p>
+                      <a:pPr algn="ctr"/>
+                      <a:r>
+                        <a:rPr lang="pt-BR" sz="1200" dirty="0">
+                          <a:solidFill>
+                            <a:srgbClr val="15292F"/>
+                          </a:solidFill>
+                        </a:rPr>
+                        <a:t>0130122</a:t>
+                      </a:r>
+                    </a:p>
+                  </a:txBody>
+                  <a:tcPr>
+                    <a:solidFill>
+                      <a:srgbClr val="CFF9D4"/>
+                    </a:solidFill>
+                  </a:tcPr>
+                </a:tc>
+                <a:tc>
+                  <a:txBody>
+                    <a:bodyPr/>
+                    <a:lstStyle/>
+                    <a:p>
+                      <a:pPr algn="ctr"/>
+                      <a:r>
+                        <a:rPr lang="pt-BR" sz="1200" dirty="0">
+                          <a:solidFill>
+                            <a:srgbClr val="15292F"/>
+                          </a:solidFill>
+                        </a:rPr>
+                        <a:t>22/10/2018</a:t>
+                      </a:r>
+                    </a:p>
+                  </a:txBody>
+                  <a:tcPr>
+                    <a:solidFill>
+                      <a:srgbClr val="CFF9D4"/>
+                    </a:solidFill>
+                  </a:tcPr>
+                </a:tc>
+                <a:tc>
+                  <a:txBody>
+                    <a:bodyPr/>
+                    <a:lstStyle/>
+                    <a:p>
+                      <a:pPr algn="ctr"/>
+                      <a:r>
+                        <a:rPr lang="pt-BR" sz="1200" dirty="0">
+                          <a:solidFill>
+                            <a:srgbClr val="15292F"/>
+                          </a:solidFill>
+                        </a:rPr>
+                        <a:t>José Mauro</a:t>
+                      </a:r>
+                    </a:p>
+                  </a:txBody>
+                  <a:tcPr>
+                    <a:solidFill>
+                      <a:srgbClr val="CFF9D4"/>
+                    </a:solidFill>
+                  </a:tcPr>
+                </a:tc>
+                <a:tc>
+                  <a:txBody>
+                    <a:bodyPr/>
+                    <a:lstStyle/>
+                    <a:p>
+                      <a:pPr algn="ctr"/>
+                      <a:r>
+                        <a:rPr lang="pt-BR" sz="1200" dirty="0">
+                          <a:solidFill>
+                            <a:srgbClr val="15292F"/>
+                          </a:solidFill>
+                        </a:rPr>
+                        <a:t>Ao registrar um prod...</a:t>
+                      </a:r>
+                    </a:p>
+                  </a:txBody>
+                  <a:tcPr>
+                    <a:solidFill>
+                      <a:srgbClr val="CFF9D4"/>
+                    </a:solidFill>
+                  </a:tcPr>
+                </a:tc>
+                <a:tc>
+                  <a:txBody>
+                    <a:bodyPr/>
+                    <a:lstStyle/>
+                    <a:p>
+                      <a:pPr algn="ctr"/>
+                      <a:r>
+                        <a:rPr lang="pt-BR" sz="1200" dirty="0">
+                          <a:solidFill>
+                            <a:srgbClr val="15292F"/>
+                          </a:solidFill>
+                        </a:rPr>
+                        <a:t>Concluída</a:t>
+                      </a:r>
+                    </a:p>
+                  </a:txBody>
+                  <a:tcPr>
+                    <a:solidFill>
+                      <a:srgbClr val="CFF9D4"/>
+                    </a:solidFill>
+                  </a:tcPr>
+                </a:tc>
+                <a:tc>
+                  <a:txBody>
+                    <a:bodyPr/>
+                    <a:lstStyle/>
+                    <a:p>
+                      <a:pPr algn="ctr"/>
+                      <a:r>
+                        <a:rPr lang="pt-BR" sz="1200" dirty="0">
+                          <a:solidFill>
+                            <a:srgbClr val="15292F"/>
+                          </a:solidFill>
+                        </a:rPr>
+                        <a:t>22/10/2018</a:t>
+                      </a:r>
+                    </a:p>
+                  </a:txBody>
+                  <a:tcPr>
+                    <a:solidFill>
+                      <a:srgbClr val="CFF9D4"/>
+                    </a:solidFill>
+                  </a:tcPr>
+                </a:tc>
+                <a:tc>
+                  <a:txBody>
+                    <a:bodyPr/>
+                    <a:lstStyle/>
+                    <a:p>
+                      <a:pPr algn="ctr"/>
+                      <a:r>
+                        <a:rPr lang="pt-BR" sz="1200" dirty="0">
+                          <a:solidFill>
+                            <a:srgbClr val="15292F"/>
+                          </a:solidFill>
+                        </a:rPr>
+                        <a:t>22/10/2018</a:t>
+                      </a:r>
+                    </a:p>
+                  </a:txBody>
+                  <a:tcPr>
+                    <a:solidFill>
+                      <a:srgbClr val="CFF9D4"/>
+                    </a:solidFill>
+                  </a:tcPr>
+                </a:tc>
+                <a:extLst>
+                  <a:ext uri="{0D108BD9-81ED-4DB2-BD59-A6C34878D82A}">
+                    <a16:rowId xmlns:a16="http://schemas.microsoft.com/office/drawing/2014/main" val="2023499912"/>
+                  </a:ext>
+                </a:extLst>
+              </a:tr>
+            </a:tbl>
+          </a:graphicData>
+        </a:graphic>
+      </p:graphicFrame>
+      <p:graphicFrame>
+        <p:nvGraphicFramePr>
+          <p:cNvPr id="45" name="Tabela 44">
+            <a:extLst>
+              <a:ext uri="{FF2B5EF4-FFF2-40B4-BE49-F238E27FC236}">
+                <a16:creationId xmlns:a16="http://schemas.microsoft.com/office/drawing/2014/main" id="{9D6D05DA-BB1C-41D8-AFBD-A01D7A5C416B}"/>
+              </a:ext>
+            </a:extLst>
+          </p:cNvPr>
+          <p:cNvGraphicFramePr>
+            <a:graphicFrameLocks noGrp="1"/>
+          </p:cNvGraphicFramePr>
+          <p:nvPr>
+            <p:extLst>
+              <p:ext uri="{D42A27DB-BD31-4B8C-83A1-F6EECF244321}">
+                <p14:modId xmlns:p14="http://schemas.microsoft.com/office/powerpoint/2010/main" val="2910043906"/>
+              </p:ext>
+            </p:extLst>
+          </p:nvPr>
+        </p:nvGraphicFramePr>
+        <p:xfrm>
+          <a:off x="2748985" y="3291199"/>
+          <a:ext cx="8871255" cy="357907"/>
+        </p:xfrm>
+        <a:graphic>
+          <a:graphicData uri="http://schemas.openxmlformats.org/drawingml/2006/table">
+            <a:tbl>
+              <a:tblPr firstRow="1" bandRow="1">
+                <a:tableStyleId>{5C22544A-7EE6-4342-B048-85BDC9FD1C3A}</a:tableStyleId>
+              </a:tblPr>
+              <a:tblGrid>
+                <a:gridCol w="1105563">
+                  <a:extLst>
+                    <a:ext uri="{9D8B030D-6E8A-4147-A177-3AD203B41FA5}">
+                      <a16:colId xmlns:a16="http://schemas.microsoft.com/office/drawing/2014/main" val="1214311235"/>
+                    </a:ext>
+                  </a:extLst>
+                </a:gridCol>
+                <a:gridCol w="1097280">
+                  <a:extLst>
+                    <a:ext uri="{9D8B030D-6E8A-4147-A177-3AD203B41FA5}">
+                      <a16:colId xmlns:a16="http://schemas.microsoft.com/office/drawing/2014/main" val="567709411"/>
+                    </a:ext>
+                  </a:extLst>
+                </a:gridCol>
+                <a:gridCol w="1254035">
+                  <a:extLst>
+                    <a:ext uri="{9D8B030D-6E8A-4147-A177-3AD203B41FA5}">
+                      <a16:colId xmlns:a16="http://schemas.microsoft.com/office/drawing/2014/main" val="1287829829"/>
+                    </a:ext>
+                  </a:extLst>
+                </a:gridCol>
+                <a:gridCol w="1716259">
+                  <a:extLst>
+                    <a:ext uri="{9D8B030D-6E8A-4147-A177-3AD203B41FA5}">
+                      <a16:colId xmlns:a16="http://schemas.microsoft.com/office/drawing/2014/main" val="1577194061"/>
+                    </a:ext>
+                  </a:extLst>
+                </a:gridCol>
+                <a:gridCol w="1081201">
+                  <a:extLst>
+                    <a:ext uri="{9D8B030D-6E8A-4147-A177-3AD203B41FA5}">
+                      <a16:colId xmlns:a16="http://schemas.microsoft.com/office/drawing/2014/main" val="1426856637"/>
+                    </a:ext>
+                  </a:extLst>
+                </a:gridCol>
+                <a:gridCol w="1349595">
+                  <a:extLst>
+                    <a:ext uri="{9D8B030D-6E8A-4147-A177-3AD203B41FA5}">
+                      <a16:colId xmlns:a16="http://schemas.microsoft.com/office/drawing/2014/main" val="2960355438"/>
+                    </a:ext>
+                  </a:extLst>
+                </a:gridCol>
+                <a:gridCol w="1267322">
+                  <a:extLst>
+                    <a:ext uri="{9D8B030D-6E8A-4147-A177-3AD203B41FA5}">
+                      <a16:colId xmlns:a16="http://schemas.microsoft.com/office/drawing/2014/main" val="3684080775"/>
+                    </a:ext>
+                  </a:extLst>
+                </a:gridCol>
+              </a:tblGrid>
+              <a:tr h="357907">
+                <a:tc>
+                  <a:txBody>
+                    <a:bodyPr/>
+                    <a:lstStyle/>
+                    <a:p>
+                      <a:pPr algn="ctr"/>
+                      <a:r>
+                        <a:rPr lang="pt-BR" sz="1200" dirty="0">
+                          <a:solidFill>
+                            <a:srgbClr val="15292F"/>
+                          </a:solidFill>
+                        </a:rPr>
+                        <a:t>0130222</a:t>
+                      </a:r>
+                    </a:p>
+                  </a:txBody>
+                  <a:tcPr>
+                    <a:solidFill>
+                      <a:srgbClr val="CFF9D4"/>
+                    </a:solidFill>
+                  </a:tcPr>
+                </a:tc>
+                <a:tc>
+                  <a:txBody>
+                    <a:bodyPr/>
+                    <a:lstStyle/>
+                    <a:p>
+                      <a:pPr algn="ctr"/>
+                      <a:r>
+                        <a:rPr lang="pt-BR" sz="1200" dirty="0">
+                          <a:solidFill>
+                            <a:srgbClr val="15292F"/>
+                          </a:solidFill>
+                        </a:rPr>
+                        <a:t>22/10/2018</a:t>
+                      </a:r>
+                    </a:p>
+                  </a:txBody>
+                  <a:tcPr>
+                    <a:solidFill>
+                      <a:srgbClr val="CFF9D4"/>
+                    </a:solidFill>
+                  </a:tcPr>
+                </a:tc>
+                <a:tc>
+                  <a:txBody>
+                    <a:bodyPr/>
+                    <a:lstStyle/>
+                    <a:p>
+                      <a:pPr algn="ctr"/>
+                      <a:r>
+                        <a:rPr lang="pt-BR" sz="1200" dirty="0">
+                          <a:solidFill>
+                            <a:srgbClr val="15292F"/>
+                          </a:solidFill>
+                        </a:rPr>
+                        <a:t>Ana Maria</a:t>
+                      </a:r>
+                    </a:p>
+                  </a:txBody>
+                  <a:tcPr>
+                    <a:solidFill>
+                      <a:srgbClr val="CFF9D4"/>
+                    </a:solidFill>
+                  </a:tcPr>
+                </a:tc>
+                <a:tc>
+                  <a:txBody>
+                    <a:bodyPr/>
+                    <a:lstStyle/>
+                    <a:p>
+                      <a:pPr algn="ctr"/>
+                      <a:r>
+                        <a:rPr lang="pt-BR" sz="1200" dirty="0">
+                          <a:solidFill>
+                            <a:srgbClr val="15292F"/>
+                          </a:solidFill>
+                        </a:rPr>
+                        <a:t>Ao registrar um prod...</a:t>
+                      </a:r>
+                    </a:p>
+                  </a:txBody>
+                  <a:tcPr>
+                    <a:solidFill>
+                      <a:srgbClr val="CFF9D4"/>
+                    </a:solidFill>
+                  </a:tcPr>
+                </a:tc>
+                <a:tc>
+                  <a:txBody>
+                    <a:bodyPr/>
+                    <a:lstStyle/>
+                    <a:p>
+                      <a:pPr algn="ctr"/>
+                      <a:r>
+                        <a:rPr lang="pt-BR" sz="1200" dirty="0">
+                          <a:solidFill>
+                            <a:srgbClr val="15292F"/>
+                          </a:solidFill>
+                        </a:rPr>
+                        <a:t>Concluída</a:t>
+                      </a:r>
+                    </a:p>
+                  </a:txBody>
+                  <a:tcPr>
+                    <a:solidFill>
+                      <a:srgbClr val="CFF9D4"/>
+                    </a:solidFill>
+                  </a:tcPr>
+                </a:tc>
+                <a:tc>
+                  <a:txBody>
+                    <a:bodyPr/>
+                    <a:lstStyle/>
+                    <a:p>
+                      <a:pPr algn="ctr"/>
+                      <a:r>
+                        <a:rPr lang="pt-BR" sz="1200" dirty="0">
+                          <a:solidFill>
+                            <a:srgbClr val="15292F"/>
+                          </a:solidFill>
+                        </a:rPr>
+                        <a:t>22/10/2018</a:t>
+                      </a:r>
+                    </a:p>
+                  </a:txBody>
+                  <a:tcPr>
+                    <a:solidFill>
+                      <a:srgbClr val="CFF9D4"/>
+                    </a:solidFill>
+                  </a:tcPr>
+                </a:tc>
+                <a:tc>
+                  <a:txBody>
+                    <a:bodyPr/>
+                    <a:lstStyle/>
+                    <a:p>
+                      <a:pPr algn="ctr"/>
+                      <a:r>
+                        <a:rPr lang="pt-BR" sz="1200" dirty="0">
+                          <a:solidFill>
+                            <a:srgbClr val="15292F"/>
+                          </a:solidFill>
+                        </a:rPr>
+                        <a:t>22/10/2018</a:t>
+                      </a:r>
+                    </a:p>
+                  </a:txBody>
+                  <a:tcPr>
+                    <a:solidFill>
+                      <a:srgbClr val="CFF9D4"/>
+                    </a:solidFill>
+                  </a:tcPr>
+                </a:tc>
+                <a:extLst>
+                  <a:ext uri="{0D108BD9-81ED-4DB2-BD59-A6C34878D82A}">
+                    <a16:rowId xmlns:a16="http://schemas.microsoft.com/office/drawing/2014/main" val="2023499912"/>
+                  </a:ext>
+                </a:extLst>
+              </a:tr>
+            </a:tbl>
+          </a:graphicData>
+        </a:graphic>
+      </p:graphicFrame>
+      <p:graphicFrame>
+        <p:nvGraphicFramePr>
+          <p:cNvPr id="46" name="Tabela 45">
+            <a:extLst>
+              <a:ext uri="{FF2B5EF4-FFF2-40B4-BE49-F238E27FC236}">
+                <a16:creationId xmlns:a16="http://schemas.microsoft.com/office/drawing/2014/main" id="{B7DB588C-0757-4A4E-A0BC-3B95756BD2E6}"/>
+              </a:ext>
+            </a:extLst>
+          </p:cNvPr>
+          <p:cNvGraphicFramePr>
+            <a:graphicFrameLocks noGrp="1"/>
+          </p:cNvGraphicFramePr>
+          <p:nvPr>
+            <p:extLst>
+              <p:ext uri="{D42A27DB-BD31-4B8C-83A1-F6EECF244321}">
+                <p14:modId xmlns:p14="http://schemas.microsoft.com/office/powerpoint/2010/main" val="3619853841"/>
+              </p:ext>
+            </p:extLst>
+          </p:nvPr>
+        </p:nvGraphicFramePr>
+        <p:xfrm>
+          <a:off x="2748985" y="3770491"/>
+          <a:ext cx="8871255" cy="357907"/>
+        </p:xfrm>
+        <a:graphic>
+          <a:graphicData uri="http://schemas.openxmlformats.org/drawingml/2006/table">
+            <a:tbl>
+              <a:tblPr firstRow="1" bandRow="1">
+                <a:tableStyleId>{5C22544A-7EE6-4342-B048-85BDC9FD1C3A}</a:tableStyleId>
+              </a:tblPr>
+              <a:tblGrid>
+                <a:gridCol w="1105563">
+                  <a:extLst>
+                    <a:ext uri="{9D8B030D-6E8A-4147-A177-3AD203B41FA5}">
+                      <a16:colId xmlns:a16="http://schemas.microsoft.com/office/drawing/2014/main" val="1214311235"/>
+                    </a:ext>
+                  </a:extLst>
+                </a:gridCol>
+                <a:gridCol w="1097280">
+                  <a:extLst>
+                    <a:ext uri="{9D8B030D-6E8A-4147-A177-3AD203B41FA5}">
+                      <a16:colId xmlns:a16="http://schemas.microsoft.com/office/drawing/2014/main" val="567709411"/>
+                    </a:ext>
+                  </a:extLst>
+                </a:gridCol>
+                <a:gridCol w="1254035">
+                  <a:extLst>
+                    <a:ext uri="{9D8B030D-6E8A-4147-A177-3AD203B41FA5}">
+                      <a16:colId xmlns:a16="http://schemas.microsoft.com/office/drawing/2014/main" val="1287829829"/>
+                    </a:ext>
+                  </a:extLst>
+                </a:gridCol>
+                <a:gridCol w="1716259">
+                  <a:extLst>
+                    <a:ext uri="{9D8B030D-6E8A-4147-A177-3AD203B41FA5}">
+                      <a16:colId xmlns:a16="http://schemas.microsoft.com/office/drawing/2014/main" val="1577194061"/>
+                    </a:ext>
+                  </a:extLst>
+                </a:gridCol>
+                <a:gridCol w="1081201">
+                  <a:extLst>
+                    <a:ext uri="{9D8B030D-6E8A-4147-A177-3AD203B41FA5}">
+                      <a16:colId xmlns:a16="http://schemas.microsoft.com/office/drawing/2014/main" val="1426856637"/>
+                    </a:ext>
+                  </a:extLst>
+                </a:gridCol>
+                <a:gridCol w="1349595">
+                  <a:extLst>
+                    <a:ext uri="{9D8B030D-6E8A-4147-A177-3AD203B41FA5}">
+                      <a16:colId xmlns:a16="http://schemas.microsoft.com/office/drawing/2014/main" val="2960355438"/>
+                    </a:ext>
+                  </a:extLst>
+                </a:gridCol>
+                <a:gridCol w="1267322">
+                  <a:extLst>
+                    <a:ext uri="{9D8B030D-6E8A-4147-A177-3AD203B41FA5}">
+                      <a16:colId xmlns:a16="http://schemas.microsoft.com/office/drawing/2014/main" val="3684080775"/>
+                    </a:ext>
+                  </a:extLst>
+                </a:gridCol>
+              </a:tblGrid>
+              <a:tr h="357907">
+                <a:tc>
+                  <a:txBody>
+                    <a:bodyPr/>
+                    <a:lstStyle/>
+                    <a:p>
+                      <a:pPr algn="ctr"/>
+                      <a:r>
+                        <a:rPr lang="pt-BR" sz="1200" dirty="0">
+                          <a:solidFill>
+                            <a:srgbClr val="15292F"/>
+                          </a:solidFill>
+                        </a:rPr>
+                        <a:t>0130120</a:t>
+                      </a:r>
+                    </a:p>
+                  </a:txBody>
+                  <a:tcPr>
+                    <a:solidFill>
+                      <a:srgbClr val="CFF9D4"/>
+                    </a:solidFill>
+                  </a:tcPr>
+                </a:tc>
+                <a:tc>
+                  <a:txBody>
+                    <a:bodyPr/>
+                    <a:lstStyle/>
+                    <a:p>
+                      <a:pPr algn="ctr"/>
+                      <a:r>
+                        <a:rPr lang="pt-BR" sz="1200" dirty="0">
+                          <a:solidFill>
+                            <a:srgbClr val="15292F"/>
+                          </a:solidFill>
+                        </a:rPr>
+                        <a:t>20/10/2018</a:t>
+                      </a:r>
+                    </a:p>
+                  </a:txBody>
+                  <a:tcPr>
+                    <a:solidFill>
+                      <a:srgbClr val="CFF9D4"/>
+                    </a:solidFill>
+                  </a:tcPr>
+                </a:tc>
+                <a:tc>
+                  <a:txBody>
+                    <a:bodyPr/>
+                    <a:lstStyle/>
+                    <a:p>
+                      <a:pPr algn="ctr"/>
+                      <a:r>
+                        <a:rPr lang="pt-BR" sz="1200" dirty="0">
+                          <a:solidFill>
+                            <a:srgbClr val="15292F"/>
+                          </a:solidFill>
+                        </a:rPr>
+                        <a:t>Paula</a:t>
+                      </a:r>
+                    </a:p>
+                  </a:txBody>
+                  <a:tcPr>
+                    <a:solidFill>
+                      <a:srgbClr val="CFF9D4"/>
+                    </a:solidFill>
+                  </a:tcPr>
+                </a:tc>
+                <a:tc>
+                  <a:txBody>
+                    <a:bodyPr/>
+                    <a:lstStyle/>
+                    <a:p>
+                      <a:pPr algn="ctr"/>
+                      <a:r>
+                        <a:rPr lang="pt-BR" sz="1200" dirty="0">
+                          <a:solidFill>
+                            <a:srgbClr val="15292F"/>
+                          </a:solidFill>
+                        </a:rPr>
+                        <a:t>Como faço para...</a:t>
+                      </a:r>
+                    </a:p>
+                  </a:txBody>
+                  <a:tcPr>
+                    <a:solidFill>
+                      <a:srgbClr val="CFF9D4"/>
+                    </a:solidFill>
+                  </a:tcPr>
+                </a:tc>
+                <a:tc>
+                  <a:txBody>
+                    <a:bodyPr/>
+                    <a:lstStyle/>
+                    <a:p>
+                      <a:pPr algn="ctr"/>
+                      <a:r>
+                        <a:rPr lang="pt-BR" sz="1200" dirty="0">
+                          <a:solidFill>
+                            <a:srgbClr val="15292F"/>
+                          </a:solidFill>
+                        </a:rPr>
+                        <a:t>Concluída</a:t>
+                      </a:r>
+                    </a:p>
+                  </a:txBody>
+                  <a:tcPr>
+                    <a:solidFill>
+                      <a:srgbClr val="CFF9D4"/>
+                    </a:solidFill>
+                  </a:tcPr>
+                </a:tc>
+                <a:tc>
+                  <a:txBody>
+                    <a:bodyPr/>
+                    <a:lstStyle/>
+                    <a:p>
+                      <a:pPr algn="ctr"/>
+                      <a:r>
+                        <a:rPr lang="pt-BR" sz="1200" dirty="0">
+                          <a:solidFill>
+                            <a:srgbClr val="15292F"/>
+                          </a:solidFill>
+                        </a:rPr>
+                        <a:t>21/10/2018</a:t>
+                      </a:r>
+                    </a:p>
+                  </a:txBody>
+                  <a:tcPr>
+                    <a:solidFill>
+                      <a:srgbClr val="CFF9D4"/>
+                    </a:solidFill>
+                  </a:tcPr>
+                </a:tc>
+                <a:tc>
+                  <a:txBody>
+                    <a:bodyPr/>
+                    <a:lstStyle/>
+                    <a:p>
+                      <a:pPr algn="ctr"/>
+                      <a:r>
+                        <a:rPr lang="pt-BR" sz="1200" dirty="0">
+                          <a:solidFill>
+                            <a:srgbClr val="15292F"/>
+                          </a:solidFill>
+                        </a:rPr>
+                        <a:t>21/10/2018</a:t>
+                      </a:r>
+                    </a:p>
+                  </a:txBody>
+                  <a:tcPr>
+                    <a:solidFill>
+                      <a:srgbClr val="CFF9D4"/>
+                    </a:solidFill>
+                  </a:tcPr>
+                </a:tc>
+                <a:extLst>
+                  <a:ext uri="{0D108BD9-81ED-4DB2-BD59-A6C34878D82A}">
+                    <a16:rowId xmlns:a16="http://schemas.microsoft.com/office/drawing/2014/main" val="2023499912"/>
+                  </a:ext>
+                </a:extLst>
+              </a:tr>
+            </a:tbl>
+          </a:graphicData>
+        </a:graphic>
+      </p:graphicFrame>
+      <p:graphicFrame>
+        <p:nvGraphicFramePr>
+          <p:cNvPr id="31" name="Tabela 30">
+            <a:extLst>
+              <a:ext uri="{FF2B5EF4-FFF2-40B4-BE49-F238E27FC236}">
+                <a16:creationId xmlns:a16="http://schemas.microsoft.com/office/drawing/2014/main" id="{E99872EE-53E2-466C-B9CD-5D3C30C64C84}"/>
+              </a:ext>
+            </a:extLst>
+          </p:cNvPr>
+          <p:cNvGraphicFramePr>
+            <a:graphicFrameLocks noGrp="1"/>
+          </p:cNvGraphicFramePr>
+          <p:nvPr>
+            <p:extLst>
+              <p:ext uri="{D42A27DB-BD31-4B8C-83A1-F6EECF244321}">
+                <p14:modId xmlns:p14="http://schemas.microsoft.com/office/powerpoint/2010/main" val="3637777765"/>
+              </p:ext>
+            </p:extLst>
+          </p:nvPr>
+        </p:nvGraphicFramePr>
+        <p:xfrm>
+          <a:off x="2736917" y="4263903"/>
+          <a:ext cx="8871255" cy="357907"/>
+        </p:xfrm>
+        <a:graphic>
+          <a:graphicData uri="http://schemas.openxmlformats.org/drawingml/2006/table">
+            <a:tbl>
+              <a:tblPr firstRow="1" bandRow="1">
+                <a:tableStyleId>{5C22544A-7EE6-4342-B048-85BDC9FD1C3A}</a:tableStyleId>
+              </a:tblPr>
+              <a:tblGrid>
+                <a:gridCol w="1105563">
+                  <a:extLst>
+                    <a:ext uri="{9D8B030D-6E8A-4147-A177-3AD203B41FA5}">
+                      <a16:colId xmlns:a16="http://schemas.microsoft.com/office/drawing/2014/main" val="1214311235"/>
+                    </a:ext>
+                  </a:extLst>
+                </a:gridCol>
+                <a:gridCol w="1097280">
+                  <a:extLst>
+                    <a:ext uri="{9D8B030D-6E8A-4147-A177-3AD203B41FA5}">
+                      <a16:colId xmlns:a16="http://schemas.microsoft.com/office/drawing/2014/main" val="567709411"/>
+                    </a:ext>
+                  </a:extLst>
+                </a:gridCol>
+                <a:gridCol w="1254035">
+                  <a:extLst>
+                    <a:ext uri="{9D8B030D-6E8A-4147-A177-3AD203B41FA5}">
+                      <a16:colId xmlns:a16="http://schemas.microsoft.com/office/drawing/2014/main" val="1287829829"/>
+                    </a:ext>
+                  </a:extLst>
+                </a:gridCol>
+                <a:gridCol w="1716259">
+                  <a:extLst>
+                    <a:ext uri="{9D8B030D-6E8A-4147-A177-3AD203B41FA5}">
+                      <a16:colId xmlns:a16="http://schemas.microsoft.com/office/drawing/2014/main" val="1577194061"/>
+                    </a:ext>
+                  </a:extLst>
+                </a:gridCol>
+                <a:gridCol w="1081201">
+                  <a:extLst>
+                    <a:ext uri="{9D8B030D-6E8A-4147-A177-3AD203B41FA5}">
+                      <a16:colId xmlns:a16="http://schemas.microsoft.com/office/drawing/2014/main" val="1426856637"/>
+                    </a:ext>
+                  </a:extLst>
+                </a:gridCol>
+                <a:gridCol w="1349595">
+                  <a:extLst>
+                    <a:ext uri="{9D8B030D-6E8A-4147-A177-3AD203B41FA5}">
+                      <a16:colId xmlns:a16="http://schemas.microsoft.com/office/drawing/2014/main" val="2960355438"/>
+                    </a:ext>
+                  </a:extLst>
+                </a:gridCol>
+                <a:gridCol w="1267322">
+                  <a:extLst>
+                    <a:ext uri="{9D8B030D-6E8A-4147-A177-3AD203B41FA5}">
+                      <a16:colId xmlns:a16="http://schemas.microsoft.com/office/drawing/2014/main" val="3684080775"/>
+                    </a:ext>
+                  </a:extLst>
+                </a:gridCol>
+              </a:tblGrid>
+              <a:tr h="357907">
+                <a:tc>
+                  <a:txBody>
+                    <a:bodyPr/>
+                    <a:lstStyle/>
+                    <a:p>
+                      <a:pPr algn="ctr"/>
+                      <a:r>
+                        <a:rPr lang="pt-BR" sz="1200" dirty="0">
+                          <a:solidFill>
+                            <a:srgbClr val="15292F"/>
+                          </a:solidFill>
+                        </a:rPr>
+                        <a:t>0130119</a:t>
+                      </a:r>
+                    </a:p>
+                  </a:txBody>
+                  <a:tcPr>
+                    <a:solidFill>
+                      <a:srgbClr val="CFF9D4"/>
+                    </a:solidFill>
+                  </a:tcPr>
+                </a:tc>
+                <a:tc>
+                  <a:txBody>
+                    <a:bodyPr/>
+                    <a:lstStyle/>
+                    <a:p>
+                      <a:pPr algn="ctr"/>
+                      <a:r>
+                        <a:rPr lang="pt-BR" sz="1200" dirty="0">
+                          <a:solidFill>
+                            <a:srgbClr val="15292F"/>
+                          </a:solidFill>
+                        </a:rPr>
+                        <a:t>19/10/2018</a:t>
+                      </a:r>
+                    </a:p>
+                  </a:txBody>
+                  <a:tcPr>
+                    <a:solidFill>
+                      <a:srgbClr val="CFF9D4"/>
+                    </a:solidFill>
+                  </a:tcPr>
+                </a:tc>
+                <a:tc>
+                  <a:txBody>
+                    <a:bodyPr/>
+                    <a:lstStyle/>
+                    <a:p>
+                      <a:pPr algn="ctr"/>
+                      <a:r>
+                        <a:rPr lang="pt-BR" sz="1200" dirty="0">
+                          <a:solidFill>
+                            <a:srgbClr val="15292F"/>
+                          </a:solidFill>
+                        </a:rPr>
+                        <a:t>Paula</a:t>
+                      </a:r>
+                    </a:p>
+                  </a:txBody>
+                  <a:tcPr>
+                    <a:solidFill>
+                      <a:srgbClr val="CFF9D4"/>
+                    </a:solidFill>
+                  </a:tcPr>
+                </a:tc>
+                <a:tc>
+                  <a:txBody>
+                    <a:bodyPr/>
+                    <a:lstStyle/>
+                    <a:p>
+                      <a:pPr algn="ctr"/>
+                      <a:r>
+                        <a:rPr lang="pt-BR" sz="1200" dirty="0">
+                          <a:solidFill>
+                            <a:srgbClr val="15292F"/>
+                          </a:solidFill>
+                        </a:rPr>
+                        <a:t>Não estou </a:t>
+                      </a:r>
+                      <a:r>
+                        <a:rPr lang="pt-BR" sz="1200" dirty="0" err="1">
+                          <a:solidFill>
+                            <a:srgbClr val="15292F"/>
+                          </a:solidFill>
+                        </a:rPr>
+                        <a:t>conse</a:t>
+                      </a:r>
+                      <a:r>
+                        <a:rPr lang="pt-BR" sz="1200" dirty="0">
+                          <a:solidFill>
+                            <a:srgbClr val="15292F"/>
+                          </a:solidFill>
+                        </a:rPr>
+                        <a:t>...</a:t>
+                      </a:r>
+                    </a:p>
+                  </a:txBody>
+                  <a:tcPr>
+                    <a:solidFill>
+                      <a:srgbClr val="CFF9D4"/>
+                    </a:solidFill>
+                  </a:tcPr>
+                </a:tc>
+                <a:tc>
+                  <a:txBody>
+                    <a:bodyPr/>
+                    <a:lstStyle/>
+                    <a:p>
+                      <a:pPr algn="ctr"/>
+                      <a:r>
+                        <a:rPr lang="pt-BR" sz="1200" dirty="0">
+                          <a:solidFill>
+                            <a:srgbClr val="15292F"/>
+                          </a:solidFill>
+                        </a:rPr>
+                        <a:t>Concluída</a:t>
+                      </a:r>
+                    </a:p>
+                  </a:txBody>
+                  <a:tcPr>
+                    <a:solidFill>
+                      <a:srgbClr val="CFF9D4"/>
+                    </a:solidFill>
+                  </a:tcPr>
+                </a:tc>
+                <a:tc>
+                  <a:txBody>
+                    <a:bodyPr/>
+                    <a:lstStyle/>
+                    <a:p>
+                      <a:pPr algn="ctr"/>
+                      <a:r>
+                        <a:rPr lang="pt-BR" sz="1200" dirty="0">
+                          <a:solidFill>
+                            <a:srgbClr val="15292F"/>
+                          </a:solidFill>
+                        </a:rPr>
+                        <a:t>20/10/2018</a:t>
+                      </a:r>
+                    </a:p>
+                  </a:txBody>
+                  <a:tcPr>
+                    <a:solidFill>
+                      <a:srgbClr val="CFF9D4"/>
+                    </a:solidFill>
+                  </a:tcPr>
+                </a:tc>
+                <a:tc>
+                  <a:txBody>
+                    <a:bodyPr/>
+                    <a:lstStyle/>
+                    <a:p>
+                      <a:pPr algn="ctr"/>
+                      <a:r>
+                        <a:rPr lang="pt-BR" sz="1200" dirty="0">
+                          <a:solidFill>
+                            <a:srgbClr val="15292F"/>
+                          </a:solidFill>
+                        </a:rPr>
+                        <a:t>20/10/2018</a:t>
+                      </a:r>
+                    </a:p>
+                  </a:txBody>
+                  <a:tcPr>
+                    <a:solidFill>
+                      <a:srgbClr val="CFF9D4"/>
+                    </a:solidFill>
+                  </a:tcPr>
+                </a:tc>
+                <a:extLst>
+                  <a:ext uri="{0D108BD9-81ED-4DB2-BD59-A6C34878D82A}">
+                    <a16:rowId xmlns:a16="http://schemas.microsoft.com/office/drawing/2014/main" val="2023499912"/>
+                  </a:ext>
+                </a:extLst>
+              </a:tr>
+            </a:tbl>
+          </a:graphicData>
+        </a:graphic>
+      </p:graphicFrame>
+      <p:sp>
+        <p:nvSpPr>
+          <p:cNvPr id="2" name="Elipse 1">
+            <a:extLst>
+              <a:ext uri="{FF2B5EF4-FFF2-40B4-BE49-F238E27FC236}">
+                <a16:creationId xmlns:a16="http://schemas.microsoft.com/office/drawing/2014/main" id="{21BB156D-A3FC-47C4-B6A7-D6BDB0264E4A}"/>
+              </a:ext>
+            </a:extLst>
+          </p:cNvPr>
+          <p:cNvSpPr/>
+          <p:nvPr/>
+        </p:nvSpPr>
+        <p:spPr>
+          <a:xfrm>
+            <a:off x="3999073" y="1752965"/>
+            <a:ext cx="144537" cy="141880"/>
+          </a:xfrm>
+          <a:prstGeom prst="ellipse">
+            <a:avLst/>
+          </a:prstGeom>
+          <a:solidFill>
+            <a:schemeClr val="bg1"/>
+          </a:solidFill>
+          <a:ln>
+            <a:solidFill>
+              <a:srgbClr val="15292F"/>
+            </a:solidFill>
+          </a:ln>
+        </p:spPr>
+        <p:style>
+          <a:lnRef idx="2">
+            <a:schemeClr val="accent1">
+              <a:shade val="50000"/>
+            </a:schemeClr>
+          </a:lnRef>
+          <a:fillRef idx="1">
+            <a:schemeClr val="accent1"/>
+          </a:fillRef>
+          <a:effectRef idx="0">
+            <a:schemeClr val="accent1"/>
+          </a:effectRef>
+          <a:fontRef idx="minor">
+            <a:schemeClr val="lt1"/>
+          </a:fontRef>
+        </p:style>
+        <p:txBody>
+          <a:bodyPr rtlCol="0" anchor="ctr"/>
+          <a:lstStyle/>
+          <a:p>
+            <a:pPr algn="ctr"/>
+            <a:endParaRPr lang="pt-BR"/>
+          </a:p>
+        </p:txBody>
+      </p:sp>
+      <p:sp>
+        <p:nvSpPr>
+          <p:cNvPr id="38" name="CaixaDeTexto 37">
+            <a:extLst>
+              <a:ext uri="{FF2B5EF4-FFF2-40B4-BE49-F238E27FC236}">
+                <a16:creationId xmlns:a16="http://schemas.microsoft.com/office/drawing/2014/main" id="{261427F6-9B23-4227-B108-E9315148FC4D}"/>
+              </a:ext>
+            </a:extLst>
+          </p:cNvPr>
+          <p:cNvSpPr txBox="1"/>
+          <p:nvPr/>
+        </p:nvSpPr>
+        <p:spPr>
+          <a:xfrm>
+            <a:off x="4177233" y="1643654"/>
+            <a:ext cx="2113258" cy="369332"/>
+          </a:xfrm>
+          <a:prstGeom prst="rect">
+            <a:avLst/>
+          </a:prstGeom>
+          <a:noFill/>
+        </p:spPr>
+        <p:txBody>
+          <a:bodyPr wrap="square" rtlCol="0">
+            <a:spAutoFit/>
+          </a:bodyPr>
+          <a:lstStyle/>
+          <a:p>
+            <a:r>
+              <a:rPr lang="pt-BR" dirty="0"/>
+              <a:t>Aberta</a:t>
+            </a:r>
+          </a:p>
+        </p:txBody>
+      </p:sp>
+      <p:sp>
+        <p:nvSpPr>
+          <p:cNvPr id="42" name="Elipse 41">
+            <a:extLst>
+              <a:ext uri="{FF2B5EF4-FFF2-40B4-BE49-F238E27FC236}">
+                <a16:creationId xmlns:a16="http://schemas.microsoft.com/office/drawing/2014/main" id="{8A528765-1CCD-40DB-A53A-DAA83769AB0C}"/>
+              </a:ext>
+            </a:extLst>
+          </p:cNvPr>
+          <p:cNvSpPr/>
+          <p:nvPr/>
+        </p:nvSpPr>
+        <p:spPr>
+          <a:xfrm>
+            <a:off x="5176111" y="1764317"/>
+            <a:ext cx="144537" cy="141880"/>
+          </a:xfrm>
+          <a:prstGeom prst="ellipse">
+            <a:avLst/>
+          </a:prstGeom>
+          <a:solidFill>
+            <a:srgbClr val="15292F"/>
+          </a:solidFill>
+          <a:ln>
+            <a:solidFill>
+              <a:srgbClr val="15292F"/>
+            </a:solidFill>
+          </a:ln>
+        </p:spPr>
+        <p:style>
+          <a:lnRef idx="2">
+            <a:schemeClr val="accent1">
+              <a:shade val="50000"/>
+            </a:schemeClr>
+          </a:lnRef>
+          <a:fillRef idx="1">
+            <a:schemeClr val="accent1"/>
+          </a:fillRef>
+          <a:effectRef idx="0">
+            <a:schemeClr val="accent1"/>
+          </a:effectRef>
+          <a:fontRef idx="minor">
+            <a:schemeClr val="lt1"/>
+          </a:fontRef>
+        </p:style>
+        <p:txBody>
+          <a:bodyPr rtlCol="0" anchor="ctr"/>
+          <a:lstStyle/>
+          <a:p>
+            <a:pPr algn="ctr"/>
+            <a:endParaRPr lang="pt-BR"/>
+          </a:p>
+        </p:txBody>
+      </p:sp>
+      <p:sp>
+        <p:nvSpPr>
+          <p:cNvPr id="47" name="CaixaDeTexto 46">
+            <a:extLst>
+              <a:ext uri="{FF2B5EF4-FFF2-40B4-BE49-F238E27FC236}">
+                <a16:creationId xmlns:a16="http://schemas.microsoft.com/office/drawing/2014/main" id="{A4B33ECC-425A-4480-9DDE-E3B5FC3E0F35}"/>
+              </a:ext>
+            </a:extLst>
+          </p:cNvPr>
+          <p:cNvSpPr txBox="1"/>
+          <p:nvPr/>
+        </p:nvSpPr>
+        <p:spPr>
+          <a:xfrm>
+            <a:off x="5354271" y="1655006"/>
+            <a:ext cx="2113258" cy="369332"/>
+          </a:xfrm>
+          <a:prstGeom prst="rect">
+            <a:avLst/>
+          </a:prstGeom>
+          <a:noFill/>
+        </p:spPr>
+        <p:txBody>
+          <a:bodyPr wrap="square" rtlCol="0">
+            <a:spAutoFit/>
+          </a:bodyPr>
+          <a:lstStyle/>
+          <a:p>
+            <a:r>
+              <a:rPr lang="pt-BR" dirty="0"/>
+              <a:t>Concluída</a:t>
+            </a:r>
+          </a:p>
+        </p:txBody>
+      </p:sp>
+      <p:sp>
+        <p:nvSpPr>
+          <p:cNvPr id="48" name="Elipse 47">
+            <a:extLst>
+              <a:ext uri="{FF2B5EF4-FFF2-40B4-BE49-F238E27FC236}">
+                <a16:creationId xmlns:a16="http://schemas.microsoft.com/office/drawing/2014/main" id="{97FF0D7F-1396-4C26-91B8-3403E2E5055B}"/>
+              </a:ext>
+            </a:extLst>
+          </p:cNvPr>
+          <p:cNvSpPr/>
+          <p:nvPr/>
+        </p:nvSpPr>
+        <p:spPr>
+          <a:xfrm>
+            <a:off x="6706805" y="1764317"/>
+            <a:ext cx="144537" cy="141880"/>
+          </a:xfrm>
+          <a:prstGeom prst="ellipse">
+            <a:avLst/>
+          </a:prstGeom>
+          <a:solidFill>
+            <a:schemeClr val="bg1"/>
+          </a:solidFill>
+          <a:ln>
+            <a:solidFill>
+              <a:srgbClr val="15292F"/>
+            </a:solidFill>
+          </a:ln>
+        </p:spPr>
+        <p:style>
+          <a:lnRef idx="2">
+            <a:schemeClr val="accent1">
+              <a:shade val="50000"/>
+            </a:schemeClr>
+          </a:lnRef>
+          <a:fillRef idx="1">
+            <a:schemeClr val="accent1"/>
+          </a:fillRef>
+          <a:effectRef idx="0">
+            <a:schemeClr val="accent1"/>
+          </a:effectRef>
+          <a:fontRef idx="minor">
+            <a:schemeClr val="lt1"/>
+          </a:fontRef>
+        </p:style>
+        <p:txBody>
+          <a:bodyPr rtlCol="0" anchor="ctr"/>
+          <a:lstStyle/>
+          <a:p>
+            <a:pPr algn="ctr"/>
+            <a:endParaRPr lang="pt-BR"/>
+          </a:p>
+        </p:txBody>
+      </p:sp>
+      <p:sp>
+        <p:nvSpPr>
+          <p:cNvPr id="49" name="CaixaDeTexto 48">
+            <a:extLst>
+              <a:ext uri="{FF2B5EF4-FFF2-40B4-BE49-F238E27FC236}">
+                <a16:creationId xmlns:a16="http://schemas.microsoft.com/office/drawing/2014/main" id="{4F80DD7A-FBD1-406D-A303-59F0BF5412E8}"/>
+              </a:ext>
+            </a:extLst>
+          </p:cNvPr>
+          <p:cNvSpPr txBox="1"/>
+          <p:nvPr/>
+        </p:nvSpPr>
+        <p:spPr>
+          <a:xfrm>
+            <a:off x="6978003" y="1655006"/>
+            <a:ext cx="2113258" cy="369332"/>
+          </a:xfrm>
+          <a:prstGeom prst="rect">
+            <a:avLst/>
+          </a:prstGeom>
+          <a:noFill/>
+        </p:spPr>
+        <p:txBody>
+          <a:bodyPr wrap="square" rtlCol="0">
+            <a:spAutoFit/>
+          </a:bodyPr>
+          <a:lstStyle/>
+          <a:p>
+            <a:r>
+              <a:rPr lang="pt-BR" dirty="0"/>
+              <a:t>Todas</a:t>
+            </a:r>
+          </a:p>
+        </p:txBody>
+      </p:sp>
+      <p:cxnSp>
+        <p:nvCxnSpPr>
+          <p:cNvPr id="50" name="Conector reto 49">
+            <a:extLst>
+              <a:ext uri="{FF2B5EF4-FFF2-40B4-BE49-F238E27FC236}">
+                <a16:creationId xmlns:a16="http://schemas.microsoft.com/office/drawing/2014/main" id="{87C41759-6863-4499-BDB2-63145DF7A0A2}"/>
+              </a:ext>
+            </a:extLst>
+          </p:cNvPr>
+          <p:cNvCxnSpPr>
+            <a:cxnSpLocks/>
+          </p:cNvCxnSpPr>
+          <p:nvPr/>
+        </p:nvCxnSpPr>
+        <p:spPr>
+          <a:xfrm flipV="1">
+            <a:off x="2760258" y="1966041"/>
+            <a:ext cx="8859982" cy="48120"/>
+          </a:xfrm>
+          <a:prstGeom prst="line">
+            <a:avLst/>
+          </a:prstGeom>
+          <a:ln>
+            <a:solidFill>
+              <a:srgbClr val="15292F"/>
+            </a:solidFill>
+          </a:ln>
+        </p:spPr>
+        <p:style>
+          <a:lnRef idx="1">
+            <a:schemeClr val="accent1"/>
+          </a:lnRef>
+          <a:fillRef idx="0">
+            <a:schemeClr val="accent1"/>
+          </a:fillRef>
+          <a:effectRef idx="0">
+            <a:schemeClr val="accent1"/>
+          </a:effectRef>
+          <a:fontRef idx="minor">
+            <a:schemeClr val="tx1"/>
+          </a:fontRef>
+        </p:style>
+      </p:cxnSp>
+    </p:spTree>
+    <p:extLst>
+      <p:ext uri="{BB962C8B-B14F-4D97-AF65-F5344CB8AC3E}">
+        <p14:creationId xmlns:p14="http://schemas.microsoft.com/office/powerpoint/2010/main" val="3212424192"/>
       </p:ext>
     </p:extLst>
   </p:cSld>

</xml_diff>

<commit_message>
Tela de Visualização Expandida da Solicitação
</commit_message>
<xml_diff>
--- a/Protótipo/Protótipos.pptx
+++ b/Protótipo/Protótipos.pptx
@@ -13,6 +13,7 @@
     <p:sldId id="263" r:id="rId7"/>
     <p:sldId id="264" r:id="rId8"/>
     <p:sldId id="265" r:id="rId9"/>
+    <p:sldId id="266" r:id="rId10"/>
   </p:sldIdLst>
   <p:sldSz cx="12192000" cy="6858000"/>
   <p:notesSz cx="6858000" cy="9144000"/>
@@ -16685,6 +16686,3865 @@
 </p:sld>
 </file>
 
+<file path=ppt/slides/slide9.xml><?xml version="1.0" encoding="utf-8"?>
+<p:sld xmlns:a="http://schemas.openxmlformats.org/drawingml/2006/main" xmlns:r="http://schemas.openxmlformats.org/officeDocument/2006/relationships" xmlns:p="http://schemas.openxmlformats.org/presentationml/2006/main">
+  <p:cSld>
+    <p:spTree>
+      <p:nvGrpSpPr>
+        <p:cNvPr id="1" name=""/>
+        <p:cNvGrpSpPr/>
+        <p:nvPr/>
+      </p:nvGrpSpPr>
+      <p:grpSpPr>
+        <a:xfrm>
+          <a:off x="0" y="0"/>
+          <a:ext cx="0" cy="0"/>
+          <a:chOff x="0" y="0"/>
+          <a:chExt cx="0" cy="0"/>
+        </a:xfrm>
+      </p:grpSpPr>
+      <p:sp>
+        <p:nvSpPr>
+          <p:cNvPr id="36" name="Retângulo 35">
+            <a:extLst>
+              <a:ext uri="{FF2B5EF4-FFF2-40B4-BE49-F238E27FC236}">
+                <a16:creationId xmlns:a16="http://schemas.microsoft.com/office/drawing/2014/main" id="{72717C35-7450-4B42-8F96-32041860C4D7}"/>
+              </a:ext>
+            </a:extLst>
+          </p:cNvPr>
+          <p:cNvSpPr/>
+          <p:nvPr/>
+        </p:nvSpPr>
+        <p:spPr>
+          <a:xfrm>
+            <a:off x="424173" y="542422"/>
+            <a:ext cx="11343653" cy="567569"/>
+          </a:xfrm>
+          <a:prstGeom prst="rect">
+            <a:avLst/>
+          </a:prstGeom>
+          <a:solidFill>
+            <a:srgbClr val="15292F"/>
+          </a:solidFill>
+          <a:ln>
+            <a:solidFill>
+              <a:srgbClr val="15292F"/>
+            </a:solidFill>
+          </a:ln>
+        </p:spPr>
+        <p:style>
+          <a:lnRef idx="2">
+            <a:schemeClr val="accent1">
+              <a:shade val="50000"/>
+            </a:schemeClr>
+          </a:lnRef>
+          <a:fillRef idx="1">
+            <a:schemeClr val="accent1"/>
+          </a:fillRef>
+          <a:effectRef idx="0">
+            <a:schemeClr val="accent1"/>
+          </a:effectRef>
+          <a:fontRef idx="minor">
+            <a:schemeClr val="lt1"/>
+          </a:fontRef>
+        </p:style>
+        <p:txBody>
+          <a:bodyPr rtlCol="0" anchor="ctr"/>
+          <a:lstStyle/>
+          <a:p>
+            <a:pPr algn="ctr"/>
+            <a:endParaRPr lang="pt-BR"/>
+          </a:p>
+        </p:txBody>
+      </p:sp>
+      <p:sp>
+        <p:nvSpPr>
+          <p:cNvPr id="11" name="Retângulo 10">
+            <a:extLst>
+              <a:ext uri="{FF2B5EF4-FFF2-40B4-BE49-F238E27FC236}">
+                <a16:creationId xmlns:a16="http://schemas.microsoft.com/office/drawing/2014/main" id="{D528783E-A938-411F-9F69-2D5C5AF53E00}"/>
+              </a:ext>
+            </a:extLst>
+          </p:cNvPr>
+          <p:cNvSpPr/>
+          <p:nvPr/>
+        </p:nvSpPr>
+        <p:spPr>
+          <a:xfrm>
+            <a:off x="242389" y="533047"/>
+            <a:ext cx="11549575" cy="5746652"/>
+          </a:xfrm>
+          <a:prstGeom prst="rect">
+            <a:avLst/>
+          </a:prstGeom>
+          <a:noFill/>
+          <a:ln>
+            <a:solidFill>
+              <a:srgbClr val="15292F"/>
+            </a:solidFill>
+          </a:ln>
+        </p:spPr>
+        <p:style>
+          <a:lnRef idx="2">
+            <a:schemeClr val="accent1">
+              <a:shade val="50000"/>
+            </a:schemeClr>
+          </a:lnRef>
+          <a:fillRef idx="1">
+            <a:schemeClr val="accent1"/>
+          </a:fillRef>
+          <a:effectRef idx="0">
+            <a:schemeClr val="accent1"/>
+          </a:effectRef>
+          <a:fontRef idx="minor">
+            <a:schemeClr val="lt1"/>
+          </a:fontRef>
+        </p:style>
+        <p:txBody>
+          <a:bodyPr rtlCol="0" anchor="ctr"/>
+          <a:lstStyle/>
+          <a:p>
+            <a:pPr algn="ctr"/>
+            <a:endParaRPr lang="pt-BR"/>
+          </a:p>
+        </p:txBody>
+      </p:sp>
+      <p:sp>
+        <p:nvSpPr>
+          <p:cNvPr id="13" name="CaixaDeTexto 12">
+            <a:extLst>
+              <a:ext uri="{FF2B5EF4-FFF2-40B4-BE49-F238E27FC236}">
+                <a16:creationId xmlns:a16="http://schemas.microsoft.com/office/drawing/2014/main" id="{44A41851-5B55-46CA-A196-9F1036F346AE}"/>
+              </a:ext>
+            </a:extLst>
+          </p:cNvPr>
+          <p:cNvSpPr txBox="1"/>
+          <p:nvPr/>
+        </p:nvSpPr>
+        <p:spPr>
+          <a:xfrm>
+            <a:off x="2894969" y="79692"/>
+            <a:ext cx="6469528" cy="523220"/>
+          </a:xfrm>
+          <a:prstGeom prst="rect">
+            <a:avLst/>
+          </a:prstGeom>
+          <a:noFill/>
+        </p:spPr>
+        <p:txBody>
+          <a:bodyPr wrap="none" rtlCol="0">
+            <a:spAutoFit/>
+          </a:bodyPr>
+          <a:lstStyle/>
+          <a:p>
+            <a:r>
+              <a:rPr lang="pt-BR" sz="2800" b="1" dirty="0"/>
+              <a:t>Sistema de Gerenciamento de Solicitações</a:t>
+            </a:r>
+          </a:p>
+        </p:txBody>
+      </p:sp>
+      <p:sp>
+        <p:nvSpPr>
+          <p:cNvPr id="12" name="CaixaDeTexto 11">
+            <a:extLst>
+              <a:ext uri="{FF2B5EF4-FFF2-40B4-BE49-F238E27FC236}">
+                <a16:creationId xmlns:a16="http://schemas.microsoft.com/office/drawing/2014/main" id="{A2F0968E-0484-446C-B3EC-124FA3DD9FD8}"/>
+              </a:ext>
+            </a:extLst>
+          </p:cNvPr>
+          <p:cNvSpPr txBox="1"/>
+          <p:nvPr/>
+        </p:nvSpPr>
+        <p:spPr>
+          <a:xfrm>
+            <a:off x="5837001" y="1148118"/>
+            <a:ext cx="2315966" cy="523220"/>
+          </a:xfrm>
+          <a:prstGeom prst="rect">
+            <a:avLst/>
+          </a:prstGeom>
+          <a:noFill/>
+        </p:spPr>
+        <p:txBody>
+          <a:bodyPr wrap="square" rtlCol="0">
+            <a:spAutoFit/>
+          </a:bodyPr>
+          <a:lstStyle/>
+          <a:p>
+            <a:r>
+              <a:rPr lang="pt-BR" sz="2800" b="1" dirty="0"/>
+              <a:t>Solicitações</a:t>
+            </a:r>
+          </a:p>
+        </p:txBody>
+      </p:sp>
+      <p:sp>
+        <p:nvSpPr>
+          <p:cNvPr id="14" name="Retângulo 13">
+            <a:extLst>
+              <a:ext uri="{FF2B5EF4-FFF2-40B4-BE49-F238E27FC236}">
+                <a16:creationId xmlns:a16="http://schemas.microsoft.com/office/drawing/2014/main" id="{49121E93-52CC-46A5-9B75-798204730BC3}"/>
+              </a:ext>
+            </a:extLst>
+          </p:cNvPr>
+          <p:cNvSpPr/>
+          <p:nvPr/>
+        </p:nvSpPr>
+        <p:spPr>
+          <a:xfrm>
+            <a:off x="261297" y="542423"/>
+            <a:ext cx="2315966" cy="5746652"/>
+          </a:xfrm>
+          <a:prstGeom prst="rect">
+            <a:avLst/>
+          </a:prstGeom>
+          <a:solidFill>
+            <a:srgbClr val="15292F"/>
+          </a:solidFill>
+          <a:ln>
+            <a:solidFill>
+              <a:srgbClr val="15292F"/>
+            </a:solidFill>
+          </a:ln>
+        </p:spPr>
+        <p:style>
+          <a:lnRef idx="2">
+            <a:schemeClr val="accent1">
+              <a:shade val="50000"/>
+            </a:schemeClr>
+          </a:lnRef>
+          <a:fillRef idx="1">
+            <a:schemeClr val="accent1"/>
+          </a:fillRef>
+          <a:effectRef idx="0">
+            <a:schemeClr val="accent1"/>
+          </a:effectRef>
+          <a:fontRef idx="minor">
+            <a:schemeClr val="lt1"/>
+          </a:fontRef>
+        </p:style>
+        <p:txBody>
+          <a:bodyPr rtlCol="0" anchor="ctr"/>
+          <a:lstStyle/>
+          <a:p>
+            <a:pPr algn="ctr"/>
+            <a:endParaRPr lang="pt-BR"/>
+          </a:p>
+        </p:txBody>
+      </p:sp>
+      <p:sp>
+        <p:nvSpPr>
+          <p:cNvPr id="24" name="CaixaDeTexto 23">
+            <a:extLst>
+              <a:ext uri="{FF2B5EF4-FFF2-40B4-BE49-F238E27FC236}">
+                <a16:creationId xmlns:a16="http://schemas.microsoft.com/office/drawing/2014/main" id="{5FDC72C2-E03F-42D1-9E55-7E7B08090268}"/>
+              </a:ext>
+            </a:extLst>
+          </p:cNvPr>
+          <p:cNvSpPr txBox="1"/>
+          <p:nvPr/>
+        </p:nvSpPr>
+        <p:spPr>
+          <a:xfrm>
+            <a:off x="2718839" y="1647572"/>
+            <a:ext cx="2113258" cy="369332"/>
+          </a:xfrm>
+          <a:prstGeom prst="rect">
+            <a:avLst/>
+          </a:prstGeom>
+          <a:noFill/>
+        </p:spPr>
+        <p:txBody>
+          <a:bodyPr wrap="square" rtlCol="0">
+            <a:spAutoFit/>
+          </a:bodyPr>
+          <a:lstStyle/>
+          <a:p>
+            <a:r>
+              <a:rPr lang="pt-BR" dirty="0"/>
+              <a:t>Filtrar por: </a:t>
+            </a:r>
+          </a:p>
+        </p:txBody>
+      </p:sp>
+      <p:sp>
+        <p:nvSpPr>
+          <p:cNvPr id="25" name="CaixaDeTexto 24">
+            <a:extLst>
+              <a:ext uri="{FF2B5EF4-FFF2-40B4-BE49-F238E27FC236}">
+                <a16:creationId xmlns:a16="http://schemas.microsoft.com/office/drawing/2014/main" id="{96E24B0C-A2CE-48ED-BEDC-572A8F5FF39A}"/>
+              </a:ext>
+            </a:extLst>
+          </p:cNvPr>
+          <p:cNvSpPr txBox="1"/>
+          <p:nvPr/>
+        </p:nvSpPr>
+        <p:spPr>
+          <a:xfrm>
+            <a:off x="952248" y="733412"/>
+            <a:ext cx="963831" cy="338554"/>
+          </a:xfrm>
+          <a:prstGeom prst="rect">
+            <a:avLst/>
+          </a:prstGeom>
+          <a:noFill/>
+        </p:spPr>
+        <p:txBody>
+          <a:bodyPr wrap="square" rtlCol="0">
+            <a:spAutoFit/>
+          </a:bodyPr>
+          <a:lstStyle/>
+          <a:p>
+            <a:r>
+              <a:rPr lang="pt-BR" sz="1600" b="1" dirty="0">
+                <a:solidFill>
+                  <a:schemeClr val="bg1"/>
+                </a:solidFill>
+              </a:rPr>
+              <a:t>MENU</a:t>
+            </a:r>
+          </a:p>
+        </p:txBody>
+      </p:sp>
+      <p:sp>
+        <p:nvSpPr>
+          <p:cNvPr id="28" name="Retângulo 27">
+            <a:extLst>
+              <a:ext uri="{FF2B5EF4-FFF2-40B4-BE49-F238E27FC236}">
+                <a16:creationId xmlns:a16="http://schemas.microsoft.com/office/drawing/2014/main" id="{F03B6800-85D2-4ADC-8E0D-7807940B5FE8}"/>
+              </a:ext>
+            </a:extLst>
+          </p:cNvPr>
+          <p:cNvSpPr/>
+          <p:nvPr/>
+        </p:nvSpPr>
+        <p:spPr>
+          <a:xfrm>
+            <a:off x="410890" y="2500472"/>
+            <a:ext cx="278428" cy="301627"/>
+          </a:xfrm>
+          <a:prstGeom prst="rect">
+            <a:avLst/>
+          </a:prstGeom>
+          <a:noFill/>
+          <a:ln w="41275">
+            <a:solidFill>
+              <a:schemeClr val="bg1"/>
+            </a:solidFill>
+          </a:ln>
+        </p:spPr>
+        <p:style>
+          <a:lnRef idx="2">
+            <a:schemeClr val="accent1">
+              <a:shade val="50000"/>
+            </a:schemeClr>
+          </a:lnRef>
+          <a:fillRef idx="1">
+            <a:schemeClr val="accent1"/>
+          </a:fillRef>
+          <a:effectRef idx="0">
+            <a:schemeClr val="accent1"/>
+          </a:effectRef>
+          <a:fontRef idx="minor">
+            <a:schemeClr val="lt1"/>
+          </a:fontRef>
+        </p:style>
+        <p:txBody>
+          <a:bodyPr rtlCol="0" anchor="ctr"/>
+          <a:lstStyle/>
+          <a:p>
+            <a:pPr algn="ctr"/>
+            <a:endParaRPr lang="pt-BR" sz="1600"/>
+          </a:p>
+        </p:txBody>
+      </p:sp>
+      <p:sp>
+        <p:nvSpPr>
+          <p:cNvPr id="29" name="Retângulo 28">
+            <a:extLst>
+              <a:ext uri="{FF2B5EF4-FFF2-40B4-BE49-F238E27FC236}">
+                <a16:creationId xmlns:a16="http://schemas.microsoft.com/office/drawing/2014/main" id="{2C438151-C044-420F-A3AB-79A3B8714B0F}"/>
+              </a:ext>
+            </a:extLst>
+          </p:cNvPr>
+          <p:cNvSpPr/>
+          <p:nvPr/>
+        </p:nvSpPr>
+        <p:spPr>
+          <a:xfrm>
+            <a:off x="410889" y="3037464"/>
+            <a:ext cx="278428" cy="301627"/>
+          </a:xfrm>
+          <a:prstGeom prst="rect">
+            <a:avLst/>
+          </a:prstGeom>
+          <a:noFill/>
+          <a:ln w="41275">
+            <a:solidFill>
+              <a:schemeClr val="bg1"/>
+            </a:solidFill>
+          </a:ln>
+        </p:spPr>
+        <p:style>
+          <a:lnRef idx="2">
+            <a:schemeClr val="accent1">
+              <a:shade val="50000"/>
+            </a:schemeClr>
+          </a:lnRef>
+          <a:fillRef idx="1">
+            <a:schemeClr val="accent1"/>
+          </a:fillRef>
+          <a:effectRef idx="0">
+            <a:schemeClr val="accent1"/>
+          </a:effectRef>
+          <a:fontRef idx="minor">
+            <a:schemeClr val="lt1"/>
+          </a:fontRef>
+        </p:style>
+        <p:txBody>
+          <a:bodyPr rtlCol="0" anchor="ctr"/>
+          <a:lstStyle/>
+          <a:p>
+            <a:pPr algn="ctr"/>
+            <a:endParaRPr lang="pt-BR" sz="1600"/>
+          </a:p>
+        </p:txBody>
+      </p:sp>
+      <p:sp>
+        <p:nvSpPr>
+          <p:cNvPr id="32" name="CaixaDeTexto 31">
+            <a:extLst>
+              <a:ext uri="{FF2B5EF4-FFF2-40B4-BE49-F238E27FC236}">
+                <a16:creationId xmlns:a16="http://schemas.microsoft.com/office/drawing/2014/main" id="{C258EE09-B702-4C37-A0DB-F76AEC3FDD93}"/>
+              </a:ext>
+            </a:extLst>
+          </p:cNvPr>
+          <p:cNvSpPr txBox="1"/>
+          <p:nvPr/>
+        </p:nvSpPr>
+        <p:spPr>
+          <a:xfrm>
+            <a:off x="718032" y="2486404"/>
+            <a:ext cx="1782913" cy="338554"/>
+          </a:xfrm>
+          <a:prstGeom prst="rect">
+            <a:avLst/>
+          </a:prstGeom>
+          <a:noFill/>
+        </p:spPr>
+        <p:txBody>
+          <a:bodyPr wrap="square" rtlCol="0">
+            <a:spAutoFit/>
+          </a:bodyPr>
+          <a:lstStyle/>
+          <a:p>
+            <a:r>
+              <a:rPr lang="pt-BR" sz="1600" b="1" dirty="0">
+                <a:solidFill>
+                  <a:schemeClr val="bg1"/>
+                </a:solidFill>
+              </a:rPr>
+              <a:t>Alterar Senha</a:t>
+            </a:r>
+          </a:p>
+        </p:txBody>
+      </p:sp>
+      <p:sp>
+        <p:nvSpPr>
+          <p:cNvPr id="33" name="CaixaDeTexto 32">
+            <a:extLst>
+              <a:ext uri="{FF2B5EF4-FFF2-40B4-BE49-F238E27FC236}">
+                <a16:creationId xmlns:a16="http://schemas.microsoft.com/office/drawing/2014/main" id="{C5F0114B-894C-44CB-934A-A5C1C4BA6830}"/>
+              </a:ext>
+            </a:extLst>
+          </p:cNvPr>
+          <p:cNvSpPr txBox="1"/>
+          <p:nvPr/>
+        </p:nvSpPr>
+        <p:spPr>
+          <a:xfrm>
+            <a:off x="718032" y="3000537"/>
+            <a:ext cx="655528" cy="338554"/>
+          </a:xfrm>
+          <a:prstGeom prst="rect">
+            <a:avLst/>
+          </a:prstGeom>
+          <a:noFill/>
+        </p:spPr>
+        <p:txBody>
+          <a:bodyPr wrap="square" rtlCol="0">
+            <a:spAutoFit/>
+          </a:bodyPr>
+          <a:lstStyle/>
+          <a:p>
+            <a:r>
+              <a:rPr lang="pt-BR" sz="1600" b="1" dirty="0">
+                <a:solidFill>
+                  <a:schemeClr val="bg1"/>
+                </a:solidFill>
+              </a:rPr>
+              <a:t>Sair</a:t>
+            </a:r>
+          </a:p>
+        </p:txBody>
+      </p:sp>
+      <p:cxnSp>
+        <p:nvCxnSpPr>
+          <p:cNvPr id="3" name="Conector reto 2">
+            <a:extLst>
+              <a:ext uri="{FF2B5EF4-FFF2-40B4-BE49-F238E27FC236}">
+                <a16:creationId xmlns:a16="http://schemas.microsoft.com/office/drawing/2014/main" id="{6219E484-EB50-4F15-B464-0ED9AF6F738C}"/>
+              </a:ext>
+            </a:extLst>
+          </p:cNvPr>
+          <p:cNvCxnSpPr>
+            <a:cxnSpLocks/>
+          </p:cNvCxnSpPr>
+          <p:nvPr/>
+        </p:nvCxnSpPr>
+        <p:spPr>
+          <a:xfrm>
+            <a:off x="368685" y="1102744"/>
+            <a:ext cx="2132260" cy="7247"/>
+          </a:xfrm>
+          <a:prstGeom prst="line">
+            <a:avLst/>
+          </a:prstGeom>
+          <a:ln>
+            <a:solidFill>
+              <a:schemeClr val="bg1"/>
+            </a:solidFill>
+          </a:ln>
+        </p:spPr>
+        <p:style>
+          <a:lnRef idx="1">
+            <a:schemeClr val="accent1"/>
+          </a:lnRef>
+          <a:fillRef idx="0">
+            <a:schemeClr val="accent1"/>
+          </a:fillRef>
+          <a:effectRef idx="0">
+            <a:schemeClr val="accent1"/>
+          </a:effectRef>
+          <a:fontRef idx="minor">
+            <a:schemeClr val="tx1"/>
+          </a:fontRef>
+        </p:style>
+      </p:cxnSp>
+      <p:sp>
+        <p:nvSpPr>
+          <p:cNvPr id="34" name="Retângulo 33">
+            <a:extLst>
+              <a:ext uri="{FF2B5EF4-FFF2-40B4-BE49-F238E27FC236}">
+                <a16:creationId xmlns:a16="http://schemas.microsoft.com/office/drawing/2014/main" id="{411E0287-ABD4-486F-889C-AF7A431F8B20}"/>
+              </a:ext>
+            </a:extLst>
+          </p:cNvPr>
+          <p:cNvSpPr/>
+          <p:nvPr/>
+        </p:nvSpPr>
+        <p:spPr>
+          <a:xfrm>
+            <a:off x="11186393" y="652282"/>
+            <a:ext cx="403700" cy="362330"/>
+          </a:xfrm>
+          <a:prstGeom prst="rect">
+            <a:avLst/>
+          </a:prstGeom>
+          <a:solidFill>
+            <a:schemeClr val="bg1"/>
+          </a:solidFill>
+          <a:ln w="41275">
+            <a:solidFill>
+              <a:schemeClr val="bg1"/>
+            </a:solidFill>
+          </a:ln>
+        </p:spPr>
+        <p:style>
+          <a:lnRef idx="2">
+            <a:schemeClr val="accent1">
+              <a:shade val="50000"/>
+            </a:schemeClr>
+          </a:lnRef>
+          <a:fillRef idx="1">
+            <a:schemeClr val="accent1"/>
+          </a:fillRef>
+          <a:effectRef idx="0">
+            <a:schemeClr val="accent1"/>
+          </a:effectRef>
+          <a:fontRef idx="minor">
+            <a:schemeClr val="lt1"/>
+          </a:fontRef>
+        </p:style>
+        <p:txBody>
+          <a:bodyPr rtlCol="0" anchor="ctr"/>
+          <a:lstStyle/>
+          <a:p>
+            <a:pPr algn="ctr"/>
+            <a:endParaRPr lang="pt-BR"/>
+          </a:p>
+        </p:txBody>
+      </p:sp>
+      <p:sp>
+        <p:nvSpPr>
+          <p:cNvPr id="35" name="CaixaDeTexto 34">
+            <a:extLst>
+              <a:ext uri="{FF2B5EF4-FFF2-40B4-BE49-F238E27FC236}">
+                <a16:creationId xmlns:a16="http://schemas.microsoft.com/office/drawing/2014/main" id="{B3FF9A18-7D07-4F64-841F-56C983C88AF5}"/>
+              </a:ext>
+            </a:extLst>
+          </p:cNvPr>
+          <p:cNvSpPr txBox="1"/>
+          <p:nvPr/>
+        </p:nvSpPr>
+        <p:spPr>
+          <a:xfrm>
+            <a:off x="10081839" y="624147"/>
+            <a:ext cx="1326470" cy="400110"/>
+          </a:xfrm>
+          <a:prstGeom prst="rect">
+            <a:avLst/>
+          </a:prstGeom>
+          <a:noFill/>
+        </p:spPr>
+        <p:txBody>
+          <a:bodyPr wrap="square" rtlCol="0">
+            <a:spAutoFit/>
+          </a:bodyPr>
+          <a:lstStyle/>
+          <a:p>
+            <a:r>
+              <a:rPr lang="pt-BR" sz="2000" b="1" dirty="0">
+                <a:solidFill>
+                  <a:schemeClr val="bg1"/>
+                </a:solidFill>
+              </a:rPr>
+              <a:t>Empresa</a:t>
+            </a:r>
+          </a:p>
+        </p:txBody>
+      </p:sp>
+      <p:sp>
+        <p:nvSpPr>
+          <p:cNvPr id="37" name="CaixaDeTexto 36">
+            <a:extLst>
+              <a:ext uri="{FF2B5EF4-FFF2-40B4-BE49-F238E27FC236}">
+                <a16:creationId xmlns:a16="http://schemas.microsoft.com/office/drawing/2014/main" id="{03757204-3378-4387-9345-36BD62EEC760}"/>
+              </a:ext>
+            </a:extLst>
+          </p:cNvPr>
+          <p:cNvSpPr txBox="1"/>
+          <p:nvPr/>
+        </p:nvSpPr>
+        <p:spPr>
+          <a:xfrm>
+            <a:off x="2500945" y="6291644"/>
+            <a:ext cx="7492244" cy="523220"/>
+          </a:xfrm>
+          <a:prstGeom prst="rect">
+            <a:avLst/>
+          </a:prstGeom>
+          <a:noFill/>
+        </p:spPr>
+        <p:txBody>
+          <a:bodyPr wrap="none" rtlCol="0">
+            <a:spAutoFit/>
+          </a:bodyPr>
+          <a:lstStyle/>
+          <a:p>
+            <a:r>
+              <a:rPr lang="pt-BR" sz="2800" b="1" dirty="0"/>
+              <a:t>Solicitador/Visualizar detalhe Solicitação/Aberta </a:t>
+            </a:r>
+          </a:p>
+        </p:txBody>
+      </p:sp>
+      <p:sp>
+        <p:nvSpPr>
+          <p:cNvPr id="39" name="Retângulo 38">
+            <a:extLst>
+              <a:ext uri="{FF2B5EF4-FFF2-40B4-BE49-F238E27FC236}">
+                <a16:creationId xmlns:a16="http://schemas.microsoft.com/office/drawing/2014/main" id="{8C376645-A812-472B-B452-78580CC717C2}"/>
+              </a:ext>
+            </a:extLst>
+          </p:cNvPr>
+          <p:cNvSpPr/>
+          <p:nvPr/>
+        </p:nvSpPr>
+        <p:spPr>
+          <a:xfrm>
+            <a:off x="251843" y="1347641"/>
+            <a:ext cx="2325420" cy="567569"/>
+          </a:xfrm>
+          <a:prstGeom prst="rect">
+            <a:avLst/>
+          </a:prstGeom>
+          <a:solidFill>
+            <a:schemeClr val="bg1"/>
+          </a:solidFill>
+          <a:ln>
+            <a:solidFill>
+              <a:srgbClr val="15292F"/>
+            </a:solidFill>
+          </a:ln>
+        </p:spPr>
+        <p:style>
+          <a:lnRef idx="2">
+            <a:schemeClr val="accent1">
+              <a:shade val="50000"/>
+            </a:schemeClr>
+          </a:lnRef>
+          <a:fillRef idx="1">
+            <a:schemeClr val="accent1"/>
+          </a:fillRef>
+          <a:effectRef idx="0">
+            <a:schemeClr val="accent1"/>
+          </a:effectRef>
+          <a:fontRef idx="minor">
+            <a:schemeClr val="lt1"/>
+          </a:fontRef>
+        </p:style>
+        <p:txBody>
+          <a:bodyPr rtlCol="0" anchor="ctr"/>
+          <a:lstStyle/>
+          <a:p>
+            <a:pPr algn="ctr"/>
+            <a:endParaRPr lang="pt-BR" sz="1600" dirty="0"/>
+          </a:p>
+        </p:txBody>
+      </p:sp>
+      <p:sp>
+        <p:nvSpPr>
+          <p:cNvPr id="40" name="Retângulo 39">
+            <a:extLst>
+              <a:ext uri="{FF2B5EF4-FFF2-40B4-BE49-F238E27FC236}">
+                <a16:creationId xmlns:a16="http://schemas.microsoft.com/office/drawing/2014/main" id="{35E3A609-45DE-47E1-9BA2-04C77C2D7083}"/>
+              </a:ext>
+            </a:extLst>
+          </p:cNvPr>
+          <p:cNvSpPr/>
+          <p:nvPr/>
+        </p:nvSpPr>
+        <p:spPr>
+          <a:xfrm>
+            <a:off x="411036" y="1972300"/>
+            <a:ext cx="278428" cy="301627"/>
+          </a:xfrm>
+          <a:prstGeom prst="rect">
+            <a:avLst/>
+          </a:prstGeom>
+          <a:noFill/>
+          <a:ln w="41275">
+            <a:solidFill>
+              <a:schemeClr val="bg1"/>
+            </a:solidFill>
+          </a:ln>
+        </p:spPr>
+        <p:style>
+          <a:lnRef idx="2">
+            <a:schemeClr val="accent1">
+              <a:shade val="50000"/>
+            </a:schemeClr>
+          </a:lnRef>
+          <a:fillRef idx="1">
+            <a:schemeClr val="accent1"/>
+          </a:fillRef>
+          <a:effectRef idx="0">
+            <a:schemeClr val="accent1"/>
+          </a:effectRef>
+          <a:fontRef idx="minor">
+            <a:schemeClr val="lt1"/>
+          </a:fontRef>
+        </p:style>
+        <p:txBody>
+          <a:bodyPr rtlCol="0" anchor="ctr"/>
+          <a:lstStyle/>
+          <a:p>
+            <a:pPr algn="ctr"/>
+            <a:endParaRPr lang="pt-BR" sz="1600">
+              <a:solidFill>
+                <a:schemeClr val="bg1"/>
+              </a:solidFill>
+            </a:endParaRPr>
+          </a:p>
+        </p:txBody>
+      </p:sp>
+      <p:sp>
+        <p:nvSpPr>
+          <p:cNvPr id="41" name="CaixaDeTexto 40">
+            <a:extLst>
+              <a:ext uri="{FF2B5EF4-FFF2-40B4-BE49-F238E27FC236}">
+                <a16:creationId xmlns:a16="http://schemas.microsoft.com/office/drawing/2014/main" id="{AB210523-A675-44CC-8B0B-3F2E0F6BC1CC}"/>
+              </a:ext>
+            </a:extLst>
+          </p:cNvPr>
+          <p:cNvSpPr txBox="1"/>
+          <p:nvPr/>
+        </p:nvSpPr>
+        <p:spPr>
+          <a:xfrm>
+            <a:off x="718032" y="1934849"/>
+            <a:ext cx="2092526" cy="338554"/>
+          </a:xfrm>
+          <a:prstGeom prst="rect">
+            <a:avLst/>
+          </a:prstGeom>
+          <a:noFill/>
+        </p:spPr>
+        <p:txBody>
+          <a:bodyPr wrap="square" rtlCol="0">
+            <a:spAutoFit/>
+          </a:bodyPr>
+          <a:lstStyle/>
+          <a:p>
+            <a:r>
+              <a:rPr lang="pt-BR" sz="1600" b="1" dirty="0">
+                <a:solidFill>
+                  <a:schemeClr val="bg1"/>
+                </a:solidFill>
+              </a:rPr>
+              <a:t>Abrir Solicitação</a:t>
+            </a:r>
+          </a:p>
+        </p:txBody>
+      </p:sp>
+      <p:sp>
+        <p:nvSpPr>
+          <p:cNvPr id="30" name="CaixaDeTexto 29">
+            <a:extLst>
+              <a:ext uri="{FF2B5EF4-FFF2-40B4-BE49-F238E27FC236}">
+                <a16:creationId xmlns:a16="http://schemas.microsoft.com/office/drawing/2014/main" id="{04EED8AD-47F4-40B3-9734-63EE40B27142}"/>
+              </a:ext>
+            </a:extLst>
+          </p:cNvPr>
+          <p:cNvSpPr txBox="1"/>
+          <p:nvPr/>
+        </p:nvSpPr>
+        <p:spPr>
+          <a:xfrm>
+            <a:off x="701169" y="1491227"/>
+            <a:ext cx="1560935" cy="338554"/>
+          </a:xfrm>
+          <a:prstGeom prst="rect">
+            <a:avLst/>
+          </a:prstGeom>
+          <a:noFill/>
+        </p:spPr>
+        <p:txBody>
+          <a:bodyPr wrap="square" rtlCol="0">
+            <a:spAutoFit/>
+          </a:bodyPr>
+          <a:lstStyle/>
+          <a:p>
+            <a:r>
+              <a:rPr lang="pt-BR" sz="1600" b="1" dirty="0">
+                <a:solidFill>
+                  <a:srgbClr val="15292F"/>
+                </a:solidFill>
+              </a:rPr>
+              <a:t>Solicitações</a:t>
+            </a:r>
+          </a:p>
+        </p:txBody>
+      </p:sp>
+      <p:sp>
+        <p:nvSpPr>
+          <p:cNvPr id="43" name="Retângulo 42">
+            <a:extLst>
+              <a:ext uri="{FF2B5EF4-FFF2-40B4-BE49-F238E27FC236}">
+                <a16:creationId xmlns:a16="http://schemas.microsoft.com/office/drawing/2014/main" id="{18BB4F1B-D0B7-46A4-B716-3B3F296945D5}"/>
+              </a:ext>
+            </a:extLst>
+          </p:cNvPr>
+          <p:cNvSpPr/>
+          <p:nvPr/>
+        </p:nvSpPr>
+        <p:spPr>
+          <a:xfrm>
+            <a:off x="410921" y="1479474"/>
+            <a:ext cx="278428" cy="301627"/>
+          </a:xfrm>
+          <a:prstGeom prst="rect">
+            <a:avLst/>
+          </a:prstGeom>
+          <a:noFill/>
+          <a:ln w="41275">
+            <a:solidFill>
+              <a:srgbClr val="15292F"/>
+            </a:solidFill>
+          </a:ln>
+        </p:spPr>
+        <p:style>
+          <a:lnRef idx="2">
+            <a:schemeClr val="accent1">
+              <a:shade val="50000"/>
+            </a:schemeClr>
+          </a:lnRef>
+          <a:fillRef idx="1">
+            <a:schemeClr val="accent1"/>
+          </a:fillRef>
+          <a:effectRef idx="0">
+            <a:schemeClr val="accent1"/>
+          </a:effectRef>
+          <a:fontRef idx="minor">
+            <a:schemeClr val="lt1"/>
+          </a:fontRef>
+        </p:style>
+        <p:txBody>
+          <a:bodyPr rtlCol="0" anchor="ctr"/>
+          <a:lstStyle/>
+          <a:p>
+            <a:pPr algn="ctr"/>
+            <a:endParaRPr lang="pt-BR" sz="1600">
+              <a:solidFill>
+                <a:schemeClr val="bg1"/>
+              </a:solidFill>
+            </a:endParaRPr>
+          </a:p>
+        </p:txBody>
+      </p:sp>
+      <p:graphicFrame>
+        <p:nvGraphicFramePr>
+          <p:cNvPr id="15" name="Tabela 14">
+            <a:extLst>
+              <a:ext uri="{FF2B5EF4-FFF2-40B4-BE49-F238E27FC236}">
+                <a16:creationId xmlns:a16="http://schemas.microsoft.com/office/drawing/2014/main" id="{117C6A6B-EC6F-4DCE-B5FA-EE45DB5415F2}"/>
+              </a:ext>
+            </a:extLst>
+          </p:cNvPr>
+          <p:cNvGraphicFramePr>
+            <a:graphicFrameLocks noGrp="1"/>
+          </p:cNvGraphicFramePr>
+          <p:nvPr>
+            <p:extLst/>
+          </p:nvPr>
+        </p:nvGraphicFramePr>
+        <p:xfrm>
+          <a:off x="2748986" y="2112352"/>
+          <a:ext cx="8871255" cy="357907"/>
+        </p:xfrm>
+        <a:graphic>
+          <a:graphicData uri="http://schemas.openxmlformats.org/drawingml/2006/table">
+            <a:tbl>
+              <a:tblPr firstRow="1" bandRow="1">
+                <a:tableStyleId>{5C22544A-7EE6-4342-B048-85BDC9FD1C3A}</a:tableStyleId>
+              </a:tblPr>
+              <a:tblGrid>
+                <a:gridCol w="1105562">
+                  <a:extLst>
+                    <a:ext uri="{9D8B030D-6E8A-4147-A177-3AD203B41FA5}">
+                      <a16:colId xmlns:a16="http://schemas.microsoft.com/office/drawing/2014/main" val="1214311235"/>
+                    </a:ext>
+                  </a:extLst>
+                </a:gridCol>
+                <a:gridCol w="1097280">
+                  <a:extLst>
+                    <a:ext uri="{9D8B030D-6E8A-4147-A177-3AD203B41FA5}">
+                      <a16:colId xmlns:a16="http://schemas.microsoft.com/office/drawing/2014/main" val="567709411"/>
+                    </a:ext>
+                  </a:extLst>
+                </a:gridCol>
+                <a:gridCol w="1254036">
+                  <a:extLst>
+                    <a:ext uri="{9D8B030D-6E8A-4147-A177-3AD203B41FA5}">
+                      <a16:colId xmlns:a16="http://schemas.microsoft.com/office/drawing/2014/main" val="1287829829"/>
+                    </a:ext>
+                  </a:extLst>
+                </a:gridCol>
+                <a:gridCol w="1716259">
+                  <a:extLst>
+                    <a:ext uri="{9D8B030D-6E8A-4147-A177-3AD203B41FA5}">
+                      <a16:colId xmlns:a16="http://schemas.microsoft.com/office/drawing/2014/main" val="1577194061"/>
+                    </a:ext>
+                  </a:extLst>
+                </a:gridCol>
+                <a:gridCol w="1067132">
+                  <a:extLst>
+                    <a:ext uri="{9D8B030D-6E8A-4147-A177-3AD203B41FA5}">
+                      <a16:colId xmlns:a16="http://schemas.microsoft.com/office/drawing/2014/main" val="1426856637"/>
+                    </a:ext>
+                  </a:extLst>
+                </a:gridCol>
+                <a:gridCol w="1363664">
+                  <a:extLst>
+                    <a:ext uri="{9D8B030D-6E8A-4147-A177-3AD203B41FA5}">
+                      <a16:colId xmlns:a16="http://schemas.microsoft.com/office/drawing/2014/main" val="2960355438"/>
+                    </a:ext>
+                  </a:extLst>
+                </a:gridCol>
+                <a:gridCol w="1267322">
+                  <a:extLst>
+                    <a:ext uri="{9D8B030D-6E8A-4147-A177-3AD203B41FA5}">
+                      <a16:colId xmlns:a16="http://schemas.microsoft.com/office/drawing/2014/main" val="3684080775"/>
+                    </a:ext>
+                  </a:extLst>
+                </a:gridCol>
+              </a:tblGrid>
+              <a:tr h="357907">
+                <a:tc>
+                  <a:txBody>
+                    <a:bodyPr/>
+                    <a:lstStyle/>
+                    <a:p>
+                      <a:pPr algn="ctr"/>
+                      <a:r>
+                        <a:rPr lang="pt-BR" sz="1200" dirty="0"/>
+                        <a:t>Número</a:t>
+                      </a:r>
+                    </a:p>
+                  </a:txBody>
+                  <a:tcPr>
+                    <a:solidFill>
+                      <a:srgbClr val="15292F"/>
+                    </a:solidFill>
+                  </a:tcPr>
+                </a:tc>
+                <a:tc>
+                  <a:txBody>
+                    <a:bodyPr/>
+                    <a:lstStyle/>
+                    <a:p>
+                      <a:pPr algn="ctr"/>
+                      <a:r>
+                        <a:rPr lang="pt-BR" sz="1200" dirty="0"/>
+                        <a:t>Data Abertura</a:t>
+                      </a:r>
+                    </a:p>
+                  </a:txBody>
+                  <a:tcPr>
+                    <a:solidFill>
+                      <a:srgbClr val="15292F"/>
+                    </a:solidFill>
+                  </a:tcPr>
+                </a:tc>
+                <a:tc>
+                  <a:txBody>
+                    <a:bodyPr/>
+                    <a:lstStyle/>
+                    <a:p>
+                      <a:pPr algn="ctr"/>
+                      <a:r>
+                        <a:rPr lang="pt-BR" sz="1200" dirty="0"/>
+                        <a:t>Solicitante</a:t>
+                      </a:r>
+                    </a:p>
+                  </a:txBody>
+                  <a:tcPr>
+                    <a:solidFill>
+                      <a:srgbClr val="15292F"/>
+                    </a:solidFill>
+                  </a:tcPr>
+                </a:tc>
+                <a:tc>
+                  <a:txBody>
+                    <a:bodyPr/>
+                    <a:lstStyle/>
+                    <a:p>
+                      <a:pPr algn="ctr"/>
+                      <a:r>
+                        <a:rPr lang="pt-BR" sz="1200" dirty="0"/>
+                        <a:t>Prévia</a:t>
+                      </a:r>
+                    </a:p>
+                  </a:txBody>
+                  <a:tcPr>
+                    <a:solidFill>
+                      <a:srgbClr val="15292F"/>
+                    </a:solidFill>
+                  </a:tcPr>
+                </a:tc>
+                <a:tc>
+                  <a:txBody>
+                    <a:bodyPr/>
+                    <a:lstStyle/>
+                    <a:p>
+                      <a:pPr algn="ctr"/>
+                      <a:r>
+                        <a:rPr lang="pt-BR" sz="1200" dirty="0"/>
+                        <a:t>Status</a:t>
+                      </a:r>
+                    </a:p>
+                  </a:txBody>
+                  <a:tcPr>
+                    <a:solidFill>
+                      <a:srgbClr val="15292F"/>
+                    </a:solidFill>
+                  </a:tcPr>
+                </a:tc>
+                <a:tc>
+                  <a:txBody>
+                    <a:bodyPr/>
+                    <a:lstStyle/>
+                    <a:p>
+                      <a:pPr algn="ctr"/>
+                      <a:r>
+                        <a:rPr lang="pt-BR" sz="1200" dirty="0"/>
+                        <a:t>Data Previsão</a:t>
+                      </a:r>
+                    </a:p>
+                  </a:txBody>
+                  <a:tcPr>
+                    <a:solidFill>
+                      <a:srgbClr val="15292F"/>
+                    </a:solidFill>
+                  </a:tcPr>
+                </a:tc>
+                <a:tc>
+                  <a:txBody>
+                    <a:bodyPr/>
+                    <a:lstStyle/>
+                    <a:p>
+                      <a:pPr algn="ctr"/>
+                      <a:r>
+                        <a:rPr lang="pt-BR" sz="1200" dirty="0"/>
+                        <a:t>Data Conclusão</a:t>
+                      </a:r>
+                    </a:p>
+                  </a:txBody>
+                  <a:tcPr>
+                    <a:solidFill>
+                      <a:srgbClr val="15292F"/>
+                    </a:solidFill>
+                  </a:tcPr>
+                </a:tc>
+                <a:extLst>
+                  <a:ext uri="{0D108BD9-81ED-4DB2-BD59-A6C34878D82A}">
+                    <a16:rowId xmlns:a16="http://schemas.microsoft.com/office/drawing/2014/main" val="2023499912"/>
+                  </a:ext>
+                </a:extLst>
+              </a:tr>
+            </a:tbl>
+          </a:graphicData>
+        </a:graphic>
+      </p:graphicFrame>
+      <p:graphicFrame>
+        <p:nvGraphicFramePr>
+          <p:cNvPr id="44" name="Tabela 43">
+            <a:extLst>
+              <a:ext uri="{FF2B5EF4-FFF2-40B4-BE49-F238E27FC236}">
+                <a16:creationId xmlns:a16="http://schemas.microsoft.com/office/drawing/2014/main" id="{CD8E77BA-7B89-4B4D-9EA3-007B44B83737}"/>
+              </a:ext>
+            </a:extLst>
+          </p:cNvPr>
+          <p:cNvGraphicFramePr>
+            <a:graphicFrameLocks noGrp="1"/>
+          </p:cNvGraphicFramePr>
+          <p:nvPr>
+            <p:extLst/>
+          </p:nvPr>
+        </p:nvGraphicFramePr>
+        <p:xfrm>
+          <a:off x="2748985" y="2811907"/>
+          <a:ext cx="8871255" cy="357907"/>
+        </p:xfrm>
+        <a:graphic>
+          <a:graphicData uri="http://schemas.openxmlformats.org/drawingml/2006/table">
+            <a:tbl>
+              <a:tblPr firstRow="1" bandRow="1">
+                <a:tableStyleId>{5C22544A-7EE6-4342-B048-85BDC9FD1C3A}</a:tableStyleId>
+              </a:tblPr>
+              <a:tblGrid>
+                <a:gridCol w="1105563">
+                  <a:extLst>
+                    <a:ext uri="{9D8B030D-6E8A-4147-A177-3AD203B41FA5}">
+                      <a16:colId xmlns:a16="http://schemas.microsoft.com/office/drawing/2014/main" val="1214311235"/>
+                    </a:ext>
+                  </a:extLst>
+                </a:gridCol>
+                <a:gridCol w="1097280">
+                  <a:extLst>
+                    <a:ext uri="{9D8B030D-6E8A-4147-A177-3AD203B41FA5}">
+                      <a16:colId xmlns:a16="http://schemas.microsoft.com/office/drawing/2014/main" val="567709411"/>
+                    </a:ext>
+                  </a:extLst>
+                </a:gridCol>
+                <a:gridCol w="1254035">
+                  <a:extLst>
+                    <a:ext uri="{9D8B030D-6E8A-4147-A177-3AD203B41FA5}">
+                      <a16:colId xmlns:a16="http://schemas.microsoft.com/office/drawing/2014/main" val="1287829829"/>
+                    </a:ext>
+                  </a:extLst>
+                </a:gridCol>
+                <a:gridCol w="1716259">
+                  <a:extLst>
+                    <a:ext uri="{9D8B030D-6E8A-4147-A177-3AD203B41FA5}">
+                      <a16:colId xmlns:a16="http://schemas.microsoft.com/office/drawing/2014/main" val="1577194061"/>
+                    </a:ext>
+                  </a:extLst>
+                </a:gridCol>
+                <a:gridCol w="1081201">
+                  <a:extLst>
+                    <a:ext uri="{9D8B030D-6E8A-4147-A177-3AD203B41FA5}">
+                      <a16:colId xmlns:a16="http://schemas.microsoft.com/office/drawing/2014/main" val="1426856637"/>
+                    </a:ext>
+                  </a:extLst>
+                </a:gridCol>
+                <a:gridCol w="1349595">
+                  <a:extLst>
+                    <a:ext uri="{9D8B030D-6E8A-4147-A177-3AD203B41FA5}">
+                      <a16:colId xmlns:a16="http://schemas.microsoft.com/office/drawing/2014/main" val="2960355438"/>
+                    </a:ext>
+                  </a:extLst>
+                </a:gridCol>
+                <a:gridCol w="1267322">
+                  <a:extLst>
+                    <a:ext uri="{9D8B030D-6E8A-4147-A177-3AD203B41FA5}">
+                      <a16:colId xmlns:a16="http://schemas.microsoft.com/office/drawing/2014/main" val="3684080775"/>
+                    </a:ext>
+                  </a:extLst>
+                </a:gridCol>
+              </a:tblGrid>
+              <a:tr h="357907">
+                <a:tc>
+                  <a:txBody>
+                    <a:bodyPr/>
+                    <a:lstStyle/>
+                    <a:p>
+                      <a:pPr algn="ctr"/>
+                      <a:r>
+                        <a:rPr lang="pt-BR" sz="1200" dirty="0">
+                          <a:solidFill>
+                            <a:srgbClr val="15292F"/>
+                          </a:solidFill>
+                        </a:rPr>
+                        <a:t>0130122</a:t>
+                      </a:r>
+                    </a:p>
+                  </a:txBody>
+                  <a:tcPr>
+                    <a:solidFill>
+                      <a:schemeClr val="bg2"/>
+                    </a:solidFill>
+                  </a:tcPr>
+                </a:tc>
+                <a:tc>
+                  <a:txBody>
+                    <a:bodyPr/>
+                    <a:lstStyle/>
+                    <a:p>
+                      <a:pPr algn="ctr"/>
+                      <a:r>
+                        <a:rPr lang="pt-BR" sz="1200" dirty="0">
+                          <a:solidFill>
+                            <a:srgbClr val="15292F"/>
+                          </a:solidFill>
+                        </a:rPr>
+                        <a:t>22/10/2018</a:t>
+                      </a:r>
+                    </a:p>
+                  </a:txBody>
+                  <a:tcPr>
+                    <a:solidFill>
+                      <a:schemeClr val="bg2"/>
+                    </a:solidFill>
+                  </a:tcPr>
+                </a:tc>
+                <a:tc>
+                  <a:txBody>
+                    <a:bodyPr/>
+                    <a:lstStyle/>
+                    <a:p>
+                      <a:pPr algn="ctr"/>
+                      <a:r>
+                        <a:rPr lang="pt-BR" sz="1200" dirty="0">
+                          <a:solidFill>
+                            <a:srgbClr val="15292F"/>
+                          </a:solidFill>
+                        </a:rPr>
+                        <a:t>José Mauro</a:t>
+                      </a:r>
+                    </a:p>
+                  </a:txBody>
+                  <a:tcPr>
+                    <a:solidFill>
+                      <a:schemeClr val="bg2"/>
+                    </a:solidFill>
+                  </a:tcPr>
+                </a:tc>
+                <a:tc>
+                  <a:txBody>
+                    <a:bodyPr/>
+                    <a:lstStyle/>
+                    <a:p>
+                      <a:pPr algn="ctr"/>
+                      <a:r>
+                        <a:rPr lang="pt-BR" sz="1200" dirty="0">
+                          <a:solidFill>
+                            <a:srgbClr val="15292F"/>
+                          </a:solidFill>
+                        </a:rPr>
+                        <a:t>Ao registrar um prod...</a:t>
+                      </a:r>
+                    </a:p>
+                  </a:txBody>
+                  <a:tcPr>
+                    <a:solidFill>
+                      <a:schemeClr val="bg2"/>
+                    </a:solidFill>
+                  </a:tcPr>
+                </a:tc>
+                <a:tc>
+                  <a:txBody>
+                    <a:bodyPr/>
+                    <a:lstStyle/>
+                    <a:p>
+                      <a:pPr algn="ctr"/>
+                      <a:r>
+                        <a:rPr lang="pt-BR" sz="1200" dirty="0">
+                          <a:solidFill>
+                            <a:srgbClr val="15292F"/>
+                          </a:solidFill>
+                        </a:rPr>
+                        <a:t>Homologação</a:t>
+                      </a:r>
+                    </a:p>
+                  </a:txBody>
+                  <a:tcPr>
+                    <a:solidFill>
+                      <a:schemeClr val="bg2"/>
+                    </a:solidFill>
+                  </a:tcPr>
+                </a:tc>
+                <a:tc>
+                  <a:txBody>
+                    <a:bodyPr/>
+                    <a:lstStyle/>
+                    <a:p>
+                      <a:pPr algn="ctr"/>
+                      <a:r>
+                        <a:rPr lang="pt-BR" sz="1200" dirty="0">
+                          <a:solidFill>
+                            <a:srgbClr val="15292F"/>
+                          </a:solidFill>
+                        </a:rPr>
+                        <a:t>24/10/2018</a:t>
+                      </a:r>
+                    </a:p>
+                  </a:txBody>
+                  <a:tcPr>
+                    <a:solidFill>
+                      <a:schemeClr val="bg2"/>
+                    </a:solidFill>
+                  </a:tcPr>
+                </a:tc>
+                <a:tc>
+                  <a:txBody>
+                    <a:bodyPr/>
+                    <a:lstStyle/>
+                    <a:p>
+                      <a:pPr algn="ctr"/>
+                      <a:r>
+                        <a:rPr lang="pt-BR" sz="1200" dirty="0">
+                          <a:solidFill>
+                            <a:srgbClr val="15292F"/>
+                          </a:solidFill>
+                        </a:rPr>
+                        <a:t>_</a:t>
+                      </a:r>
+                    </a:p>
+                  </a:txBody>
+                  <a:tcPr>
+                    <a:solidFill>
+                      <a:schemeClr val="bg2"/>
+                    </a:solidFill>
+                  </a:tcPr>
+                </a:tc>
+                <a:extLst>
+                  <a:ext uri="{0D108BD9-81ED-4DB2-BD59-A6C34878D82A}">
+                    <a16:rowId xmlns:a16="http://schemas.microsoft.com/office/drawing/2014/main" val="2023499912"/>
+                  </a:ext>
+                </a:extLst>
+              </a:tr>
+            </a:tbl>
+          </a:graphicData>
+        </a:graphic>
+      </p:graphicFrame>
+      <p:graphicFrame>
+        <p:nvGraphicFramePr>
+          <p:cNvPr id="45" name="Tabela 44">
+            <a:extLst>
+              <a:ext uri="{FF2B5EF4-FFF2-40B4-BE49-F238E27FC236}">
+                <a16:creationId xmlns:a16="http://schemas.microsoft.com/office/drawing/2014/main" id="{9D6D05DA-BB1C-41D8-AFBD-A01D7A5C416B}"/>
+              </a:ext>
+            </a:extLst>
+          </p:cNvPr>
+          <p:cNvGraphicFramePr>
+            <a:graphicFrameLocks noGrp="1"/>
+          </p:cNvGraphicFramePr>
+          <p:nvPr>
+            <p:extLst/>
+          </p:nvPr>
+        </p:nvGraphicFramePr>
+        <p:xfrm>
+          <a:off x="2748985" y="3291199"/>
+          <a:ext cx="8871255" cy="357907"/>
+        </p:xfrm>
+        <a:graphic>
+          <a:graphicData uri="http://schemas.openxmlformats.org/drawingml/2006/table">
+            <a:tbl>
+              <a:tblPr firstRow="1" bandRow="1">
+                <a:tableStyleId>{5C22544A-7EE6-4342-B048-85BDC9FD1C3A}</a:tableStyleId>
+              </a:tblPr>
+              <a:tblGrid>
+                <a:gridCol w="1105563">
+                  <a:extLst>
+                    <a:ext uri="{9D8B030D-6E8A-4147-A177-3AD203B41FA5}">
+                      <a16:colId xmlns:a16="http://schemas.microsoft.com/office/drawing/2014/main" val="1214311235"/>
+                    </a:ext>
+                  </a:extLst>
+                </a:gridCol>
+                <a:gridCol w="1097280">
+                  <a:extLst>
+                    <a:ext uri="{9D8B030D-6E8A-4147-A177-3AD203B41FA5}">
+                      <a16:colId xmlns:a16="http://schemas.microsoft.com/office/drawing/2014/main" val="567709411"/>
+                    </a:ext>
+                  </a:extLst>
+                </a:gridCol>
+                <a:gridCol w="1254035">
+                  <a:extLst>
+                    <a:ext uri="{9D8B030D-6E8A-4147-A177-3AD203B41FA5}">
+                      <a16:colId xmlns:a16="http://schemas.microsoft.com/office/drawing/2014/main" val="1287829829"/>
+                    </a:ext>
+                  </a:extLst>
+                </a:gridCol>
+                <a:gridCol w="1716259">
+                  <a:extLst>
+                    <a:ext uri="{9D8B030D-6E8A-4147-A177-3AD203B41FA5}">
+                      <a16:colId xmlns:a16="http://schemas.microsoft.com/office/drawing/2014/main" val="1577194061"/>
+                    </a:ext>
+                  </a:extLst>
+                </a:gridCol>
+                <a:gridCol w="1081201">
+                  <a:extLst>
+                    <a:ext uri="{9D8B030D-6E8A-4147-A177-3AD203B41FA5}">
+                      <a16:colId xmlns:a16="http://schemas.microsoft.com/office/drawing/2014/main" val="1426856637"/>
+                    </a:ext>
+                  </a:extLst>
+                </a:gridCol>
+                <a:gridCol w="1349595">
+                  <a:extLst>
+                    <a:ext uri="{9D8B030D-6E8A-4147-A177-3AD203B41FA5}">
+                      <a16:colId xmlns:a16="http://schemas.microsoft.com/office/drawing/2014/main" val="2960355438"/>
+                    </a:ext>
+                  </a:extLst>
+                </a:gridCol>
+                <a:gridCol w="1267322">
+                  <a:extLst>
+                    <a:ext uri="{9D8B030D-6E8A-4147-A177-3AD203B41FA5}">
+                      <a16:colId xmlns:a16="http://schemas.microsoft.com/office/drawing/2014/main" val="3684080775"/>
+                    </a:ext>
+                  </a:extLst>
+                </a:gridCol>
+              </a:tblGrid>
+              <a:tr h="357907">
+                <a:tc>
+                  <a:txBody>
+                    <a:bodyPr/>
+                    <a:lstStyle/>
+                    <a:p>
+                      <a:pPr algn="ctr"/>
+                      <a:r>
+                        <a:rPr lang="pt-BR" sz="1200" dirty="0">
+                          <a:solidFill>
+                            <a:srgbClr val="15292F"/>
+                          </a:solidFill>
+                        </a:rPr>
+                        <a:t>0130222</a:t>
+                      </a:r>
+                    </a:p>
+                  </a:txBody>
+                  <a:tcPr>
+                    <a:solidFill>
+                      <a:schemeClr val="bg2"/>
+                    </a:solidFill>
+                  </a:tcPr>
+                </a:tc>
+                <a:tc>
+                  <a:txBody>
+                    <a:bodyPr/>
+                    <a:lstStyle/>
+                    <a:p>
+                      <a:pPr algn="ctr"/>
+                      <a:r>
+                        <a:rPr lang="pt-BR" sz="1200" dirty="0">
+                          <a:solidFill>
+                            <a:srgbClr val="15292F"/>
+                          </a:solidFill>
+                        </a:rPr>
+                        <a:t>22/10/2018</a:t>
+                      </a:r>
+                    </a:p>
+                  </a:txBody>
+                  <a:tcPr>
+                    <a:solidFill>
+                      <a:schemeClr val="bg2"/>
+                    </a:solidFill>
+                  </a:tcPr>
+                </a:tc>
+                <a:tc>
+                  <a:txBody>
+                    <a:bodyPr/>
+                    <a:lstStyle/>
+                    <a:p>
+                      <a:pPr algn="ctr"/>
+                      <a:r>
+                        <a:rPr lang="pt-BR" sz="1200" dirty="0">
+                          <a:solidFill>
+                            <a:srgbClr val="15292F"/>
+                          </a:solidFill>
+                        </a:rPr>
+                        <a:t>Ana Maria</a:t>
+                      </a:r>
+                    </a:p>
+                  </a:txBody>
+                  <a:tcPr>
+                    <a:solidFill>
+                      <a:schemeClr val="bg2"/>
+                    </a:solidFill>
+                  </a:tcPr>
+                </a:tc>
+                <a:tc>
+                  <a:txBody>
+                    <a:bodyPr/>
+                    <a:lstStyle/>
+                    <a:p>
+                      <a:pPr algn="ctr"/>
+                      <a:r>
+                        <a:rPr lang="pt-BR" sz="1200" dirty="0">
+                          <a:solidFill>
+                            <a:srgbClr val="15292F"/>
+                          </a:solidFill>
+                        </a:rPr>
+                        <a:t>Ao registrar um prod...</a:t>
+                      </a:r>
+                    </a:p>
+                  </a:txBody>
+                  <a:tcPr>
+                    <a:solidFill>
+                      <a:schemeClr val="bg2"/>
+                    </a:solidFill>
+                  </a:tcPr>
+                </a:tc>
+                <a:tc>
+                  <a:txBody>
+                    <a:bodyPr/>
+                    <a:lstStyle/>
+                    <a:p>
+                      <a:pPr algn="ctr"/>
+                      <a:r>
+                        <a:rPr lang="pt-BR" sz="1200" dirty="0">
+                          <a:solidFill>
+                            <a:srgbClr val="15292F"/>
+                          </a:solidFill>
+                        </a:rPr>
+                        <a:t>Andamento</a:t>
+                      </a:r>
+                    </a:p>
+                  </a:txBody>
+                  <a:tcPr>
+                    <a:solidFill>
+                      <a:schemeClr val="bg2"/>
+                    </a:solidFill>
+                  </a:tcPr>
+                </a:tc>
+                <a:tc>
+                  <a:txBody>
+                    <a:bodyPr/>
+                    <a:lstStyle/>
+                    <a:p>
+                      <a:pPr algn="ctr"/>
+                      <a:r>
+                        <a:rPr lang="pt-BR" sz="1200" dirty="0">
+                          <a:solidFill>
+                            <a:srgbClr val="15292F"/>
+                          </a:solidFill>
+                        </a:rPr>
+                        <a:t>24/10/2018</a:t>
+                      </a:r>
+                    </a:p>
+                  </a:txBody>
+                  <a:tcPr>
+                    <a:solidFill>
+                      <a:schemeClr val="bg2"/>
+                    </a:solidFill>
+                  </a:tcPr>
+                </a:tc>
+                <a:tc>
+                  <a:txBody>
+                    <a:bodyPr/>
+                    <a:lstStyle/>
+                    <a:p>
+                      <a:pPr algn="ctr"/>
+                      <a:r>
+                        <a:rPr lang="pt-BR" sz="1200" dirty="0">
+                          <a:solidFill>
+                            <a:srgbClr val="15292F"/>
+                          </a:solidFill>
+                        </a:rPr>
+                        <a:t>_</a:t>
+                      </a:r>
+                    </a:p>
+                  </a:txBody>
+                  <a:tcPr>
+                    <a:solidFill>
+                      <a:schemeClr val="bg2"/>
+                    </a:solidFill>
+                  </a:tcPr>
+                </a:tc>
+                <a:extLst>
+                  <a:ext uri="{0D108BD9-81ED-4DB2-BD59-A6C34878D82A}">
+                    <a16:rowId xmlns:a16="http://schemas.microsoft.com/office/drawing/2014/main" val="2023499912"/>
+                  </a:ext>
+                </a:extLst>
+              </a:tr>
+            </a:tbl>
+          </a:graphicData>
+        </a:graphic>
+      </p:graphicFrame>
+      <p:graphicFrame>
+        <p:nvGraphicFramePr>
+          <p:cNvPr id="46" name="Tabela 45">
+            <a:extLst>
+              <a:ext uri="{FF2B5EF4-FFF2-40B4-BE49-F238E27FC236}">
+                <a16:creationId xmlns:a16="http://schemas.microsoft.com/office/drawing/2014/main" id="{B7DB588C-0757-4A4E-A0BC-3B95756BD2E6}"/>
+              </a:ext>
+            </a:extLst>
+          </p:cNvPr>
+          <p:cNvGraphicFramePr>
+            <a:graphicFrameLocks noGrp="1"/>
+          </p:cNvGraphicFramePr>
+          <p:nvPr>
+            <p:extLst/>
+          </p:nvPr>
+        </p:nvGraphicFramePr>
+        <p:xfrm>
+          <a:off x="2748985" y="3770491"/>
+          <a:ext cx="8871255" cy="357907"/>
+        </p:xfrm>
+        <a:graphic>
+          <a:graphicData uri="http://schemas.openxmlformats.org/drawingml/2006/table">
+            <a:tbl>
+              <a:tblPr firstRow="1" bandRow="1">
+                <a:tableStyleId>{5C22544A-7EE6-4342-B048-85BDC9FD1C3A}</a:tableStyleId>
+              </a:tblPr>
+              <a:tblGrid>
+                <a:gridCol w="1105563">
+                  <a:extLst>
+                    <a:ext uri="{9D8B030D-6E8A-4147-A177-3AD203B41FA5}">
+                      <a16:colId xmlns:a16="http://schemas.microsoft.com/office/drawing/2014/main" val="1214311235"/>
+                    </a:ext>
+                  </a:extLst>
+                </a:gridCol>
+                <a:gridCol w="1097280">
+                  <a:extLst>
+                    <a:ext uri="{9D8B030D-6E8A-4147-A177-3AD203B41FA5}">
+                      <a16:colId xmlns:a16="http://schemas.microsoft.com/office/drawing/2014/main" val="567709411"/>
+                    </a:ext>
+                  </a:extLst>
+                </a:gridCol>
+                <a:gridCol w="1254035">
+                  <a:extLst>
+                    <a:ext uri="{9D8B030D-6E8A-4147-A177-3AD203B41FA5}">
+                      <a16:colId xmlns:a16="http://schemas.microsoft.com/office/drawing/2014/main" val="1287829829"/>
+                    </a:ext>
+                  </a:extLst>
+                </a:gridCol>
+                <a:gridCol w="1716259">
+                  <a:extLst>
+                    <a:ext uri="{9D8B030D-6E8A-4147-A177-3AD203B41FA5}">
+                      <a16:colId xmlns:a16="http://schemas.microsoft.com/office/drawing/2014/main" val="1577194061"/>
+                    </a:ext>
+                  </a:extLst>
+                </a:gridCol>
+                <a:gridCol w="1081201">
+                  <a:extLst>
+                    <a:ext uri="{9D8B030D-6E8A-4147-A177-3AD203B41FA5}">
+                      <a16:colId xmlns:a16="http://schemas.microsoft.com/office/drawing/2014/main" val="1426856637"/>
+                    </a:ext>
+                  </a:extLst>
+                </a:gridCol>
+                <a:gridCol w="1349595">
+                  <a:extLst>
+                    <a:ext uri="{9D8B030D-6E8A-4147-A177-3AD203B41FA5}">
+                      <a16:colId xmlns:a16="http://schemas.microsoft.com/office/drawing/2014/main" val="2960355438"/>
+                    </a:ext>
+                  </a:extLst>
+                </a:gridCol>
+                <a:gridCol w="1267322">
+                  <a:extLst>
+                    <a:ext uri="{9D8B030D-6E8A-4147-A177-3AD203B41FA5}">
+                      <a16:colId xmlns:a16="http://schemas.microsoft.com/office/drawing/2014/main" val="3684080775"/>
+                    </a:ext>
+                  </a:extLst>
+                </a:gridCol>
+              </a:tblGrid>
+              <a:tr h="357907">
+                <a:tc>
+                  <a:txBody>
+                    <a:bodyPr/>
+                    <a:lstStyle/>
+                    <a:p>
+                      <a:pPr algn="ctr"/>
+                      <a:r>
+                        <a:rPr lang="pt-BR" sz="1200" dirty="0">
+                          <a:solidFill>
+                            <a:srgbClr val="15292F"/>
+                          </a:solidFill>
+                        </a:rPr>
+                        <a:t>0130123</a:t>
+                      </a:r>
+                    </a:p>
+                  </a:txBody>
+                  <a:tcPr>
+                    <a:solidFill>
+                      <a:schemeClr val="bg2"/>
+                    </a:solidFill>
+                  </a:tcPr>
+                </a:tc>
+                <a:tc>
+                  <a:txBody>
+                    <a:bodyPr/>
+                    <a:lstStyle/>
+                    <a:p>
+                      <a:pPr algn="ctr"/>
+                      <a:r>
+                        <a:rPr lang="pt-BR" sz="1200" dirty="0">
+                          <a:solidFill>
+                            <a:srgbClr val="15292F"/>
+                          </a:solidFill>
+                        </a:rPr>
+                        <a:t>23/10/2018</a:t>
+                      </a:r>
+                    </a:p>
+                  </a:txBody>
+                  <a:tcPr>
+                    <a:solidFill>
+                      <a:schemeClr val="bg2"/>
+                    </a:solidFill>
+                  </a:tcPr>
+                </a:tc>
+                <a:tc>
+                  <a:txBody>
+                    <a:bodyPr/>
+                    <a:lstStyle/>
+                    <a:p>
+                      <a:pPr algn="ctr"/>
+                      <a:r>
+                        <a:rPr lang="pt-BR" sz="1200" dirty="0">
+                          <a:solidFill>
+                            <a:srgbClr val="15292F"/>
+                          </a:solidFill>
+                        </a:rPr>
+                        <a:t>Paula</a:t>
+                      </a:r>
+                    </a:p>
+                  </a:txBody>
+                  <a:tcPr>
+                    <a:solidFill>
+                      <a:schemeClr val="bg2"/>
+                    </a:solidFill>
+                  </a:tcPr>
+                </a:tc>
+                <a:tc>
+                  <a:txBody>
+                    <a:bodyPr/>
+                    <a:lstStyle/>
+                    <a:p>
+                      <a:pPr algn="ctr"/>
+                      <a:r>
+                        <a:rPr lang="pt-BR" sz="1200" dirty="0">
+                          <a:solidFill>
+                            <a:srgbClr val="15292F"/>
+                          </a:solidFill>
+                        </a:rPr>
+                        <a:t>Como faço para...</a:t>
+                      </a:r>
+                    </a:p>
+                  </a:txBody>
+                  <a:tcPr>
+                    <a:solidFill>
+                      <a:schemeClr val="bg2"/>
+                    </a:solidFill>
+                  </a:tcPr>
+                </a:tc>
+                <a:tc>
+                  <a:txBody>
+                    <a:bodyPr/>
+                    <a:lstStyle/>
+                    <a:p>
+                      <a:pPr algn="ctr"/>
+                      <a:r>
+                        <a:rPr lang="pt-BR" sz="1200" dirty="0">
+                          <a:solidFill>
+                            <a:srgbClr val="15292F"/>
+                          </a:solidFill>
+                        </a:rPr>
+                        <a:t>Classificada</a:t>
+                      </a:r>
+                    </a:p>
+                  </a:txBody>
+                  <a:tcPr>
+                    <a:solidFill>
+                      <a:schemeClr val="bg2"/>
+                    </a:solidFill>
+                  </a:tcPr>
+                </a:tc>
+                <a:tc>
+                  <a:txBody>
+                    <a:bodyPr/>
+                    <a:lstStyle/>
+                    <a:p>
+                      <a:pPr algn="ctr"/>
+                      <a:r>
+                        <a:rPr lang="pt-BR" sz="1200" dirty="0">
+                          <a:solidFill>
+                            <a:srgbClr val="15292F"/>
+                          </a:solidFill>
+                        </a:rPr>
+                        <a:t>25/10/2018</a:t>
+                      </a:r>
+                    </a:p>
+                  </a:txBody>
+                  <a:tcPr>
+                    <a:solidFill>
+                      <a:schemeClr val="bg2"/>
+                    </a:solidFill>
+                  </a:tcPr>
+                </a:tc>
+                <a:tc>
+                  <a:txBody>
+                    <a:bodyPr/>
+                    <a:lstStyle/>
+                    <a:p>
+                      <a:pPr algn="ctr"/>
+                      <a:r>
+                        <a:rPr lang="pt-BR" sz="1200" dirty="0">
+                          <a:solidFill>
+                            <a:srgbClr val="15292F"/>
+                          </a:solidFill>
+                        </a:rPr>
+                        <a:t>_</a:t>
+                      </a:r>
+                    </a:p>
+                  </a:txBody>
+                  <a:tcPr>
+                    <a:solidFill>
+                      <a:schemeClr val="bg2"/>
+                    </a:solidFill>
+                  </a:tcPr>
+                </a:tc>
+                <a:extLst>
+                  <a:ext uri="{0D108BD9-81ED-4DB2-BD59-A6C34878D82A}">
+                    <a16:rowId xmlns:a16="http://schemas.microsoft.com/office/drawing/2014/main" val="2023499912"/>
+                  </a:ext>
+                </a:extLst>
+              </a:tr>
+            </a:tbl>
+          </a:graphicData>
+        </a:graphic>
+      </p:graphicFrame>
+      <p:graphicFrame>
+        <p:nvGraphicFramePr>
+          <p:cNvPr id="31" name="Tabela 30">
+            <a:extLst>
+              <a:ext uri="{FF2B5EF4-FFF2-40B4-BE49-F238E27FC236}">
+                <a16:creationId xmlns:a16="http://schemas.microsoft.com/office/drawing/2014/main" id="{E99872EE-53E2-466C-B9CD-5D3C30C64C84}"/>
+              </a:ext>
+            </a:extLst>
+          </p:cNvPr>
+          <p:cNvGraphicFramePr>
+            <a:graphicFrameLocks noGrp="1"/>
+          </p:cNvGraphicFramePr>
+          <p:nvPr>
+            <p:extLst/>
+          </p:nvPr>
+        </p:nvGraphicFramePr>
+        <p:xfrm>
+          <a:off x="2736917" y="4263903"/>
+          <a:ext cx="8871255" cy="357907"/>
+        </p:xfrm>
+        <a:graphic>
+          <a:graphicData uri="http://schemas.openxmlformats.org/drawingml/2006/table">
+            <a:tbl>
+              <a:tblPr firstRow="1" bandRow="1">
+                <a:tableStyleId>{5C22544A-7EE6-4342-B048-85BDC9FD1C3A}</a:tableStyleId>
+              </a:tblPr>
+              <a:tblGrid>
+                <a:gridCol w="1105563">
+                  <a:extLst>
+                    <a:ext uri="{9D8B030D-6E8A-4147-A177-3AD203B41FA5}">
+                      <a16:colId xmlns:a16="http://schemas.microsoft.com/office/drawing/2014/main" val="1214311235"/>
+                    </a:ext>
+                  </a:extLst>
+                </a:gridCol>
+                <a:gridCol w="1097280">
+                  <a:extLst>
+                    <a:ext uri="{9D8B030D-6E8A-4147-A177-3AD203B41FA5}">
+                      <a16:colId xmlns:a16="http://schemas.microsoft.com/office/drawing/2014/main" val="567709411"/>
+                    </a:ext>
+                  </a:extLst>
+                </a:gridCol>
+                <a:gridCol w="1254035">
+                  <a:extLst>
+                    <a:ext uri="{9D8B030D-6E8A-4147-A177-3AD203B41FA5}">
+                      <a16:colId xmlns:a16="http://schemas.microsoft.com/office/drawing/2014/main" val="1287829829"/>
+                    </a:ext>
+                  </a:extLst>
+                </a:gridCol>
+                <a:gridCol w="1716259">
+                  <a:extLst>
+                    <a:ext uri="{9D8B030D-6E8A-4147-A177-3AD203B41FA5}">
+                      <a16:colId xmlns:a16="http://schemas.microsoft.com/office/drawing/2014/main" val="1577194061"/>
+                    </a:ext>
+                  </a:extLst>
+                </a:gridCol>
+                <a:gridCol w="1081201">
+                  <a:extLst>
+                    <a:ext uri="{9D8B030D-6E8A-4147-A177-3AD203B41FA5}">
+                      <a16:colId xmlns:a16="http://schemas.microsoft.com/office/drawing/2014/main" val="1426856637"/>
+                    </a:ext>
+                  </a:extLst>
+                </a:gridCol>
+                <a:gridCol w="1349595">
+                  <a:extLst>
+                    <a:ext uri="{9D8B030D-6E8A-4147-A177-3AD203B41FA5}">
+                      <a16:colId xmlns:a16="http://schemas.microsoft.com/office/drawing/2014/main" val="2960355438"/>
+                    </a:ext>
+                  </a:extLst>
+                </a:gridCol>
+                <a:gridCol w="1267322">
+                  <a:extLst>
+                    <a:ext uri="{9D8B030D-6E8A-4147-A177-3AD203B41FA5}">
+                      <a16:colId xmlns:a16="http://schemas.microsoft.com/office/drawing/2014/main" val="3684080775"/>
+                    </a:ext>
+                  </a:extLst>
+                </a:gridCol>
+              </a:tblGrid>
+              <a:tr h="357907">
+                <a:tc>
+                  <a:txBody>
+                    <a:bodyPr/>
+                    <a:lstStyle/>
+                    <a:p>
+                      <a:pPr algn="ctr"/>
+                      <a:r>
+                        <a:rPr lang="pt-BR" sz="1200" dirty="0">
+                          <a:solidFill>
+                            <a:srgbClr val="15292F"/>
+                          </a:solidFill>
+                        </a:rPr>
+                        <a:t>0130223</a:t>
+                      </a:r>
+                    </a:p>
+                  </a:txBody>
+                  <a:tcPr>
+                    <a:solidFill>
+                      <a:schemeClr val="bg2"/>
+                    </a:solidFill>
+                  </a:tcPr>
+                </a:tc>
+                <a:tc>
+                  <a:txBody>
+                    <a:bodyPr/>
+                    <a:lstStyle/>
+                    <a:p>
+                      <a:pPr algn="ctr"/>
+                      <a:r>
+                        <a:rPr lang="pt-BR" sz="1200" dirty="0">
+                          <a:solidFill>
+                            <a:srgbClr val="15292F"/>
+                          </a:solidFill>
+                        </a:rPr>
+                        <a:t>23/10/2018</a:t>
+                      </a:r>
+                    </a:p>
+                  </a:txBody>
+                  <a:tcPr>
+                    <a:solidFill>
+                      <a:schemeClr val="bg2"/>
+                    </a:solidFill>
+                  </a:tcPr>
+                </a:tc>
+                <a:tc>
+                  <a:txBody>
+                    <a:bodyPr/>
+                    <a:lstStyle/>
+                    <a:p>
+                      <a:pPr algn="ctr"/>
+                      <a:r>
+                        <a:rPr lang="pt-BR" sz="1200" dirty="0">
+                          <a:solidFill>
+                            <a:srgbClr val="15292F"/>
+                          </a:solidFill>
+                        </a:rPr>
+                        <a:t>Paula</a:t>
+                      </a:r>
+                    </a:p>
+                  </a:txBody>
+                  <a:tcPr>
+                    <a:solidFill>
+                      <a:schemeClr val="bg2"/>
+                    </a:solidFill>
+                  </a:tcPr>
+                </a:tc>
+                <a:tc>
+                  <a:txBody>
+                    <a:bodyPr/>
+                    <a:lstStyle/>
+                    <a:p>
+                      <a:pPr algn="ctr"/>
+                      <a:r>
+                        <a:rPr lang="pt-BR" sz="1200" dirty="0">
+                          <a:solidFill>
+                            <a:srgbClr val="15292F"/>
+                          </a:solidFill>
+                        </a:rPr>
+                        <a:t>Não estou </a:t>
+                      </a:r>
+                      <a:r>
+                        <a:rPr lang="pt-BR" sz="1200" dirty="0" err="1">
+                          <a:solidFill>
+                            <a:srgbClr val="15292F"/>
+                          </a:solidFill>
+                        </a:rPr>
+                        <a:t>conse</a:t>
+                      </a:r>
+                      <a:r>
+                        <a:rPr lang="pt-BR" sz="1200" dirty="0">
+                          <a:solidFill>
+                            <a:srgbClr val="15292F"/>
+                          </a:solidFill>
+                        </a:rPr>
+                        <a:t>...</a:t>
+                      </a:r>
+                    </a:p>
+                  </a:txBody>
+                  <a:tcPr>
+                    <a:solidFill>
+                      <a:schemeClr val="bg2"/>
+                    </a:solidFill>
+                  </a:tcPr>
+                </a:tc>
+                <a:tc>
+                  <a:txBody>
+                    <a:bodyPr/>
+                    <a:lstStyle/>
+                    <a:p>
+                      <a:pPr algn="ctr"/>
+                      <a:r>
+                        <a:rPr lang="pt-BR" sz="1200" dirty="0">
+                          <a:solidFill>
+                            <a:srgbClr val="15292F"/>
+                          </a:solidFill>
+                        </a:rPr>
+                        <a:t>Aberta</a:t>
+                      </a:r>
+                    </a:p>
+                  </a:txBody>
+                  <a:tcPr>
+                    <a:solidFill>
+                      <a:schemeClr val="bg2"/>
+                    </a:solidFill>
+                  </a:tcPr>
+                </a:tc>
+                <a:tc>
+                  <a:txBody>
+                    <a:bodyPr/>
+                    <a:lstStyle/>
+                    <a:p>
+                      <a:pPr algn="ctr"/>
+                      <a:r>
+                        <a:rPr lang="pt-BR" sz="1200" dirty="0">
+                          <a:solidFill>
+                            <a:srgbClr val="15292F"/>
+                          </a:solidFill>
+                        </a:rPr>
+                        <a:t>_</a:t>
+                      </a:r>
+                    </a:p>
+                  </a:txBody>
+                  <a:tcPr>
+                    <a:solidFill>
+                      <a:schemeClr val="bg2"/>
+                    </a:solidFill>
+                  </a:tcPr>
+                </a:tc>
+                <a:tc>
+                  <a:txBody>
+                    <a:bodyPr/>
+                    <a:lstStyle/>
+                    <a:p>
+                      <a:pPr algn="ctr"/>
+                      <a:r>
+                        <a:rPr lang="pt-BR" sz="1200" dirty="0">
+                          <a:solidFill>
+                            <a:srgbClr val="15292F"/>
+                          </a:solidFill>
+                        </a:rPr>
+                        <a:t>_</a:t>
+                      </a:r>
+                    </a:p>
+                  </a:txBody>
+                  <a:tcPr>
+                    <a:solidFill>
+                      <a:schemeClr val="bg2"/>
+                    </a:solidFill>
+                  </a:tcPr>
+                </a:tc>
+                <a:extLst>
+                  <a:ext uri="{0D108BD9-81ED-4DB2-BD59-A6C34878D82A}">
+                    <a16:rowId xmlns:a16="http://schemas.microsoft.com/office/drawing/2014/main" val="2023499912"/>
+                  </a:ext>
+                </a:extLst>
+              </a:tr>
+            </a:tbl>
+          </a:graphicData>
+        </a:graphic>
+      </p:graphicFrame>
+      <p:sp>
+        <p:nvSpPr>
+          <p:cNvPr id="2" name="Elipse 1">
+            <a:extLst>
+              <a:ext uri="{FF2B5EF4-FFF2-40B4-BE49-F238E27FC236}">
+                <a16:creationId xmlns:a16="http://schemas.microsoft.com/office/drawing/2014/main" id="{21BB156D-A3FC-47C4-B6A7-D6BDB0264E4A}"/>
+              </a:ext>
+            </a:extLst>
+          </p:cNvPr>
+          <p:cNvSpPr/>
+          <p:nvPr/>
+        </p:nvSpPr>
+        <p:spPr>
+          <a:xfrm>
+            <a:off x="3999073" y="1752965"/>
+            <a:ext cx="144537" cy="141880"/>
+          </a:xfrm>
+          <a:prstGeom prst="ellipse">
+            <a:avLst/>
+          </a:prstGeom>
+          <a:solidFill>
+            <a:srgbClr val="15292F"/>
+          </a:solidFill>
+          <a:ln>
+            <a:solidFill>
+              <a:srgbClr val="15292F"/>
+            </a:solidFill>
+          </a:ln>
+        </p:spPr>
+        <p:style>
+          <a:lnRef idx="2">
+            <a:schemeClr val="accent1">
+              <a:shade val="50000"/>
+            </a:schemeClr>
+          </a:lnRef>
+          <a:fillRef idx="1">
+            <a:schemeClr val="accent1"/>
+          </a:fillRef>
+          <a:effectRef idx="0">
+            <a:schemeClr val="accent1"/>
+          </a:effectRef>
+          <a:fontRef idx="minor">
+            <a:schemeClr val="lt1"/>
+          </a:fontRef>
+        </p:style>
+        <p:txBody>
+          <a:bodyPr rtlCol="0" anchor="ctr"/>
+          <a:lstStyle/>
+          <a:p>
+            <a:pPr algn="ctr"/>
+            <a:endParaRPr lang="pt-BR"/>
+          </a:p>
+        </p:txBody>
+      </p:sp>
+      <p:sp>
+        <p:nvSpPr>
+          <p:cNvPr id="38" name="CaixaDeTexto 37">
+            <a:extLst>
+              <a:ext uri="{FF2B5EF4-FFF2-40B4-BE49-F238E27FC236}">
+                <a16:creationId xmlns:a16="http://schemas.microsoft.com/office/drawing/2014/main" id="{261427F6-9B23-4227-B108-E9315148FC4D}"/>
+              </a:ext>
+            </a:extLst>
+          </p:cNvPr>
+          <p:cNvSpPr txBox="1"/>
+          <p:nvPr/>
+        </p:nvSpPr>
+        <p:spPr>
+          <a:xfrm>
+            <a:off x="4177233" y="1643654"/>
+            <a:ext cx="2113258" cy="369332"/>
+          </a:xfrm>
+          <a:prstGeom prst="rect">
+            <a:avLst/>
+          </a:prstGeom>
+          <a:noFill/>
+        </p:spPr>
+        <p:txBody>
+          <a:bodyPr wrap="square" rtlCol="0">
+            <a:spAutoFit/>
+          </a:bodyPr>
+          <a:lstStyle/>
+          <a:p>
+            <a:r>
+              <a:rPr lang="pt-BR" dirty="0"/>
+              <a:t>Aberta</a:t>
+            </a:r>
+          </a:p>
+        </p:txBody>
+      </p:sp>
+      <p:sp>
+        <p:nvSpPr>
+          <p:cNvPr id="42" name="Elipse 41">
+            <a:extLst>
+              <a:ext uri="{FF2B5EF4-FFF2-40B4-BE49-F238E27FC236}">
+                <a16:creationId xmlns:a16="http://schemas.microsoft.com/office/drawing/2014/main" id="{8A528765-1CCD-40DB-A53A-DAA83769AB0C}"/>
+              </a:ext>
+            </a:extLst>
+          </p:cNvPr>
+          <p:cNvSpPr/>
+          <p:nvPr/>
+        </p:nvSpPr>
+        <p:spPr>
+          <a:xfrm>
+            <a:off x="5176111" y="1764317"/>
+            <a:ext cx="144537" cy="141880"/>
+          </a:xfrm>
+          <a:prstGeom prst="ellipse">
+            <a:avLst/>
+          </a:prstGeom>
+          <a:noFill/>
+          <a:ln>
+            <a:solidFill>
+              <a:srgbClr val="15292F"/>
+            </a:solidFill>
+          </a:ln>
+        </p:spPr>
+        <p:style>
+          <a:lnRef idx="2">
+            <a:schemeClr val="accent1">
+              <a:shade val="50000"/>
+            </a:schemeClr>
+          </a:lnRef>
+          <a:fillRef idx="1">
+            <a:schemeClr val="accent1"/>
+          </a:fillRef>
+          <a:effectRef idx="0">
+            <a:schemeClr val="accent1"/>
+          </a:effectRef>
+          <a:fontRef idx="minor">
+            <a:schemeClr val="lt1"/>
+          </a:fontRef>
+        </p:style>
+        <p:txBody>
+          <a:bodyPr rtlCol="0" anchor="ctr"/>
+          <a:lstStyle/>
+          <a:p>
+            <a:pPr algn="ctr"/>
+            <a:endParaRPr lang="pt-BR"/>
+          </a:p>
+        </p:txBody>
+      </p:sp>
+      <p:sp>
+        <p:nvSpPr>
+          <p:cNvPr id="47" name="CaixaDeTexto 46">
+            <a:extLst>
+              <a:ext uri="{FF2B5EF4-FFF2-40B4-BE49-F238E27FC236}">
+                <a16:creationId xmlns:a16="http://schemas.microsoft.com/office/drawing/2014/main" id="{A4B33ECC-425A-4480-9DDE-E3B5FC3E0F35}"/>
+              </a:ext>
+            </a:extLst>
+          </p:cNvPr>
+          <p:cNvSpPr txBox="1"/>
+          <p:nvPr/>
+        </p:nvSpPr>
+        <p:spPr>
+          <a:xfrm>
+            <a:off x="5354271" y="1655006"/>
+            <a:ext cx="2113258" cy="369332"/>
+          </a:xfrm>
+          <a:prstGeom prst="rect">
+            <a:avLst/>
+          </a:prstGeom>
+          <a:noFill/>
+        </p:spPr>
+        <p:txBody>
+          <a:bodyPr wrap="square" rtlCol="0">
+            <a:spAutoFit/>
+          </a:bodyPr>
+          <a:lstStyle/>
+          <a:p>
+            <a:r>
+              <a:rPr lang="pt-BR" dirty="0"/>
+              <a:t>Concluída</a:t>
+            </a:r>
+          </a:p>
+        </p:txBody>
+      </p:sp>
+      <p:sp>
+        <p:nvSpPr>
+          <p:cNvPr id="48" name="Elipse 47">
+            <a:extLst>
+              <a:ext uri="{FF2B5EF4-FFF2-40B4-BE49-F238E27FC236}">
+                <a16:creationId xmlns:a16="http://schemas.microsoft.com/office/drawing/2014/main" id="{97FF0D7F-1396-4C26-91B8-3403E2E5055B}"/>
+              </a:ext>
+            </a:extLst>
+          </p:cNvPr>
+          <p:cNvSpPr/>
+          <p:nvPr/>
+        </p:nvSpPr>
+        <p:spPr>
+          <a:xfrm>
+            <a:off x="6706805" y="1764317"/>
+            <a:ext cx="144537" cy="141880"/>
+          </a:xfrm>
+          <a:prstGeom prst="ellipse">
+            <a:avLst/>
+          </a:prstGeom>
+          <a:solidFill>
+            <a:schemeClr val="bg1"/>
+          </a:solidFill>
+          <a:ln>
+            <a:solidFill>
+              <a:srgbClr val="15292F"/>
+            </a:solidFill>
+          </a:ln>
+        </p:spPr>
+        <p:style>
+          <a:lnRef idx="2">
+            <a:schemeClr val="accent1">
+              <a:shade val="50000"/>
+            </a:schemeClr>
+          </a:lnRef>
+          <a:fillRef idx="1">
+            <a:schemeClr val="accent1"/>
+          </a:fillRef>
+          <a:effectRef idx="0">
+            <a:schemeClr val="accent1"/>
+          </a:effectRef>
+          <a:fontRef idx="minor">
+            <a:schemeClr val="lt1"/>
+          </a:fontRef>
+        </p:style>
+        <p:txBody>
+          <a:bodyPr rtlCol="0" anchor="ctr"/>
+          <a:lstStyle/>
+          <a:p>
+            <a:pPr algn="ctr"/>
+            <a:endParaRPr lang="pt-BR"/>
+          </a:p>
+        </p:txBody>
+      </p:sp>
+      <p:sp>
+        <p:nvSpPr>
+          <p:cNvPr id="49" name="CaixaDeTexto 48">
+            <a:extLst>
+              <a:ext uri="{FF2B5EF4-FFF2-40B4-BE49-F238E27FC236}">
+                <a16:creationId xmlns:a16="http://schemas.microsoft.com/office/drawing/2014/main" id="{4F80DD7A-FBD1-406D-A303-59F0BF5412E8}"/>
+              </a:ext>
+            </a:extLst>
+          </p:cNvPr>
+          <p:cNvSpPr txBox="1"/>
+          <p:nvPr/>
+        </p:nvSpPr>
+        <p:spPr>
+          <a:xfrm>
+            <a:off x="6978003" y="1655006"/>
+            <a:ext cx="2113258" cy="369332"/>
+          </a:xfrm>
+          <a:prstGeom prst="rect">
+            <a:avLst/>
+          </a:prstGeom>
+          <a:noFill/>
+        </p:spPr>
+        <p:txBody>
+          <a:bodyPr wrap="square" rtlCol="0">
+            <a:spAutoFit/>
+          </a:bodyPr>
+          <a:lstStyle/>
+          <a:p>
+            <a:r>
+              <a:rPr lang="pt-BR" dirty="0"/>
+              <a:t>Todas</a:t>
+            </a:r>
+          </a:p>
+        </p:txBody>
+      </p:sp>
+      <p:cxnSp>
+        <p:nvCxnSpPr>
+          <p:cNvPr id="50" name="Conector reto 49">
+            <a:extLst>
+              <a:ext uri="{FF2B5EF4-FFF2-40B4-BE49-F238E27FC236}">
+                <a16:creationId xmlns:a16="http://schemas.microsoft.com/office/drawing/2014/main" id="{87C41759-6863-4499-BDB2-63145DF7A0A2}"/>
+              </a:ext>
+            </a:extLst>
+          </p:cNvPr>
+          <p:cNvCxnSpPr>
+            <a:cxnSpLocks/>
+          </p:cNvCxnSpPr>
+          <p:nvPr/>
+        </p:nvCxnSpPr>
+        <p:spPr>
+          <a:xfrm flipV="1">
+            <a:off x="2760258" y="1966041"/>
+            <a:ext cx="8859982" cy="48120"/>
+          </a:xfrm>
+          <a:prstGeom prst="line">
+            <a:avLst/>
+          </a:prstGeom>
+          <a:ln>
+            <a:solidFill>
+              <a:srgbClr val="15292F"/>
+            </a:solidFill>
+          </a:ln>
+        </p:spPr>
+        <p:style>
+          <a:lnRef idx="1">
+            <a:schemeClr val="accent1"/>
+          </a:lnRef>
+          <a:fillRef idx="0">
+            <a:schemeClr val="accent1"/>
+          </a:fillRef>
+          <a:effectRef idx="0">
+            <a:schemeClr val="accent1"/>
+          </a:effectRef>
+          <a:fontRef idx="minor">
+            <a:schemeClr val="tx1"/>
+          </a:fontRef>
+        </p:style>
+      </p:cxnSp>
+      <p:sp>
+        <p:nvSpPr>
+          <p:cNvPr id="4" name="Retângulo 3">
+            <a:extLst>
+              <a:ext uri="{FF2B5EF4-FFF2-40B4-BE49-F238E27FC236}">
+                <a16:creationId xmlns:a16="http://schemas.microsoft.com/office/drawing/2014/main" id="{9B612DAF-DB33-41DC-BE6D-E368239BD8EC}"/>
+              </a:ext>
+            </a:extLst>
+          </p:cNvPr>
+          <p:cNvSpPr/>
+          <p:nvPr/>
+        </p:nvSpPr>
+        <p:spPr>
+          <a:xfrm>
+            <a:off x="3267293" y="1800996"/>
+            <a:ext cx="7785020" cy="4077387"/>
+          </a:xfrm>
+          <a:prstGeom prst="rect">
+            <a:avLst/>
+          </a:prstGeom>
+          <a:solidFill>
+            <a:schemeClr val="bg1"/>
+          </a:solidFill>
+          <a:ln>
+            <a:solidFill>
+              <a:srgbClr val="15292F"/>
+            </a:solidFill>
+          </a:ln>
+        </p:spPr>
+        <p:style>
+          <a:lnRef idx="2">
+            <a:schemeClr val="accent1">
+              <a:shade val="50000"/>
+            </a:schemeClr>
+          </a:lnRef>
+          <a:fillRef idx="1">
+            <a:schemeClr val="accent1"/>
+          </a:fillRef>
+          <a:effectRef idx="0">
+            <a:schemeClr val="accent1"/>
+          </a:effectRef>
+          <a:fontRef idx="minor">
+            <a:schemeClr val="lt1"/>
+          </a:fontRef>
+        </p:style>
+        <p:txBody>
+          <a:bodyPr rtlCol="0" anchor="ctr"/>
+          <a:lstStyle/>
+          <a:p>
+            <a:pPr algn="ctr"/>
+            <a:endParaRPr lang="pt-BR"/>
+          </a:p>
+        </p:txBody>
+      </p:sp>
+      <p:sp>
+        <p:nvSpPr>
+          <p:cNvPr id="5" name="Elipse 4">
+            <a:extLst>
+              <a:ext uri="{FF2B5EF4-FFF2-40B4-BE49-F238E27FC236}">
+                <a16:creationId xmlns:a16="http://schemas.microsoft.com/office/drawing/2014/main" id="{7A9E718C-0602-43E3-AC09-62BD444BFFFC}"/>
+              </a:ext>
+            </a:extLst>
+          </p:cNvPr>
+          <p:cNvSpPr/>
+          <p:nvPr/>
+        </p:nvSpPr>
+        <p:spPr>
+          <a:xfrm>
+            <a:off x="4217516" y="2521049"/>
+            <a:ext cx="516656" cy="493662"/>
+          </a:xfrm>
+          <a:prstGeom prst="ellipse">
+            <a:avLst/>
+          </a:prstGeom>
+          <a:solidFill>
+            <a:srgbClr val="03DB68"/>
+          </a:solidFill>
+          <a:ln>
+            <a:solidFill>
+              <a:srgbClr val="03DB68"/>
+            </a:solidFill>
+          </a:ln>
+        </p:spPr>
+        <p:style>
+          <a:lnRef idx="2">
+            <a:schemeClr val="accent1">
+              <a:shade val="50000"/>
+            </a:schemeClr>
+          </a:lnRef>
+          <a:fillRef idx="1">
+            <a:schemeClr val="accent1"/>
+          </a:fillRef>
+          <a:effectRef idx="0">
+            <a:schemeClr val="accent1"/>
+          </a:effectRef>
+          <a:fontRef idx="minor">
+            <a:schemeClr val="lt1"/>
+          </a:fontRef>
+        </p:style>
+        <p:txBody>
+          <a:bodyPr rtlCol="0" anchor="ctr"/>
+          <a:lstStyle/>
+          <a:p>
+            <a:pPr algn="ctr"/>
+            <a:endParaRPr lang="pt-BR"/>
+          </a:p>
+        </p:txBody>
+      </p:sp>
+      <p:sp>
+        <p:nvSpPr>
+          <p:cNvPr id="51" name="Elipse 50">
+            <a:extLst>
+              <a:ext uri="{FF2B5EF4-FFF2-40B4-BE49-F238E27FC236}">
+                <a16:creationId xmlns:a16="http://schemas.microsoft.com/office/drawing/2014/main" id="{5182B9F0-A428-4A73-93F0-B611C89F14A5}"/>
+              </a:ext>
+            </a:extLst>
+          </p:cNvPr>
+          <p:cNvSpPr/>
+          <p:nvPr/>
+        </p:nvSpPr>
+        <p:spPr>
+          <a:xfrm>
+            <a:off x="5500520" y="2505467"/>
+            <a:ext cx="516656" cy="493662"/>
+          </a:xfrm>
+          <a:prstGeom prst="ellipse">
+            <a:avLst/>
+          </a:prstGeom>
+          <a:solidFill>
+            <a:srgbClr val="03DB68"/>
+          </a:solidFill>
+          <a:ln>
+            <a:solidFill>
+              <a:srgbClr val="03DB68"/>
+            </a:solidFill>
+          </a:ln>
+        </p:spPr>
+        <p:style>
+          <a:lnRef idx="2">
+            <a:schemeClr val="accent1">
+              <a:shade val="50000"/>
+            </a:schemeClr>
+          </a:lnRef>
+          <a:fillRef idx="1">
+            <a:schemeClr val="accent1"/>
+          </a:fillRef>
+          <a:effectRef idx="0">
+            <a:schemeClr val="accent1"/>
+          </a:effectRef>
+          <a:fontRef idx="minor">
+            <a:schemeClr val="lt1"/>
+          </a:fontRef>
+        </p:style>
+        <p:txBody>
+          <a:bodyPr rtlCol="0" anchor="ctr"/>
+          <a:lstStyle/>
+          <a:p>
+            <a:pPr algn="ctr"/>
+            <a:endParaRPr lang="pt-BR"/>
+          </a:p>
+        </p:txBody>
+      </p:sp>
+      <p:sp>
+        <p:nvSpPr>
+          <p:cNvPr id="52" name="Elipse 51">
+            <a:extLst>
+              <a:ext uri="{FF2B5EF4-FFF2-40B4-BE49-F238E27FC236}">
+                <a16:creationId xmlns:a16="http://schemas.microsoft.com/office/drawing/2014/main" id="{901E2042-B3E5-4CFB-AE50-F53DB19BE85A}"/>
+              </a:ext>
+            </a:extLst>
+          </p:cNvPr>
+          <p:cNvSpPr/>
+          <p:nvPr/>
+        </p:nvSpPr>
+        <p:spPr>
+          <a:xfrm>
+            <a:off x="6807479" y="2501819"/>
+            <a:ext cx="516656" cy="493662"/>
+          </a:xfrm>
+          <a:prstGeom prst="ellipse">
+            <a:avLst/>
+          </a:prstGeom>
+          <a:solidFill>
+            <a:srgbClr val="03DB68"/>
+          </a:solidFill>
+          <a:ln>
+            <a:solidFill>
+              <a:srgbClr val="03DB68"/>
+            </a:solidFill>
+          </a:ln>
+        </p:spPr>
+        <p:style>
+          <a:lnRef idx="2">
+            <a:schemeClr val="accent1">
+              <a:shade val="50000"/>
+            </a:schemeClr>
+          </a:lnRef>
+          <a:fillRef idx="1">
+            <a:schemeClr val="accent1"/>
+          </a:fillRef>
+          <a:effectRef idx="0">
+            <a:schemeClr val="accent1"/>
+          </a:effectRef>
+          <a:fontRef idx="minor">
+            <a:schemeClr val="lt1"/>
+          </a:fontRef>
+        </p:style>
+        <p:txBody>
+          <a:bodyPr rtlCol="0" anchor="ctr"/>
+          <a:lstStyle/>
+          <a:p>
+            <a:pPr algn="ctr"/>
+            <a:endParaRPr lang="pt-BR"/>
+          </a:p>
+        </p:txBody>
+      </p:sp>
+      <p:sp>
+        <p:nvSpPr>
+          <p:cNvPr id="53" name="Elipse 52">
+            <a:extLst>
+              <a:ext uri="{FF2B5EF4-FFF2-40B4-BE49-F238E27FC236}">
+                <a16:creationId xmlns:a16="http://schemas.microsoft.com/office/drawing/2014/main" id="{A47356DE-D125-4946-991E-ADB98BC169FB}"/>
+              </a:ext>
+            </a:extLst>
+          </p:cNvPr>
+          <p:cNvSpPr/>
+          <p:nvPr/>
+        </p:nvSpPr>
+        <p:spPr>
+          <a:xfrm>
+            <a:off x="8094100" y="2473186"/>
+            <a:ext cx="516656" cy="493662"/>
+          </a:xfrm>
+          <a:prstGeom prst="ellipse">
+            <a:avLst/>
+          </a:prstGeom>
+          <a:solidFill>
+            <a:schemeClr val="bg1"/>
+          </a:solidFill>
+          <a:ln>
+            <a:solidFill>
+              <a:srgbClr val="03DB68"/>
+            </a:solidFill>
+          </a:ln>
+        </p:spPr>
+        <p:style>
+          <a:lnRef idx="2">
+            <a:schemeClr val="accent1">
+              <a:shade val="50000"/>
+            </a:schemeClr>
+          </a:lnRef>
+          <a:fillRef idx="1">
+            <a:schemeClr val="accent1"/>
+          </a:fillRef>
+          <a:effectRef idx="0">
+            <a:schemeClr val="accent1"/>
+          </a:effectRef>
+          <a:fontRef idx="minor">
+            <a:schemeClr val="lt1"/>
+          </a:fontRef>
+        </p:style>
+        <p:txBody>
+          <a:bodyPr rtlCol="0" anchor="ctr"/>
+          <a:lstStyle/>
+          <a:p>
+            <a:pPr algn="ctr"/>
+            <a:endParaRPr lang="pt-BR"/>
+          </a:p>
+        </p:txBody>
+      </p:sp>
+      <p:sp>
+        <p:nvSpPr>
+          <p:cNvPr id="54" name="Elipse 53">
+            <a:extLst>
+              <a:ext uri="{FF2B5EF4-FFF2-40B4-BE49-F238E27FC236}">
+                <a16:creationId xmlns:a16="http://schemas.microsoft.com/office/drawing/2014/main" id="{B632014D-7D43-4DEB-84F2-614BF8787ABD}"/>
+              </a:ext>
+            </a:extLst>
+          </p:cNvPr>
+          <p:cNvSpPr/>
+          <p:nvPr/>
+        </p:nvSpPr>
+        <p:spPr>
+          <a:xfrm>
+            <a:off x="9380721" y="2467516"/>
+            <a:ext cx="516656" cy="493662"/>
+          </a:xfrm>
+          <a:prstGeom prst="ellipse">
+            <a:avLst/>
+          </a:prstGeom>
+          <a:solidFill>
+            <a:schemeClr val="bg1"/>
+          </a:solidFill>
+          <a:ln>
+            <a:solidFill>
+              <a:srgbClr val="03DB68"/>
+            </a:solidFill>
+          </a:ln>
+        </p:spPr>
+        <p:style>
+          <a:lnRef idx="2">
+            <a:schemeClr val="accent1">
+              <a:shade val="50000"/>
+            </a:schemeClr>
+          </a:lnRef>
+          <a:fillRef idx="1">
+            <a:schemeClr val="accent1"/>
+          </a:fillRef>
+          <a:effectRef idx="0">
+            <a:schemeClr val="accent1"/>
+          </a:effectRef>
+          <a:fontRef idx="minor">
+            <a:schemeClr val="lt1"/>
+          </a:fontRef>
+        </p:style>
+        <p:txBody>
+          <a:bodyPr rtlCol="0" anchor="ctr"/>
+          <a:lstStyle/>
+          <a:p>
+            <a:pPr algn="ctr"/>
+            <a:endParaRPr lang="pt-BR"/>
+          </a:p>
+        </p:txBody>
+      </p:sp>
+      <p:sp>
+        <p:nvSpPr>
+          <p:cNvPr id="55" name="CaixaDeTexto 54">
+            <a:extLst>
+              <a:ext uri="{FF2B5EF4-FFF2-40B4-BE49-F238E27FC236}">
+                <a16:creationId xmlns:a16="http://schemas.microsoft.com/office/drawing/2014/main" id="{FA62672F-465E-451E-B344-A9269CCDDCBE}"/>
+              </a:ext>
+            </a:extLst>
+          </p:cNvPr>
+          <p:cNvSpPr txBox="1"/>
+          <p:nvPr/>
+        </p:nvSpPr>
+        <p:spPr>
+          <a:xfrm>
+            <a:off x="4076582" y="1951105"/>
+            <a:ext cx="1965773" cy="338554"/>
+          </a:xfrm>
+          <a:prstGeom prst="rect">
+            <a:avLst/>
+          </a:prstGeom>
+          <a:noFill/>
+        </p:spPr>
+        <p:txBody>
+          <a:bodyPr wrap="square" rtlCol="0">
+            <a:spAutoFit/>
+          </a:bodyPr>
+          <a:lstStyle/>
+          <a:p>
+            <a:r>
+              <a:rPr lang="pt-BR" sz="1600" b="1" dirty="0">
+                <a:solidFill>
+                  <a:srgbClr val="15292F"/>
+                </a:solidFill>
+              </a:rPr>
+              <a:t>Solicitação Número:</a:t>
+            </a:r>
+          </a:p>
+        </p:txBody>
+      </p:sp>
+      <p:sp>
+        <p:nvSpPr>
+          <p:cNvPr id="56" name="CaixaDeTexto 55">
+            <a:extLst>
+              <a:ext uri="{FF2B5EF4-FFF2-40B4-BE49-F238E27FC236}">
+                <a16:creationId xmlns:a16="http://schemas.microsoft.com/office/drawing/2014/main" id="{0F24D8B5-5B31-443F-9581-3B5BE66FE190}"/>
+              </a:ext>
+            </a:extLst>
+          </p:cNvPr>
+          <p:cNvSpPr txBox="1"/>
+          <p:nvPr/>
+        </p:nvSpPr>
+        <p:spPr>
+          <a:xfrm>
+            <a:off x="4071341" y="3005225"/>
+            <a:ext cx="1560935" cy="338554"/>
+          </a:xfrm>
+          <a:prstGeom prst="rect">
+            <a:avLst/>
+          </a:prstGeom>
+          <a:noFill/>
+        </p:spPr>
+        <p:txBody>
+          <a:bodyPr wrap="square" rtlCol="0">
+            <a:spAutoFit/>
+          </a:bodyPr>
+          <a:lstStyle/>
+          <a:p>
+            <a:r>
+              <a:rPr lang="pt-BR" sz="1600" b="1" dirty="0">
+                <a:solidFill>
+                  <a:srgbClr val="15292F"/>
+                </a:solidFill>
+              </a:rPr>
+              <a:t>Aberta</a:t>
+            </a:r>
+          </a:p>
+        </p:txBody>
+      </p:sp>
+      <p:sp>
+        <p:nvSpPr>
+          <p:cNvPr id="57" name="CaixaDeTexto 56">
+            <a:extLst>
+              <a:ext uri="{FF2B5EF4-FFF2-40B4-BE49-F238E27FC236}">
+                <a16:creationId xmlns:a16="http://schemas.microsoft.com/office/drawing/2014/main" id="{7519A088-8331-46EC-829D-CA0394E24FC5}"/>
+              </a:ext>
+            </a:extLst>
+          </p:cNvPr>
+          <p:cNvSpPr txBox="1"/>
+          <p:nvPr/>
+        </p:nvSpPr>
+        <p:spPr>
+          <a:xfrm>
+            <a:off x="5176111" y="3002559"/>
+            <a:ext cx="1560935" cy="338554"/>
+          </a:xfrm>
+          <a:prstGeom prst="rect">
+            <a:avLst/>
+          </a:prstGeom>
+          <a:noFill/>
+        </p:spPr>
+        <p:txBody>
+          <a:bodyPr wrap="square" rtlCol="0">
+            <a:spAutoFit/>
+          </a:bodyPr>
+          <a:lstStyle/>
+          <a:p>
+            <a:r>
+              <a:rPr lang="pt-BR" sz="1600" b="1" dirty="0">
+                <a:solidFill>
+                  <a:srgbClr val="15292F"/>
+                </a:solidFill>
+              </a:rPr>
+              <a:t>Classificada</a:t>
+            </a:r>
+          </a:p>
+        </p:txBody>
+      </p:sp>
+      <p:sp>
+        <p:nvSpPr>
+          <p:cNvPr id="59" name="CaixaDeTexto 58">
+            <a:extLst>
+              <a:ext uri="{FF2B5EF4-FFF2-40B4-BE49-F238E27FC236}">
+                <a16:creationId xmlns:a16="http://schemas.microsoft.com/office/drawing/2014/main" id="{EFECB0DB-6939-45BA-91AA-104E251FB5D1}"/>
+              </a:ext>
+            </a:extLst>
+          </p:cNvPr>
+          <p:cNvSpPr txBox="1"/>
+          <p:nvPr/>
+        </p:nvSpPr>
+        <p:spPr>
+          <a:xfrm>
+            <a:off x="6553277" y="3000459"/>
+            <a:ext cx="1560935" cy="338554"/>
+          </a:xfrm>
+          <a:prstGeom prst="rect">
+            <a:avLst/>
+          </a:prstGeom>
+          <a:noFill/>
+        </p:spPr>
+        <p:txBody>
+          <a:bodyPr wrap="square" rtlCol="0">
+            <a:spAutoFit/>
+          </a:bodyPr>
+          <a:lstStyle/>
+          <a:p>
+            <a:r>
+              <a:rPr lang="pt-BR" sz="1600" b="1" dirty="0">
+                <a:solidFill>
+                  <a:srgbClr val="15292F"/>
+                </a:solidFill>
+              </a:rPr>
+              <a:t>Andamento</a:t>
+            </a:r>
+          </a:p>
+        </p:txBody>
+      </p:sp>
+      <p:sp>
+        <p:nvSpPr>
+          <p:cNvPr id="60" name="CaixaDeTexto 59">
+            <a:extLst>
+              <a:ext uri="{FF2B5EF4-FFF2-40B4-BE49-F238E27FC236}">
+                <a16:creationId xmlns:a16="http://schemas.microsoft.com/office/drawing/2014/main" id="{56BF6736-17A9-4E25-AFB8-0B6D72BA4061}"/>
+              </a:ext>
+            </a:extLst>
+          </p:cNvPr>
+          <p:cNvSpPr txBox="1"/>
+          <p:nvPr/>
+        </p:nvSpPr>
+        <p:spPr>
+          <a:xfrm>
+            <a:off x="7703570" y="2999905"/>
+            <a:ext cx="1560935" cy="338554"/>
+          </a:xfrm>
+          <a:prstGeom prst="rect">
+            <a:avLst/>
+          </a:prstGeom>
+          <a:noFill/>
+        </p:spPr>
+        <p:txBody>
+          <a:bodyPr wrap="square" rtlCol="0">
+            <a:spAutoFit/>
+          </a:bodyPr>
+          <a:lstStyle/>
+          <a:p>
+            <a:r>
+              <a:rPr lang="pt-BR" sz="1600" b="1" dirty="0">
+                <a:solidFill>
+                  <a:srgbClr val="15292F"/>
+                </a:solidFill>
+              </a:rPr>
+              <a:t>Homologação</a:t>
+            </a:r>
+          </a:p>
+        </p:txBody>
+      </p:sp>
+      <p:sp>
+        <p:nvSpPr>
+          <p:cNvPr id="61" name="CaixaDeTexto 60">
+            <a:extLst>
+              <a:ext uri="{FF2B5EF4-FFF2-40B4-BE49-F238E27FC236}">
+                <a16:creationId xmlns:a16="http://schemas.microsoft.com/office/drawing/2014/main" id="{4A139AB2-59BA-4C5B-8C1F-5FC7FD38DFF7}"/>
+              </a:ext>
+            </a:extLst>
+          </p:cNvPr>
+          <p:cNvSpPr txBox="1"/>
+          <p:nvPr/>
+        </p:nvSpPr>
+        <p:spPr>
+          <a:xfrm>
+            <a:off x="9152849" y="2996123"/>
+            <a:ext cx="1560935" cy="338554"/>
+          </a:xfrm>
+          <a:prstGeom prst="rect">
+            <a:avLst/>
+          </a:prstGeom>
+          <a:noFill/>
+        </p:spPr>
+        <p:txBody>
+          <a:bodyPr wrap="square" rtlCol="0">
+            <a:spAutoFit/>
+          </a:bodyPr>
+          <a:lstStyle/>
+          <a:p>
+            <a:r>
+              <a:rPr lang="pt-BR" sz="1600" b="1" dirty="0">
+                <a:solidFill>
+                  <a:srgbClr val="15292F"/>
+                </a:solidFill>
+              </a:rPr>
+              <a:t>Concluída</a:t>
+            </a:r>
+          </a:p>
+        </p:txBody>
+      </p:sp>
+      <p:sp>
+        <p:nvSpPr>
+          <p:cNvPr id="62" name="CaixaDeTexto 61">
+            <a:extLst>
+              <a:ext uri="{FF2B5EF4-FFF2-40B4-BE49-F238E27FC236}">
+                <a16:creationId xmlns:a16="http://schemas.microsoft.com/office/drawing/2014/main" id="{627DBC23-9164-4E35-8397-CB9DA2A3E434}"/>
+              </a:ext>
+            </a:extLst>
+          </p:cNvPr>
+          <p:cNvSpPr txBox="1"/>
+          <p:nvPr/>
+        </p:nvSpPr>
+        <p:spPr>
+          <a:xfrm>
+            <a:off x="4335070" y="2594105"/>
+            <a:ext cx="1560935" cy="338554"/>
+          </a:xfrm>
+          <a:prstGeom prst="rect">
+            <a:avLst/>
+          </a:prstGeom>
+          <a:noFill/>
+        </p:spPr>
+        <p:txBody>
+          <a:bodyPr wrap="square" rtlCol="0">
+            <a:spAutoFit/>
+          </a:bodyPr>
+          <a:lstStyle/>
+          <a:p>
+            <a:r>
+              <a:rPr lang="pt-BR" sz="1600" b="1" dirty="0">
+                <a:solidFill>
+                  <a:schemeClr val="bg1"/>
+                </a:solidFill>
+              </a:rPr>
+              <a:t>1</a:t>
+            </a:r>
+          </a:p>
+        </p:txBody>
+      </p:sp>
+      <p:sp>
+        <p:nvSpPr>
+          <p:cNvPr id="63" name="CaixaDeTexto 62">
+            <a:extLst>
+              <a:ext uri="{FF2B5EF4-FFF2-40B4-BE49-F238E27FC236}">
+                <a16:creationId xmlns:a16="http://schemas.microsoft.com/office/drawing/2014/main" id="{2D9BB9DE-0F44-4EE5-8399-B609245EE33D}"/>
+              </a:ext>
+            </a:extLst>
+          </p:cNvPr>
+          <p:cNvSpPr txBox="1"/>
+          <p:nvPr/>
+        </p:nvSpPr>
+        <p:spPr>
+          <a:xfrm>
+            <a:off x="5627612" y="2577492"/>
+            <a:ext cx="1560935" cy="338554"/>
+          </a:xfrm>
+          <a:prstGeom prst="rect">
+            <a:avLst/>
+          </a:prstGeom>
+          <a:noFill/>
+        </p:spPr>
+        <p:txBody>
+          <a:bodyPr wrap="square" rtlCol="0">
+            <a:spAutoFit/>
+          </a:bodyPr>
+          <a:lstStyle/>
+          <a:p>
+            <a:r>
+              <a:rPr lang="pt-BR" sz="1600" b="1" dirty="0">
+                <a:solidFill>
+                  <a:schemeClr val="bg1"/>
+                </a:solidFill>
+              </a:rPr>
+              <a:t>2</a:t>
+            </a:r>
+          </a:p>
+        </p:txBody>
+      </p:sp>
+      <p:sp>
+        <p:nvSpPr>
+          <p:cNvPr id="64" name="CaixaDeTexto 63">
+            <a:extLst>
+              <a:ext uri="{FF2B5EF4-FFF2-40B4-BE49-F238E27FC236}">
+                <a16:creationId xmlns:a16="http://schemas.microsoft.com/office/drawing/2014/main" id="{819972F3-7997-4729-8DE7-6905F383FF65}"/>
+              </a:ext>
+            </a:extLst>
+          </p:cNvPr>
+          <p:cNvSpPr txBox="1"/>
+          <p:nvPr/>
+        </p:nvSpPr>
+        <p:spPr>
+          <a:xfrm>
+            <a:off x="6932912" y="2577492"/>
+            <a:ext cx="1560935" cy="338554"/>
+          </a:xfrm>
+          <a:prstGeom prst="rect">
+            <a:avLst/>
+          </a:prstGeom>
+          <a:noFill/>
+        </p:spPr>
+        <p:txBody>
+          <a:bodyPr wrap="square" rtlCol="0">
+            <a:spAutoFit/>
+          </a:bodyPr>
+          <a:lstStyle/>
+          <a:p>
+            <a:r>
+              <a:rPr lang="pt-BR" sz="1600" b="1" dirty="0">
+                <a:solidFill>
+                  <a:schemeClr val="bg1"/>
+                </a:solidFill>
+              </a:rPr>
+              <a:t>3</a:t>
+            </a:r>
+          </a:p>
+        </p:txBody>
+      </p:sp>
+      <p:sp>
+        <p:nvSpPr>
+          <p:cNvPr id="65" name="CaixaDeTexto 64">
+            <a:extLst>
+              <a:ext uri="{FF2B5EF4-FFF2-40B4-BE49-F238E27FC236}">
+                <a16:creationId xmlns:a16="http://schemas.microsoft.com/office/drawing/2014/main" id="{24451129-D8B8-4F60-82BC-EB3DE26D2854}"/>
+              </a:ext>
+            </a:extLst>
+          </p:cNvPr>
+          <p:cNvSpPr txBox="1"/>
+          <p:nvPr/>
+        </p:nvSpPr>
+        <p:spPr>
+          <a:xfrm>
+            <a:off x="8215271" y="2551329"/>
+            <a:ext cx="1560935" cy="338554"/>
+          </a:xfrm>
+          <a:prstGeom prst="rect">
+            <a:avLst/>
+          </a:prstGeom>
+          <a:noFill/>
+        </p:spPr>
+        <p:txBody>
+          <a:bodyPr wrap="square" rtlCol="0">
+            <a:spAutoFit/>
+          </a:bodyPr>
+          <a:lstStyle/>
+          <a:p>
+            <a:r>
+              <a:rPr lang="pt-BR" sz="1600" b="1" dirty="0">
+                <a:solidFill>
+                  <a:srgbClr val="03DB68"/>
+                </a:solidFill>
+              </a:rPr>
+              <a:t>4</a:t>
+            </a:r>
+          </a:p>
+        </p:txBody>
+      </p:sp>
+      <p:sp>
+        <p:nvSpPr>
+          <p:cNvPr id="66" name="CaixaDeTexto 65">
+            <a:extLst>
+              <a:ext uri="{FF2B5EF4-FFF2-40B4-BE49-F238E27FC236}">
+                <a16:creationId xmlns:a16="http://schemas.microsoft.com/office/drawing/2014/main" id="{CBD5150F-ADF7-401E-92F9-00CA8008AB65}"/>
+              </a:ext>
+            </a:extLst>
+          </p:cNvPr>
+          <p:cNvSpPr txBox="1"/>
+          <p:nvPr/>
+        </p:nvSpPr>
+        <p:spPr>
+          <a:xfrm>
+            <a:off x="9505436" y="2548668"/>
+            <a:ext cx="1560935" cy="338554"/>
+          </a:xfrm>
+          <a:prstGeom prst="rect">
+            <a:avLst/>
+          </a:prstGeom>
+          <a:noFill/>
+        </p:spPr>
+        <p:txBody>
+          <a:bodyPr wrap="square" rtlCol="0">
+            <a:spAutoFit/>
+          </a:bodyPr>
+          <a:lstStyle/>
+          <a:p>
+            <a:r>
+              <a:rPr lang="pt-BR" sz="1600" b="1" dirty="0">
+                <a:solidFill>
+                  <a:srgbClr val="03DB68"/>
+                </a:solidFill>
+              </a:rPr>
+              <a:t>5</a:t>
+            </a:r>
+          </a:p>
+        </p:txBody>
+      </p:sp>
+      <p:cxnSp>
+        <p:nvCxnSpPr>
+          <p:cNvPr id="7" name="Conector reto 6">
+            <a:extLst>
+              <a:ext uri="{FF2B5EF4-FFF2-40B4-BE49-F238E27FC236}">
+                <a16:creationId xmlns:a16="http://schemas.microsoft.com/office/drawing/2014/main" id="{96CC6EA7-DB57-461C-92A7-A138270D2D67}"/>
+              </a:ext>
+            </a:extLst>
+          </p:cNvPr>
+          <p:cNvCxnSpPr/>
+          <p:nvPr/>
+        </p:nvCxnSpPr>
+        <p:spPr>
+          <a:xfrm>
+            <a:off x="4734172" y="2763382"/>
+            <a:ext cx="816397" cy="0"/>
+          </a:xfrm>
+          <a:prstGeom prst="line">
+            <a:avLst/>
+          </a:prstGeom>
+          <a:ln>
+            <a:solidFill>
+              <a:srgbClr val="03DB68"/>
+            </a:solidFill>
+          </a:ln>
+        </p:spPr>
+        <p:style>
+          <a:lnRef idx="1">
+            <a:schemeClr val="accent1"/>
+          </a:lnRef>
+          <a:fillRef idx="0">
+            <a:schemeClr val="accent1"/>
+          </a:fillRef>
+          <a:effectRef idx="0">
+            <a:schemeClr val="accent1"/>
+          </a:effectRef>
+          <a:fontRef idx="minor">
+            <a:schemeClr val="tx1"/>
+          </a:fontRef>
+        </p:style>
+      </p:cxnSp>
+      <p:cxnSp>
+        <p:nvCxnSpPr>
+          <p:cNvPr id="67" name="Conector reto 66">
+            <a:extLst>
+              <a:ext uri="{FF2B5EF4-FFF2-40B4-BE49-F238E27FC236}">
+                <a16:creationId xmlns:a16="http://schemas.microsoft.com/office/drawing/2014/main" id="{B1493231-AFBB-4023-A396-0C983D4A0505}"/>
+              </a:ext>
+            </a:extLst>
+          </p:cNvPr>
+          <p:cNvCxnSpPr/>
+          <p:nvPr/>
+        </p:nvCxnSpPr>
+        <p:spPr>
+          <a:xfrm>
+            <a:off x="6042355" y="2746769"/>
+            <a:ext cx="816397" cy="0"/>
+          </a:xfrm>
+          <a:prstGeom prst="line">
+            <a:avLst/>
+          </a:prstGeom>
+          <a:ln>
+            <a:solidFill>
+              <a:srgbClr val="03DB68"/>
+            </a:solidFill>
+          </a:ln>
+        </p:spPr>
+        <p:style>
+          <a:lnRef idx="1">
+            <a:schemeClr val="accent1"/>
+          </a:lnRef>
+          <a:fillRef idx="0">
+            <a:schemeClr val="accent1"/>
+          </a:fillRef>
+          <a:effectRef idx="0">
+            <a:schemeClr val="accent1"/>
+          </a:effectRef>
+          <a:fontRef idx="minor">
+            <a:schemeClr val="tx1"/>
+          </a:fontRef>
+        </p:style>
+      </p:cxnSp>
+      <p:cxnSp>
+        <p:nvCxnSpPr>
+          <p:cNvPr id="68" name="Conector reto 67">
+            <a:extLst>
+              <a:ext uri="{FF2B5EF4-FFF2-40B4-BE49-F238E27FC236}">
+                <a16:creationId xmlns:a16="http://schemas.microsoft.com/office/drawing/2014/main" id="{7D523FC5-1D78-45DD-A09F-9085BAC9FE34}"/>
+              </a:ext>
+            </a:extLst>
+          </p:cNvPr>
+          <p:cNvCxnSpPr>
+            <a:cxnSpLocks/>
+          </p:cNvCxnSpPr>
+          <p:nvPr/>
+        </p:nvCxnSpPr>
+        <p:spPr>
+          <a:xfrm>
+            <a:off x="7324135" y="2729639"/>
+            <a:ext cx="769965" cy="0"/>
+          </a:xfrm>
+          <a:prstGeom prst="line">
+            <a:avLst/>
+          </a:prstGeom>
+          <a:ln>
+            <a:solidFill>
+              <a:srgbClr val="03DB68"/>
+            </a:solidFill>
+          </a:ln>
+        </p:spPr>
+        <p:style>
+          <a:lnRef idx="1">
+            <a:schemeClr val="accent1"/>
+          </a:lnRef>
+          <a:fillRef idx="0">
+            <a:schemeClr val="accent1"/>
+          </a:fillRef>
+          <a:effectRef idx="0">
+            <a:schemeClr val="accent1"/>
+          </a:effectRef>
+          <a:fontRef idx="minor">
+            <a:schemeClr val="tx1"/>
+          </a:fontRef>
+        </p:style>
+      </p:cxnSp>
+      <p:cxnSp>
+        <p:nvCxnSpPr>
+          <p:cNvPr id="69" name="Conector reto 68">
+            <a:extLst>
+              <a:ext uri="{FF2B5EF4-FFF2-40B4-BE49-F238E27FC236}">
+                <a16:creationId xmlns:a16="http://schemas.microsoft.com/office/drawing/2014/main" id="{10939A9A-6E28-4D0A-9118-C7871EE5D473}"/>
+              </a:ext>
+            </a:extLst>
+          </p:cNvPr>
+          <p:cNvCxnSpPr>
+            <a:cxnSpLocks/>
+          </p:cNvCxnSpPr>
+          <p:nvPr/>
+        </p:nvCxnSpPr>
+        <p:spPr>
+          <a:xfrm>
+            <a:off x="8610756" y="2714347"/>
+            <a:ext cx="769965" cy="0"/>
+          </a:xfrm>
+          <a:prstGeom prst="line">
+            <a:avLst/>
+          </a:prstGeom>
+          <a:ln>
+            <a:solidFill>
+              <a:srgbClr val="03DB68"/>
+            </a:solidFill>
+          </a:ln>
+        </p:spPr>
+        <p:style>
+          <a:lnRef idx="1">
+            <a:schemeClr val="accent1"/>
+          </a:lnRef>
+          <a:fillRef idx="0">
+            <a:schemeClr val="accent1"/>
+          </a:fillRef>
+          <a:effectRef idx="0">
+            <a:schemeClr val="accent1"/>
+          </a:effectRef>
+          <a:fontRef idx="minor">
+            <a:schemeClr val="tx1"/>
+          </a:fontRef>
+        </p:style>
+      </p:cxnSp>
+      <p:sp>
+        <p:nvSpPr>
+          <p:cNvPr id="70" name="CaixaDeTexto 69">
+            <a:extLst>
+              <a:ext uri="{FF2B5EF4-FFF2-40B4-BE49-F238E27FC236}">
+                <a16:creationId xmlns:a16="http://schemas.microsoft.com/office/drawing/2014/main" id="{2CFFA88B-F4C6-41C0-BEA1-B716FF4303C5}"/>
+              </a:ext>
+            </a:extLst>
+          </p:cNvPr>
+          <p:cNvSpPr txBox="1"/>
+          <p:nvPr/>
+        </p:nvSpPr>
+        <p:spPr>
+          <a:xfrm>
+            <a:off x="5850407" y="1919776"/>
+            <a:ext cx="1560935" cy="400110"/>
+          </a:xfrm>
+          <a:prstGeom prst="rect">
+            <a:avLst/>
+          </a:prstGeom>
+          <a:noFill/>
+        </p:spPr>
+        <p:txBody>
+          <a:bodyPr wrap="square" rtlCol="0">
+            <a:spAutoFit/>
+          </a:bodyPr>
+          <a:lstStyle/>
+          <a:p>
+            <a:r>
+              <a:rPr lang="pt-BR" sz="2000" b="1" dirty="0">
+                <a:solidFill>
+                  <a:srgbClr val="15292F"/>
+                </a:solidFill>
+              </a:rPr>
+              <a:t>0130222</a:t>
+            </a:r>
+          </a:p>
+        </p:txBody>
+      </p:sp>
+      <p:sp>
+        <p:nvSpPr>
+          <p:cNvPr id="71" name="CaixaDeTexto 70">
+            <a:extLst>
+              <a:ext uri="{FF2B5EF4-FFF2-40B4-BE49-F238E27FC236}">
+                <a16:creationId xmlns:a16="http://schemas.microsoft.com/office/drawing/2014/main" id="{DC7987A2-1046-4F19-84A6-8716DBF785CB}"/>
+              </a:ext>
+            </a:extLst>
+          </p:cNvPr>
+          <p:cNvSpPr txBox="1"/>
+          <p:nvPr/>
+        </p:nvSpPr>
+        <p:spPr>
+          <a:xfrm>
+            <a:off x="3467561" y="3684263"/>
+            <a:ext cx="1878443" cy="307777"/>
+          </a:xfrm>
+          <a:prstGeom prst="rect">
+            <a:avLst/>
+          </a:prstGeom>
+          <a:noFill/>
+        </p:spPr>
+        <p:txBody>
+          <a:bodyPr wrap="square" rtlCol="0">
+            <a:spAutoFit/>
+          </a:bodyPr>
+          <a:lstStyle/>
+          <a:p>
+            <a:r>
+              <a:rPr lang="pt-BR" sz="1400" b="1" dirty="0">
+                <a:solidFill>
+                  <a:srgbClr val="15292F"/>
+                </a:solidFill>
+              </a:rPr>
+              <a:t>Data de abertura:</a:t>
+            </a:r>
+          </a:p>
+        </p:txBody>
+      </p:sp>
+      <p:sp>
+        <p:nvSpPr>
+          <p:cNvPr id="72" name="CaixaDeTexto 71">
+            <a:extLst>
+              <a:ext uri="{FF2B5EF4-FFF2-40B4-BE49-F238E27FC236}">
+                <a16:creationId xmlns:a16="http://schemas.microsoft.com/office/drawing/2014/main" id="{887335DF-0009-48B7-9508-9BA393854DC1}"/>
+              </a:ext>
+            </a:extLst>
+          </p:cNvPr>
+          <p:cNvSpPr txBox="1"/>
+          <p:nvPr/>
+        </p:nvSpPr>
+        <p:spPr>
+          <a:xfrm>
+            <a:off x="3475828" y="4056658"/>
+            <a:ext cx="1878443" cy="338554"/>
+          </a:xfrm>
+          <a:prstGeom prst="rect">
+            <a:avLst/>
+          </a:prstGeom>
+          <a:noFill/>
+        </p:spPr>
+        <p:txBody>
+          <a:bodyPr wrap="square" rtlCol="0">
+            <a:spAutoFit/>
+          </a:bodyPr>
+          <a:lstStyle/>
+          <a:p>
+            <a:r>
+              <a:rPr lang="pt-BR" sz="1400" b="1" dirty="0">
+                <a:solidFill>
+                  <a:srgbClr val="15292F"/>
+                </a:solidFill>
+              </a:rPr>
+              <a:t>Solicitante</a:t>
+            </a:r>
+            <a:r>
+              <a:rPr lang="pt-BR" sz="1600" b="1" dirty="0">
+                <a:solidFill>
+                  <a:srgbClr val="15292F"/>
+                </a:solidFill>
+              </a:rPr>
+              <a:t>:</a:t>
+            </a:r>
+          </a:p>
+        </p:txBody>
+      </p:sp>
+      <p:sp>
+        <p:nvSpPr>
+          <p:cNvPr id="73" name="CaixaDeTexto 72">
+            <a:extLst>
+              <a:ext uri="{FF2B5EF4-FFF2-40B4-BE49-F238E27FC236}">
+                <a16:creationId xmlns:a16="http://schemas.microsoft.com/office/drawing/2014/main" id="{C12D3862-1157-4A67-8C92-38602BE2EA99}"/>
+              </a:ext>
+            </a:extLst>
+          </p:cNvPr>
+          <p:cNvSpPr txBox="1"/>
+          <p:nvPr/>
+        </p:nvSpPr>
+        <p:spPr>
+          <a:xfrm>
+            <a:off x="3482857" y="4480849"/>
+            <a:ext cx="1878443" cy="338554"/>
+          </a:xfrm>
+          <a:prstGeom prst="rect">
+            <a:avLst/>
+          </a:prstGeom>
+          <a:noFill/>
+        </p:spPr>
+        <p:txBody>
+          <a:bodyPr wrap="square" rtlCol="0">
+            <a:spAutoFit/>
+          </a:bodyPr>
+          <a:lstStyle/>
+          <a:p>
+            <a:r>
+              <a:rPr lang="pt-BR" sz="1400" b="1" dirty="0">
+                <a:solidFill>
+                  <a:srgbClr val="15292F"/>
+                </a:solidFill>
+              </a:rPr>
+              <a:t>Descrição</a:t>
+            </a:r>
+            <a:r>
+              <a:rPr lang="pt-BR" sz="1600" b="1" dirty="0">
+                <a:solidFill>
+                  <a:srgbClr val="15292F"/>
+                </a:solidFill>
+              </a:rPr>
+              <a:t>:</a:t>
+            </a:r>
+          </a:p>
+        </p:txBody>
+      </p:sp>
+      <p:sp>
+        <p:nvSpPr>
+          <p:cNvPr id="75" name="CaixaDeTexto 74">
+            <a:extLst>
+              <a:ext uri="{FF2B5EF4-FFF2-40B4-BE49-F238E27FC236}">
+                <a16:creationId xmlns:a16="http://schemas.microsoft.com/office/drawing/2014/main" id="{5B7E17A5-BD11-452C-B744-3C22B27E3153}"/>
+              </a:ext>
+            </a:extLst>
+          </p:cNvPr>
+          <p:cNvSpPr txBox="1"/>
+          <p:nvPr/>
+        </p:nvSpPr>
+        <p:spPr>
+          <a:xfrm>
+            <a:off x="5839851" y="3679251"/>
+            <a:ext cx="1878443" cy="307777"/>
+          </a:xfrm>
+          <a:prstGeom prst="rect">
+            <a:avLst/>
+          </a:prstGeom>
+          <a:noFill/>
+        </p:spPr>
+        <p:txBody>
+          <a:bodyPr wrap="square" rtlCol="0">
+            <a:spAutoFit/>
+          </a:bodyPr>
+          <a:lstStyle/>
+          <a:p>
+            <a:r>
+              <a:rPr lang="pt-BR" sz="1400" b="1" dirty="0">
+                <a:solidFill>
+                  <a:srgbClr val="15292F"/>
+                </a:solidFill>
+              </a:rPr>
+              <a:t>Data de previsão:</a:t>
+            </a:r>
+          </a:p>
+        </p:txBody>
+      </p:sp>
+      <p:sp>
+        <p:nvSpPr>
+          <p:cNvPr id="76" name="CaixaDeTexto 75">
+            <a:extLst>
+              <a:ext uri="{FF2B5EF4-FFF2-40B4-BE49-F238E27FC236}">
+                <a16:creationId xmlns:a16="http://schemas.microsoft.com/office/drawing/2014/main" id="{EC489FF2-1264-49DC-978C-2E0001EDAB88}"/>
+              </a:ext>
+            </a:extLst>
+          </p:cNvPr>
+          <p:cNvSpPr txBox="1"/>
+          <p:nvPr/>
+        </p:nvSpPr>
+        <p:spPr>
+          <a:xfrm>
+            <a:off x="8173995" y="3664093"/>
+            <a:ext cx="1878443" cy="307777"/>
+          </a:xfrm>
+          <a:prstGeom prst="rect">
+            <a:avLst/>
+          </a:prstGeom>
+          <a:noFill/>
+        </p:spPr>
+        <p:txBody>
+          <a:bodyPr wrap="square" rtlCol="0">
+            <a:spAutoFit/>
+          </a:bodyPr>
+          <a:lstStyle/>
+          <a:p>
+            <a:r>
+              <a:rPr lang="pt-BR" sz="1400" b="1" dirty="0">
+                <a:solidFill>
+                  <a:srgbClr val="15292F"/>
+                </a:solidFill>
+              </a:rPr>
+              <a:t>Data de conclusão:</a:t>
+            </a:r>
+          </a:p>
+        </p:txBody>
+      </p:sp>
+      <p:sp>
+        <p:nvSpPr>
+          <p:cNvPr id="77" name="CaixaDeTexto 76">
+            <a:extLst>
+              <a:ext uri="{FF2B5EF4-FFF2-40B4-BE49-F238E27FC236}">
+                <a16:creationId xmlns:a16="http://schemas.microsoft.com/office/drawing/2014/main" id="{A68D6E0C-FA24-4694-89D9-57EF2D4C0043}"/>
+              </a:ext>
+            </a:extLst>
+          </p:cNvPr>
+          <p:cNvSpPr txBox="1"/>
+          <p:nvPr/>
+        </p:nvSpPr>
+        <p:spPr>
+          <a:xfrm>
+            <a:off x="10613391" y="1750311"/>
+            <a:ext cx="472545" cy="584775"/>
+          </a:xfrm>
+          <a:prstGeom prst="rect">
+            <a:avLst/>
+          </a:prstGeom>
+          <a:noFill/>
+        </p:spPr>
+        <p:txBody>
+          <a:bodyPr wrap="square" rtlCol="0">
+            <a:spAutoFit/>
+          </a:bodyPr>
+          <a:lstStyle/>
+          <a:p>
+            <a:r>
+              <a:rPr lang="pt-BR" sz="3200" b="1" dirty="0">
+                <a:solidFill>
+                  <a:schemeClr val="bg2">
+                    <a:lumMod val="75000"/>
+                  </a:schemeClr>
+                </a:solidFill>
+              </a:rPr>
+              <a:t>X</a:t>
+            </a:r>
+          </a:p>
+        </p:txBody>
+      </p:sp>
+      <p:sp>
+        <p:nvSpPr>
+          <p:cNvPr id="78" name="CaixaDeTexto 77">
+            <a:extLst>
+              <a:ext uri="{FF2B5EF4-FFF2-40B4-BE49-F238E27FC236}">
+                <a16:creationId xmlns:a16="http://schemas.microsoft.com/office/drawing/2014/main" id="{1C9737A7-2F50-4A94-91BA-135F06505EDA}"/>
+              </a:ext>
+            </a:extLst>
+          </p:cNvPr>
+          <p:cNvSpPr txBox="1"/>
+          <p:nvPr/>
+        </p:nvSpPr>
+        <p:spPr>
+          <a:xfrm>
+            <a:off x="4819533" y="3676363"/>
+            <a:ext cx="1878443" cy="307777"/>
+          </a:xfrm>
+          <a:prstGeom prst="rect">
+            <a:avLst/>
+          </a:prstGeom>
+          <a:noFill/>
+        </p:spPr>
+        <p:txBody>
+          <a:bodyPr wrap="square" rtlCol="0">
+            <a:spAutoFit/>
+          </a:bodyPr>
+          <a:lstStyle/>
+          <a:p>
+            <a:r>
+              <a:rPr lang="pt-BR" sz="1400" b="1" dirty="0">
+                <a:solidFill>
+                  <a:schemeClr val="tx1">
+                    <a:lumMod val="50000"/>
+                    <a:lumOff val="50000"/>
+                  </a:schemeClr>
+                </a:solidFill>
+              </a:rPr>
+              <a:t>22/10/2018</a:t>
+            </a:r>
+          </a:p>
+        </p:txBody>
+      </p:sp>
+      <p:sp>
+        <p:nvSpPr>
+          <p:cNvPr id="79" name="CaixaDeTexto 78">
+            <a:extLst>
+              <a:ext uri="{FF2B5EF4-FFF2-40B4-BE49-F238E27FC236}">
+                <a16:creationId xmlns:a16="http://schemas.microsoft.com/office/drawing/2014/main" id="{15C64B5F-D71C-44D2-8868-676FC511FBCD}"/>
+              </a:ext>
+            </a:extLst>
+          </p:cNvPr>
+          <p:cNvSpPr txBox="1"/>
+          <p:nvPr/>
+        </p:nvSpPr>
+        <p:spPr>
+          <a:xfrm>
+            <a:off x="7182653" y="3677121"/>
+            <a:ext cx="1878443" cy="307777"/>
+          </a:xfrm>
+          <a:prstGeom prst="rect">
+            <a:avLst/>
+          </a:prstGeom>
+          <a:noFill/>
+        </p:spPr>
+        <p:txBody>
+          <a:bodyPr wrap="square" rtlCol="0">
+            <a:spAutoFit/>
+          </a:bodyPr>
+          <a:lstStyle/>
+          <a:p>
+            <a:r>
+              <a:rPr lang="pt-BR" sz="1400" b="1" dirty="0">
+                <a:solidFill>
+                  <a:schemeClr val="tx1">
+                    <a:lumMod val="50000"/>
+                    <a:lumOff val="50000"/>
+                  </a:schemeClr>
+                </a:solidFill>
+              </a:rPr>
+              <a:t>24/10/2018</a:t>
+            </a:r>
+          </a:p>
+        </p:txBody>
+      </p:sp>
+      <p:sp>
+        <p:nvSpPr>
+          <p:cNvPr id="80" name="CaixaDeTexto 79">
+            <a:extLst>
+              <a:ext uri="{FF2B5EF4-FFF2-40B4-BE49-F238E27FC236}">
+                <a16:creationId xmlns:a16="http://schemas.microsoft.com/office/drawing/2014/main" id="{F91F5B0B-D85C-4149-A1C0-95DB862DD25A}"/>
+              </a:ext>
+            </a:extLst>
+          </p:cNvPr>
+          <p:cNvSpPr txBox="1"/>
+          <p:nvPr/>
+        </p:nvSpPr>
+        <p:spPr>
+          <a:xfrm>
+            <a:off x="9641469" y="3662621"/>
+            <a:ext cx="1878443" cy="307777"/>
+          </a:xfrm>
+          <a:prstGeom prst="rect">
+            <a:avLst/>
+          </a:prstGeom>
+          <a:noFill/>
+        </p:spPr>
+        <p:txBody>
+          <a:bodyPr wrap="square" rtlCol="0">
+            <a:spAutoFit/>
+          </a:bodyPr>
+          <a:lstStyle/>
+          <a:p>
+            <a:r>
+              <a:rPr lang="pt-BR" sz="1400" b="1" dirty="0">
+                <a:solidFill>
+                  <a:schemeClr val="tx1">
+                    <a:lumMod val="50000"/>
+                    <a:lumOff val="50000"/>
+                  </a:schemeClr>
+                </a:solidFill>
+              </a:rPr>
+              <a:t>-</a:t>
+            </a:r>
+          </a:p>
+        </p:txBody>
+      </p:sp>
+      <p:sp>
+        <p:nvSpPr>
+          <p:cNvPr id="81" name="CaixaDeTexto 80">
+            <a:extLst>
+              <a:ext uri="{FF2B5EF4-FFF2-40B4-BE49-F238E27FC236}">
+                <a16:creationId xmlns:a16="http://schemas.microsoft.com/office/drawing/2014/main" id="{D4FAE5A0-8A09-4EA5-867C-28D69CD72116}"/>
+              </a:ext>
+            </a:extLst>
+          </p:cNvPr>
+          <p:cNvSpPr txBox="1"/>
+          <p:nvPr/>
+        </p:nvSpPr>
+        <p:spPr>
+          <a:xfrm>
+            <a:off x="4422079" y="4095894"/>
+            <a:ext cx="1878443" cy="307777"/>
+          </a:xfrm>
+          <a:prstGeom prst="rect">
+            <a:avLst/>
+          </a:prstGeom>
+          <a:noFill/>
+        </p:spPr>
+        <p:txBody>
+          <a:bodyPr wrap="square" rtlCol="0">
+            <a:spAutoFit/>
+          </a:bodyPr>
+          <a:lstStyle/>
+          <a:p>
+            <a:r>
+              <a:rPr lang="pt-BR" sz="1400" b="1" dirty="0">
+                <a:solidFill>
+                  <a:schemeClr val="tx1">
+                    <a:lumMod val="50000"/>
+                    <a:lumOff val="50000"/>
+                  </a:schemeClr>
+                </a:solidFill>
+              </a:rPr>
+              <a:t>Ana Maria</a:t>
+            </a:r>
+          </a:p>
+        </p:txBody>
+      </p:sp>
+      <p:sp>
+        <p:nvSpPr>
+          <p:cNvPr id="82" name="CaixaDeTexto 81">
+            <a:extLst>
+              <a:ext uri="{FF2B5EF4-FFF2-40B4-BE49-F238E27FC236}">
+                <a16:creationId xmlns:a16="http://schemas.microsoft.com/office/drawing/2014/main" id="{5E892B0F-4A58-42D2-920A-A5640163ABE4}"/>
+              </a:ext>
+            </a:extLst>
+          </p:cNvPr>
+          <p:cNvSpPr txBox="1"/>
+          <p:nvPr/>
+        </p:nvSpPr>
+        <p:spPr>
+          <a:xfrm>
+            <a:off x="4377220" y="4501684"/>
+            <a:ext cx="6336564" cy="523220"/>
+          </a:xfrm>
+          <a:prstGeom prst="rect">
+            <a:avLst/>
+          </a:prstGeom>
+          <a:noFill/>
+        </p:spPr>
+        <p:txBody>
+          <a:bodyPr wrap="square" rtlCol="0">
+            <a:spAutoFit/>
+          </a:bodyPr>
+          <a:lstStyle/>
+          <a:p>
+            <a:r>
+              <a:rPr lang="pt-BR" sz="1400" b="1" dirty="0">
+                <a:solidFill>
+                  <a:schemeClr val="tx1">
+                    <a:lumMod val="50000"/>
+                    <a:lumOff val="50000"/>
+                  </a:schemeClr>
+                </a:solidFill>
+              </a:rPr>
+              <a:t>Ao registrar um produto do tipo Bombom de morango, o sistema não está reconhecendo o código de barras do mesmo.</a:t>
+            </a:r>
+          </a:p>
+        </p:txBody>
+      </p:sp>
+    </p:spTree>
+    <p:extLst>
+      <p:ext uri="{BB962C8B-B14F-4D97-AF65-F5344CB8AC3E}">
+        <p14:creationId xmlns:p14="http://schemas.microsoft.com/office/powerpoint/2010/main" val="2307759442"/>
+      </p:ext>
+    </p:extLst>
+  </p:cSld>
+  <p:clrMapOvr>
+    <a:masterClrMapping/>
+  </p:clrMapOvr>
+</p:sld>
+</file>
+
 <file path=ppt/theme/theme1.xml><?xml version="1.0" encoding="utf-8"?>
 <a:theme xmlns:a="http://schemas.openxmlformats.org/drawingml/2006/main" name="Tema do Office">
   <a:themeElements>

</xml_diff>